<commit_message>
updated content for endpoints, data access and identity
</commit_message>
<xml_diff>
--- a/module-1/01-06 Developing the API Endpoints/01-06 Developing the Web API endpoints.pptx
+++ b/module-1/01-06 Developing the API Endpoints/01-06 Developing the Web API endpoints.pptx
@@ -6,24 +6,17 @@
     <p:sldMasterId id="2147483684" r:id="rId2"/>
   </p:sldMasterIdLst>
   <p:notesMasterIdLst>
-    <p:notesMasterId r:id="rId18"/>
+    <p:notesMasterId r:id="rId11"/>
   </p:notesMasterIdLst>
   <p:sldIdLst>
     <p:sldId id="261" r:id="rId3"/>
     <p:sldId id="256" r:id="rId4"/>
     <p:sldId id="262" r:id="rId5"/>
     <p:sldId id="263" r:id="rId6"/>
-    <p:sldId id="269" r:id="rId7"/>
-    <p:sldId id="270" r:id="rId8"/>
-    <p:sldId id="271" r:id="rId9"/>
-    <p:sldId id="264" r:id="rId10"/>
-    <p:sldId id="268" r:id="rId11"/>
-    <p:sldId id="266" r:id="rId12"/>
-    <p:sldId id="267" r:id="rId13"/>
-    <p:sldId id="265" r:id="rId14"/>
-    <p:sldId id="275" r:id="rId15"/>
-    <p:sldId id="272" r:id="rId16"/>
-    <p:sldId id="274" r:id="rId17"/>
+    <p:sldId id="265" r:id="rId7"/>
+    <p:sldId id="275" r:id="rId8"/>
+    <p:sldId id="272" r:id="rId9"/>
+    <p:sldId id="274" r:id="rId10"/>
   </p:sldIdLst>
   <p:sldSz cx="12192000" cy="6858000"/>
   <p:notesSz cx="6858000" cy="9144000"/>
@@ -212,7 +205,7 @@
           <a:p>
             <a:fld id="{44460345-7E30-425F-A93D-E48BE08458AD}" type="datetimeFigureOut">
               <a:rPr lang="en-US" smtClean="0"/>
-              <a:t>9/27/2021</a:t>
+              <a:t>10/4/2021</a:t>
             </a:fld>
             <a:endParaRPr lang="en-US"/>
           </a:p>
@@ -859,7 +852,7 @@
           <a:p>
             <a:fld id="{59197A79-E6B2-4AB0-908B-22D89AAD388B}" type="datetimeFigureOut">
               <a:rPr lang="en-US" smtClean="0"/>
-              <a:t>9/27/2021</a:t>
+              <a:t>10/4/2021</a:t>
             </a:fld>
             <a:endParaRPr lang="en-US"/>
           </a:p>
@@ -1067,7 +1060,7 @@
           <a:p>
             <a:fld id="{59197A79-E6B2-4AB0-908B-22D89AAD388B}" type="datetimeFigureOut">
               <a:rPr lang="en-US" smtClean="0"/>
-              <a:t>9/27/2021</a:t>
+              <a:t>10/4/2021</a:t>
             </a:fld>
             <a:endParaRPr lang="en-US"/>
           </a:p>
@@ -1325,7 +1318,7 @@
           <a:p>
             <a:fld id="{59197A79-E6B2-4AB0-908B-22D89AAD388B}" type="datetimeFigureOut">
               <a:rPr lang="en-US" smtClean="0"/>
-              <a:t>9/27/2021</a:t>
+              <a:t>10/4/2021</a:t>
             </a:fld>
             <a:endParaRPr lang="en-US"/>
           </a:p>
@@ -1565,7 +1558,7 @@
           <a:p>
             <a:fld id="{D088F999-7A4E-6B4F-9FED-EF75B73AD044}" type="datetimeFigureOut">
               <a:rPr lang="en-US" smtClean="0"/>
-              <a:t>9/27/2021</a:t>
+              <a:t>10/4/2021</a:t>
             </a:fld>
             <a:endParaRPr lang="en-US"/>
           </a:p>
@@ -1733,7 +1726,7 @@
           <a:p>
             <a:fld id="{D088F999-7A4E-6B4F-9FED-EF75B73AD044}" type="datetimeFigureOut">
               <a:rPr lang="en-US" smtClean="0"/>
-              <a:t>9/27/2021</a:t>
+              <a:t>10/4/2021</a:t>
             </a:fld>
             <a:endParaRPr lang="en-US"/>
           </a:p>
@@ -1978,7 +1971,7 @@
           <a:p>
             <a:fld id="{D088F999-7A4E-6B4F-9FED-EF75B73AD044}" type="datetimeFigureOut">
               <a:rPr lang="en-US" smtClean="0"/>
-              <a:t>9/27/2021</a:t>
+              <a:t>10/4/2021</a:t>
             </a:fld>
             <a:endParaRPr lang="en-US"/>
           </a:p>
@@ -2263,7 +2256,7 @@
           <a:p>
             <a:fld id="{D088F999-7A4E-6B4F-9FED-EF75B73AD044}" type="datetimeFigureOut">
               <a:rPr lang="en-US" smtClean="0"/>
-              <a:t>9/27/2021</a:t>
+              <a:t>10/4/2021</a:t>
             </a:fld>
             <a:endParaRPr lang="en-US"/>
           </a:p>
@@ -2682,7 +2675,7 @@
           <a:p>
             <a:fld id="{D088F999-7A4E-6B4F-9FED-EF75B73AD044}" type="datetimeFigureOut">
               <a:rPr lang="en-US" smtClean="0"/>
-              <a:t>9/27/2021</a:t>
+              <a:t>10/4/2021</a:t>
             </a:fld>
             <a:endParaRPr lang="en-US"/>
           </a:p>
@@ -2799,7 +2792,7 @@
           <a:p>
             <a:fld id="{D088F999-7A4E-6B4F-9FED-EF75B73AD044}" type="datetimeFigureOut">
               <a:rPr lang="en-US" smtClean="0"/>
-              <a:t>9/27/2021</a:t>
+              <a:t>10/4/2021</a:t>
             </a:fld>
             <a:endParaRPr lang="en-US"/>
           </a:p>
@@ -2894,7 +2887,7 @@
           <a:p>
             <a:fld id="{D088F999-7A4E-6B4F-9FED-EF75B73AD044}" type="datetimeFigureOut">
               <a:rPr lang="en-US" smtClean="0"/>
-              <a:t>9/27/2021</a:t>
+              <a:t>10/4/2021</a:t>
             </a:fld>
             <a:endParaRPr lang="en-US"/>
           </a:p>
@@ -3169,7 +3162,7 @@
           <a:p>
             <a:fld id="{D088F999-7A4E-6B4F-9FED-EF75B73AD044}" type="datetimeFigureOut">
               <a:rPr lang="en-US" smtClean="0"/>
-              <a:t>9/27/2021</a:t>
+              <a:t>10/4/2021</a:t>
             </a:fld>
             <a:endParaRPr lang="en-US"/>
           </a:p>
@@ -3339,7 +3332,7 @@
           <a:p>
             <a:fld id="{59197A79-E6B2-4AB0-908B-22D89AAD388B}" type="datetimeFigureOut">
               <a:rPr lang="en-US" smtClean="0"/>
-              <a:t>9/27/2021</a:t>
+              <a:t>10/4/2021</a:t>
             </a:fld>
             <a:endParaRPr lang="en-US"/>
           </a:p>
@@ -3591,7 +3584,7 @@
           <a:p>
             <a:fld id="{D088F999-7A4E-6B4F-9FED-EF75B73AD044}" type="datetimeFigureOut">
               <a:rPr lang="en-US" smtClean="0"/>
-              <a:t>9/27/2021</a:t>
+              <a:t>10/4/2021</a:t>
             </a:fld>
             <a:endParaRPr lang="en-US"/>
           </a:p>
@@ -3759,7 +3752,7 @@
           <a:p>
             <a:fld id="{D088F999-7A4E-6B4F-9FED-EF75B73AD044}" type="datetimeFigureOut">
               <a:rPr lang="en-US" smtClean="0"/>
-              <a:t>9/27/2021</a:t>
+              <a:t>10/4/2021</a:t>
             </a:fld>
             <a:endParaRPr lang="en-US"/>
           </a:p>
@@ -3937,7 +3930,7 @@
           <a:p>
             <a:fld id="{D088F999-7A4E-6B4F-9FED-EF75B73AD044}" type="datetimeFigureOut">
               <a:rPr lang="en-US" smtClean="0"/>
-              <a:t>9/27/2021</a:t>
+              <a:t>10/4/2021</a:t>
             </a:fld>
             <a:endParaRPr lang="en-US"/>
           </a:p>
@@ -4274,7 +4267,7 @@
           <a:p>
             <a:fld id="{59197A79-E6B2-4AB0-908B-22D89AAD388B}" type="datetimeFigureOut">
               <a:rPr lang="en-US" smtClean="0"/>
-              <a:t>9/27/2021</a:t>
+              <a:t>10/4/2021</a:t>
             </a:fld>
             <a:endParaRPr lang="en-US"/>
           </a:p>
@@ -4549,7 +4542,7 @@
           <a:p>
             <a:fld id="{59197A79-E6B2-4AB0-908B-22D89AAD388B}" type="datetimeFigureOut">
               <a:rPr lang="en-US" smtClean="0"/>
-              <a:t>9/27/2021</a:t>
+              <a:t>10/4/2021</a:t>
             </a:fld>
             <a:endParaRPr lang="en-US"/>
           </a:p>
@@ -4932,7 +4925,7 @@
           <a:p>
             <a:fld id="{59197A79-E6B2-4AB0-908B-22D89AAD388B}" type="datetimeFigureOut">
               <a:rPr lang="en-US" smtClean="0"/>
-              <a:t>9/27/2021</a:t>
+              <a:t>10/4/2021</a:t>
             </a:fld>
             <a:endParaRPr lang="en-US"/>
           </a:p>
@@ -5050,7 +5043,7 @@
           <a:p>
             <a:fld id="{59197A79-E6B2-4AB0-908B-22D89AAD388B}" type="datetimeFigureOut">
               <a:rPr lang="en-US" smtClean="0"/>
-              <a:t>9/27/2021</a:t>
+              <a:t>10/4/2021</a:t>
             </a:fld>
             <a:endParaRPr lang="en-US"/>
           </a:p>
@@ -5223,7 +5216,7 @@
           <a:p>
             <a:fld id="{59197A79-E6B2-4AB0-908B-22D89AAD388B}" type="datetimeFigureOut">
               <a:rPr lang="en-US" smtClean="0"/>
-              <a:t>9/27/2021</a:t>
+              <a:t>10/4/2021</a:t>
             </a:fld>
             <a:endParaRPr lang="en-US"/>
           </a:p>
@@ -5579,7 +5572,7 @@
           <a:p>
             <a:fld id="{59197A79-E6B2-4AB0-908B-22D89AAD388B}" type="datetimeFigureOut">
               <a:rPr lang="en-US" smtClean="0"/>
-              <a:t>9/27/2021</a:t>
+              <a:t>10/4/2021</a:t>
             </a:fld>
             <a:endParaRPr lang="en-US"/>
           </a:p>
@@ -5927,7 +5920,7 @@
           <a:p>
             <a:fld id="{59197A79-E6B2-4AB0-908B-22D89AAD388B}" type="datetimeFigureOut">
               <a:rPr lang="en-US" smtClean="0"/>
-              <a:t>9/27/2021</a:t>
+              <a:t>10/4/2021</a:t>
             </a:fld>
             <a:endParaRPr lang="en-US"/>
           </a:p>
@@ -6238,7 +6231,7 @@
           <a:p>
             <a:fld id="{59197A79-E6B2-4AB0-908B-22D89AAD388B}" type="datetimeFigureOut">
               <a:rPr lang="en-US" smtClean="0"/>
-              <a:t>9/27/2021</a:t>
+              <a:t>10/4/2021</a:t>
             </a:fld>
             <a:endParaRPr lang="en-US"/>
           </a:p>
@@ -6904,7 +6897,7 @@
           <a:p>
             <a:fld id="{D088F999-7A4E-6B4F-9FED-EF75B73AD044}" type="datetimeFigureOut">
               <a:rPr lang="en-US" smtClean="0"/>
-              <a:t>9/27/2021</a:t>
+              <a:t>10/4/2021</a:t>
             </a:fld>
             <a:endParaRPr lang="en-US"/>
           </a:p>
@@ -7679,2378 +7672,6 @@
 </p:sld>
 </file>
 
-<file path=ppt/slides/slide10.xml><?xml version="1.0" encoding="utf-8"?>
-<p:sld xmlns:a="http://schemas.openxmlformats.org/drawingml/2006/main" xmlns:r="http://schemas.openxmlformats.org/officeDocument/2006/relationships" xmlns:p="http://schemas.openxmlformats.org/presentationml/2006/main">
-  <p:cSld>
-    <p:spTree>
-      <p:nvGrpSpPr>
-        <p:cNvPr id="1" name=""/>
-        <p:cNvGrpSpPr/>
-        <p:nvPr/>
-      </p:nvGrpSpPr>
-      <p:grpSpPr>
-        <a:xfrm>
-          <a:off x="0" y="0"/>
-          <a:ext cx="0" cy="0"/>
-          <a:chOff x="0" y="0"/>
-          <a:chExt cx="0" cy="0"/>
-        </a:xfrm>
-      </p:grpSpPr>
-      <p:sp>
-        <p:nvSpPr>
-          <p:cNvPr id="2" name="Title 1">
-            <a:extLst>
-              <a:ext uri="{FF2B5EF4-FFF2-40B4-BE49-F238E27FC236}">
-                <a16:creationId xmlns:a16="http://schemas.microsoft.com/office/drawing/2014/main" id="{0E3DF703-5A53-4FB0-9214-8BCC099AD8DE}"/>
-              </a:ext>
-            </a:extLst>
-          </p:cNvPr>
-          <p:cNvSpPr>
-            <a:spLocks noGrp="1"/>
-          </p:cNvSpPr>
-          <p:nvPr>
-            <p:ph type="title"/>
-          </p:nvPr>
-        </p:nvSpPr>
-        <p:spPr/>
-        <p:txBody>
-          <a:bodyPr/>
-          <a:lstStyle/>
-          <a:p>
-            <a:r>
-              <a:rPr lang="en-US" dirty="0"/>
-              <a:t>CORS</a:t>
-            </a:r>
-          </a:p>
-        </p:txBody>
-      </p:sp>
-      <p:pic>
-        <p:nvPicPr>
-          <p:cNvPr id="5" name="Picture 4">
-            <a:extLst>
-              <a:ext uri="{FF2B5EF4-FFF2-40B4-BE49-F238E27FC236}">
-                <a16:creationId xmlns:a16="http://schemas.microsoft.com/office/drawing/2014/main" id="{F4E8F1CB-B81C-4337-9412-9F5487277C83}"/>
-              </a:ext>
-            </a:extLst>
-          </p:cNvPr>
-          <p:cNvPicPr>
-            <a:picLocks noChangeAspect="1"/>
-          </p:cNvPicPr>
-          <p:nvPr/>
-        </p:nvPicPr>
-        <p:blipFill>
-          <a:blip r:embed="rId2"/>
-          <a:stretch>
-            <a:fillRect/>
-          </a:stretch>
-        </p:blipFill>
-        <p:spPr>
-          <a:xfrm>
-            <a:off x="1097280" y="2025016"/>
-            <a:ext cx="10062726" cy="3433675"/>
-          </a:xfrm>
-          <a:prstGeom prst="rect">
-            <a:avLst/>
-          </a:prstGeom>
-        </p:spPr>
-      </p:pic>
-    </p:spTree>
-    <p:extLst>
-      <p:ext uri="{BB962C8B-B14F-4D97-AF65-F5344CB8AC3E}">
-        <p14:creationId xmlns:p14="http://schemas.microsoft.com/office/powerpoint/2010/main" val="4051259291"/>
-      </p:ext>
-    </p:extLst>
-  </p:cSld>
-  <p:clrMapOvr>
-    <a:masterClrMapping/>
-  </p:clrMapOvr>
-</p:sld>
-</file>
-
-<file path=ppt/slides/slide11.xml><?xml version="1.0" encoding="utf-8"?>
-<p:sld xmlns:a="http://schemas.openxmlformats.org/drawingml/2006/main" xmlns:r="http://schemas.openxmlformats.org/officeDocument/2006/relationships" xmlns:p="http://schemas.openxmlformats.org/presentationml/2006/main">
-  <p:cSld>
-    <p:spTree>
-      <p:nvGrpSpPr>
-        <p:cNvPr id="1" name=""/>
-        <p:cNvGrpSpPr/>
-        <p:nvPr/>
-      </p:nvGrpSpPr>
-      <p:grpSpPr>
-        <a:xfrm>
-          <a:off x="0" y="0"/>
-          <a:ext cx="0" cy="0"/>
-          <a:chOff x="0" y="0"/>
-          <a:chExt cx="0" cy="0"/>
-        </a:xfrm>
-      </p:grpSpPr>
-      <p:sp>
-        <p:nvSpPr>
-          <p:cNvPr id="2" name="Title 1">
-            <a:extLst>
-              <a:ext uri="{FF2B5EF4-FFF2-40B4-BE49-F238E27FC236}">
-                <a16:creationId xmlns:a16="http://schemas.microsoft.com/office/drawing/2014/main" id="{A20AC04D-A984-4F23-B555-92E74792A726}"/>
-              </a:ext>
-            </a:extLst>
-          </p:cNvPr>
-          <p:cNvSpPr>
-            <a:spLocks noGrp="1"/>
-          </p:cNvSpPr>
-          <p:nvPr>
-            <p:ph type="title"/>
-          </p:nvPr>
-        </p:nvSpPr>
-        <p:spPr/>
-        <p:txBody>
-          <a:bodyPr/>
-          <a:lstStyle/>
-          <a:p>
-            <a:r>
-              <a:rPr lang="en-US" dirty="0"/>
-              <a:t>CORS Preflight</a:t>
-            </a:r>
-          </a:p>
-        </p:txBody>
-      </p:sp>
-      <p:sp>
-        <p:nvSpPr>
-          <p:cNvPr id="4" name="Content Placeholder 3">
-            <a:extLst>
-              <a:ext uri="{FF2B5EF4-FFF2-40B4-BE49-F238E27FC236}">
-                <a16:creationId xmlns:a16="http://schemas.microsoft.com/office/drawing/2014/main" id="{787E22E6-1EAF-4259-8EC3-8882BB45A969}"/>
-              </a:ext>
-            </a:extLst>
-          </p:cNvPr>
-          <p:cNvSpPr>
-            <a:spLocks noGrp="1"/>
-          </p:cNvSpPr>
-          <p:nvPr>
-            <p:ph sz="half" idx="1"/>
-          </p:nvPr>
-        </p:nvSpPr>
-        <p:spPr>
-          <a:xfrm>
-            <a:off x="1097278" y="1845734"/>
-            <a:ext cx="10058400" cy="2230965"/>
-          </a:xfrm>
-        </p:spPr>
-        <p:txBody>
-          <a:bodyPr>
-            <a:normAutofit/>
-          </a:bodyPr>
-          <a:lstStyle/>
-          <a:p>
-            <a:r>
-              <a:rPr lang="en-US" b="0" i="0" dirty="0">
-                <a:solidFill>
-                  <a:srgbClr val="E6E6E6"/>
-                </a:solidFill>
-                <a:effectLst/>
-                <a:latin typeface="SFMono-Regular"/>
-              </a:rPr>
-              <a:t>OPTIONS https://localhost/api/Albums/1 HTTP/1.1</a:t>
-            </a:r>
-          </a:p>
-          <a:p>
-            <a:r>
-              <a:rPr lang="en-US" b="0" i="0" dirty="0">
-                <a:solidFill>
-                  <a:srgbClr val="E6E6E6"/>
-                </a:solidFill>
-                <a:effectLst/>
-                <a:latin typeface="SFMono-Regular"/>
-              </a:rPr>
-              <a:t>Host: localhost </a:t>
-            </a:r>
-          </a:p>
-          <a:p>
-            <a:r>
-              <a:rPr lang="en-US" b="0" i="0" dirty="0">
-                <a:solidFill>
-                  <a:srgbClr val="E6E6E6"/>
-                </a:solidFill>
-                <a:effectLst/>
-                <a:latin typeface="SFMono-Regular"/>
-              </a:rPr>
-              <a:t>Access-Control-Request-Method: PUT </a:t>
-            </a:r>
-          </a:p>
-          <a:p>
-            <a:r>
-              <a:rPr lang="en-US" b="0" i="0" dirty="0">
-                <a:solidFill>
-                  <a:srgbClr val="E6E6E6"/>
-                </a:solidFill>
-                <a:effectLst/>
-                <a:latin typeface="SFMono-Regular"/>
-              </a:rPr>
-              <a:t>Origin: https://localhost:55912 Access-Control-Request-Headers: content-type </a:t>
-            </a:r>
-          </a:p>
-          <a:p>
-            <a:r>
-              <a:rPr lang="en-US" b="0" i="0" dirty="0">
-                <a:solidFill>
-                  <a:srgbClr val="E6E6E6"/>
-                </a:solidFill>
-                <a:effectLst/>
-                <a:latin typeface="SFMono-Regular"/>
-              </a:rPr>
-              <a:t>Accept: */*</a:t>
-            </a:r>
-            <a:endParaRPr lang="en-US" dirty="0"/>
-          </a:p>
-        </p:txBody>
-      </p:sp>
-      <p:sp>
-        <p:nvSpPr>
-          <p:cNvPr id="5" name="Content Placeholder 4">
-            <a:extLst>
-              <a:ext uri="{FF2B5EF4-FFF2-40B4-BE49-F238E27FC236}">
-                <a16:creationId xmlns:a16="http://schemas.microsoft.com/office/drawing/2014/main" id="{FBE13464-85CA-4466-9C4E-92796CE97E8B}"/>
-              </a:ext>
-            </a:extLst>
-          </p:cNvPr>
-          <p:cNvSpPr>
-            <a:spLocks noGrp="1"/>
-          </p:cNvSpPr>
-          <p:nvPr>
-            <p:ph sz="half" idx="2"/>
-          </p:nvPr>
-        </p:nvSpPr>
-        <p:spPr>
-          <a:xfrm>
-            <a:off x="1097280" y="4429776"/>
-            <a:ext cx="9997440" cy="1450757"/>
-          </a:xfrm>
-        </p:spPr>
-        <p:txBody>
-          <a:bodyPr>
-            <a:normAutofit/>
-          </a:bodyPr>
-          <a:lstStyle/>
-          <a:p>
-            <a:r>
-              <a:rPr lang="en-US" b="1" i="0" dirty="0">
-                <a:solidFill>
-                  <a:srgbClr val="E6E6E6"/>
-                </a:solidFill>
-                <a:effectLst/>
-                <a:latin typeface="SFMono-Regular"/>
-              </a:rPr>
-              <a:t>HTTP/1.1 200 OK Access-Control-Allow-Origin: https://localhost:55912 </a:t>
-            </a:r>
-          </a:p>
-          <a:p>
-            <a:r>
-              <a:rPr lang="en-US" b="1" i="0" dirty="0">
-                <a:solidFill>
-                  <a:srgbClr val="E6E6E6"/>
-                </a:solidFill>
-                <a:effectLst/>
-                <a:latin typeface="SFMono-Regular"/>
-              </a:rPr>
-              <a:t>Access-Control-Allow-Methods: PUT </a:t>
-            </a:r>
-          </a:p>
-          <a:p>
-            <a:r>
-              <a:rPr lang="en-US" b="1" i="0" dirty="0">
-                <a:solidFill>
-                  <a:srgbClr val="E6E6E6"/>
-                </a:solidFill>
-                <a:effectLst/>
-                <a:latin typeface="SFMono-Regular"/>
-              </a:rPr>
-              <a:t>Access-Control-Allow-Headers: content-</a:t>
-            </a:r>
-            <a:r>
-              <a:rPr lang="en-US" b="1" i="0" dirty="0" err="1">
-                <a:solidFill>
-                  <a:srgbClr val="E6E6E6"/>
-                </a:solidFill>
-                <a:effectLst/>
-                <a:latin typeface="SFMono-Regular"/>
-              </a:rPr>
-              <a:t>typeAccess</a:t>
-            </a:r>
-            <a:r>
-              <a:rPr lang="en-US" b="1" i="0" dirty="0">
-                <a:solidFill>
-                  <a:srgbClr val="E6E6E6"/>
-                </a:solidFill>
-                <a:effectLst/>
-                <a:latin typeface="SFMono-Regular"/>
-              </a:rPr>
-              <a:t>-Control-Max-Age: 600</a:t>
-            </a:r>
-            <a:endParaRPr lang="en-US" b="1" dirty="0"/>
-          </a:p>
-        </p:txBody>
-      </p:sp>
-    </p:spTree>
-    <p:extLst>
-      <p:ext uri="{BB962C8B-B14F-4D97-AF65-F5344CB8AC3E}">
-        <p14:creationId xmlns:p14="http://schemas.microsoft.com/office/powerpoint/2010/main" val="874164791"/>
-      </p:ext>
-    </p:extLst>
-  </p:cSld>
-  <p:clrMapOvr>
-    <a:masterClrMapping/>
-  </p:clrMapOvr>
-  <p:timing>
-    <p:tnLst>
-      <p:par>
-        <p:cTn id="1" dur="indefinite" restart="never" nodeType="tmRoot">
-          <p:childTnLst>
-            <p:seq concurrent="1" nextAc="seek">
-              <p:cTn id="2" dur="indefinite" nodeType="mainSeq">
-                <p:childTnLst>
-                  <p:par>
-                    <p:cTn id="3" fill="hold">
-                      <p:stCondLst>
-                        <p:cond delay="indefinite"/>
-                      </p:stCondLst>
-                      <p:childTnLst>
-                        <p:par>
-                          <p:cTn id="4" fill="hold">
-                            <p:stCondLst>
-                              <p:cond delay="0"/>
-                            </p:stCondLst>
-                            <p:childTnLst>
-                              <p:par>
-                                <p:cTn id="5" presetID="1" presetClass="entr" presetSubtype="0" fill="hold" nodeType="clickEffect">
-                                  <p:stCondLst>
-                                    <p:cond delay="0"/>
-                                  </p:stCondLst>
-                                  <p:childTnLst>
-                                    <p:set>
-                                      <p:cBhvr>
-                                        <p:cTn id="6" dur="1" fill="hold">
-                                          <p:stCondLst>
-                                            <p:cond delay="0"/>
-                                          </p:stCondLst>
-                                        </p:cTn>
-                                        <p:tgtEl>
-                                          <p:spTgt spid="4">
-                                            <p:txEl>
-                                              <p:pRg st="0" end="0"/>
-                                            </p:txEl>
-                                          </p:spTgt>
-                                        </p:tgtEl>
-                                        <p:attrNameLst>
-                                          <p:attrName>style.visibility</p:attrName>
-                                        </p:attrNameLst>
-                                      </p:cBhvr>
-                                      <p:to>
-                                        <p:strVal val="visible"/>
-                                      </p:to>
-                                    </p:set>
-                                  </p:childTnLst>
-                                </p:cTn>
-                              </p:par>
-                              <p:par>
-                                <p:cTn id="7" presetID="1" presetClass="entr" presetSubtype="0" fill="hold" nodeType="withEffect">
-                                  <p:stCondLst>
-                                    <p:cond delay="0"/>
-                                  </p:stCondLst>
-                                  <p:childTnLst>
-                                    <p:set>
-                                      <p:cBhvr>
-                                        <p:cTn id="8" dur="1" fill="hold">
-                                          <p:stCondLst>
-                                            <p:cond delay="0"/>
-                                          </p:stCondLst>
-                                        </p:cTn>
-                                        <p:tgtEl>
-                                          <p:spTgt spid="4">
-                                            <p:txEl>
-                                              <p:pRg st="1" end="1"/>
-                                            </p:txEl>
-                                          </p:spTgt>
-                                        </p:tgtEl>
-                                        <p:attrNameLst>
-                                          <p:attrName>style.visibility</p:attrName>
-                                        </p:attrNameLst>
-                                      </p:cBhvr>
-                                      <p:to>
-                                        <p:strVal val="visible"/>
-                                      </p:to>
-                                    </p:set>
-                                  </p:childTnLst>
-                                </p:cTn>
-                              </p:par>
-                              <p:par>
-                                <p:cTn id="9" presetID="1" presetClass="entr" presetSubtype="0" fill="hold" nodeType="withEffect">
-                                  <p:stCondLst>
-                                    <p:cond delay="0"/>
-                                  </p:stCondLst>
-                                  <p:childTnLst>
-                                    <p:set>
-                                      <p:cBhvr>
-                                        <p:cTn id="10" dur="1" fill="hold">
-                                          <p:stCondLst>
-                                            <p:cond delay="0"/>
-                                          </p:stCondLst>
-                                        </p:cTn>
-                                        <p:tgtEl>
-                                          <p:spTgt spid="4">
-                                            <p:txEl>
-                                              <p:pRg st="2" end="2"/>
-                                            </p:txEl>
-                                          </p:spTgt>
-                                        </p:tgtEl>
-                                        <p:attrNameLst>
-                                          <p:attrName>style.visibility</p:attrName>
-                                        </p:attrNameLst>
-                                      </p:cBhvr>
-                                      <p:to>
-                                        <p:strVal val="visible"/>
-                                      </p:to>
-                                    </p:set>
-                                  </p:childTnLst>
-                                </p:cTn>
-                              </p:par>
-                              <p:par>
-                                <p:cTn id="11" presetID="1" presetClass="entr" presetSubtype="0" fill="hold" nodeType="withEffect">
-                                  <p:stCondLst>
-                                    <p:cond delay="0"/>
-                                  </p:stCondLst>
-                                  <p:childTnLst>
-                                    <p:set>
-                                      <p:cBhvr>
-                                        <p:cTn id="12" dur="1" fill="hold">
-                                          <p:stCondLst>
-                                            <p:cond delay="0"/>
-                                          </p:stCondLst>
-                                        </p:cTn>
-                                        <p:tgtEl>
-                                          <p:spTgt spid="4">
-                                            <p:txEl>
-                                              <p:pRg st="3" end="3"/>
-                                            </p:txEl>
-                                          </p:spTgt>
-                                        </p:tgtEl>
-                                        <p:attrNameLst>
-                                          <p:attrName>style.visibility</p:attrName>
-                                        </p:attrNameLst>
-                                      </p:cBhvr>
-                                      <p:to>
-                                        <p:strVal val="visible"/>
-                                      </p:to>
-                                    </p:set>
-                                  </p:childTnLst>
-                                </p:cTn>
-                              </p:par>
-                              <p:par>
-                                <p:cTn id="13" presetID="1" presetClass="entr" presetSubtype="0" fill="hold" nodeType="withEffect">
-                                  <p:stCondLst>
-                                    <p:cond delay="0"/>
-                                  </p:stCondLst>
-                                  <p:childTnLst>
-                                    <p:set>
-                                      <p:cBhvr>
-                                        <p:cTn id="14" dur="1" fill="hold">
-                                          <p:stCondLst>
-                                            <p:cond delay="0"/>
-                                          </p:stCondLst>
-                                        </p:cTn>
-                                        <p:tgtEl>
-                                          <p:spTgt spid="4">
-                                            <p:txEl>
-                                              <p:pRg st="4" end="4"/>
-                                            </p:txEl>
-                                          </p:spTgt>
-                                        </p:tgtEl>
-                                        <p:attrNameLst>
-                                          <p:attrName>style.visibility</p:attrName>
-                                        </p:attrNameLst>
-                                      </p:cBhvr>
-                                      <p:to>
-                                        <p:strVal val="visible"/>
-                                      </p:to>
-                                    </p:set>
-                                  </p:childTnLst>
-                                </p:cTn>
-                              </p:par>
-                            </p:childTnLst>
-                          </p:cTn>
-                        </p:par>
-                      </p:childTnLst>
-                    </p:cTn>
-                  </p:par>
-                  <p:par>
-                    <p:cTn id="15" fill="hold">
-                      <p:stCondLst>
-                        <p:cond delay="indefinite"/>
-                      </p:stCondLst>
-                      <p:childTnLst>
-                        <p:par>
-                          <p:cTn id="16" fill="hold">
-                            <p:stCondLst>
-                              <p:cond delay="0"/>
-                            </p:stCondLst>
-                            <p:childTnLst>
-                              <p:par>
-                                <p:cTn id="17" presetID="1" presetClass="entr" presetSubtype="0" fill="hold" nodeType="clickEffect">
-                                  <p:stCondLst>
-                                    <p:cond delay="0"/>
-                                  </p:stCondLst>
-                                  <p:childTnLst>
-                                    <p:set>
-                                      <p:cBhvr>
-                                        <p:cTn id="18" dur="1" fill="hold">
-                                          <p:stCondLst>
-                                            <p:cond delay="0"/>
-                                          </p:stCondLst>
-                                        </p:cTn>
-                                        <p:tgtEl>
-                                          <p:spTgt spid="5">
-                                            <p:txEl>
-                                              <p:pRg st="0" end="0"/>
-                                            </p:txEl>
-                                          </p:spTgt>
-                                        </p:tgtEl>
-                                        <p:attrNameLst>
-                                          <p:attrName>style.visibility</p:attrName>
-                                        </p:attrNameLst>
-                                      </p:cBhvr>
-                                      <p:to>
-                                        <p:strVal val="visible"/>
-                                      </p:to>
-                                    </p:set>
-                                  </p:childTnLst>
-                                </p:cTn>
-                              </p:par>
-                              <p:par>
-                                <p:cTn id="19" presetID="1" presetClass="entr" presetSubtype="0" fill="hold" nodeType="withEffect">
-                                  <p:stCondLst>
-                                    <p:cond delay="0"/>
-                                  </p:stCondLst>
-                                  <p:childTnLst>
-                                    <p:set>
-                                      <p:cBhvr>
-                                        <p:cTn id="20" dur="1" fill="hold">
-                                          <p:stCondLst>
-                                            <p:cond delay="0"/>
-                                          </p:stCondLst>
-                                        </p:cTn>
-                                        <p:tgtEl>
-                                          <p:spTgt spid="5">
-                                            <p:txEl>
-                                              <p:pRg st="1" end="1"/>
-                                            </p:txEl>
-                                          </p:spTgt>
-                                        </p:tgtEl>
-                                        <p:attrNameLst>
-                                          <p:attrName>style.visibility</p:attrName>
-                                        </p:attrNameLst>
-                                      </p:cBhvr>
-                                      <p:to>
-                                        <p:strVal val="visible"/>
-                                      </p:to>
-                                    </p:set>
-                                  </p:childTnLst>
-                                </p:cTn>
-                              </p:par>
-                              <p:par>
-                                <p:cTn id="21" presetID="1" presetClass="entr" presetSubtype="0" fill="hold" nodeType="withEffect">
-                                  <p:stCondLst>
-                                    <p:cond delay="0"/>
-                                  </p:stCondLst>
-                                  <p:childTnLst>
-                                    <p:set>
-                                      <p:cBhvr>
-                                        <p:cTn id="22" dur="1" fill="hold">
-                                          <p:stCondLst>
-                                            <p:cond delay="0"/>
-                                          </p:stCondLst>
-                                        </p:cTn>
-                                        <p:tgtEl>
-                                          <p:spTgt spid="5">
-                                            <p:txEl>
-                                              <p:pRg st="2" end="2"/>
-                                            </p:txEl>
-                                          </p:spTgt>
-                                        </p:tgtEl>
-                                        <p:attrNameLst>
-                                          <p:attrName>style.visibility</p:attrName>
-                                        </p:attrNameLst>
-                                      </p:cBhvr>
-                                      <p:to>
-                                        <p:strVal val="visible"/>
-                                      </p:to>
-                                    </p:set>
-                                  </p:childTnLst>
-                                </p:cTn>
-                              </p:par>
-                            </p:childTnLst>
-                          </p:cTn>
-                        </p:par>
-                      </p:childTnLst>
-                    </p:cTn>
-                  </p:par>
-                </p:childTnLst>
-              </p:cTn>
-              <p:prevCondLst>
-                <p:cond evt="onPrev" delay="0">
-                  <p:tgtEl>
-                    <p:sldTgt/>
-                  </p:tgtEl>
-                </p:cond>
-              </p:prevCondLst>
-              <p:nextCondLst>
-                <p:cond evt="onNext" delay="0">
-                  <p:tgtEl>
-                    <p:sldTgt/>
-                  </p:tgtEl>
-                </p:cond>
-              </p:nextCondLst>
-            </p:seq>
-          </p:childTnLst>
-        </p:cTn>
-      </p:par>
-    </p:tnLst>
-  </p:timing>
-</p:sld>
-</file>
-
-<file path=ppt/slides/slide12.xml><?xml version="1.0" encoding="utf-8"?>
-<p:sld xmlns:a="http://schemas.openxmlformats.org/drawingml/2006/main" xmlns:r="http://schemas.openxmlformats.org/officeDocument/2006/relationships" xmlns:p="http://schemas.openxmlformats.org/presentationml/2006/main">
-  <p:cSld>
-    <p:bg>
-      <p:bgPr>
-        <a:solidFill>
-          <a:schemeClr val="bg1">
-            <a:lumMod val="75000"/>
-            <a:lumOff val="25000"/>
-          </a:schemeClr>
-        </a:solidFill>
-        <a:effectLst/>
-      </p:bgPr>
-    </p:bg>
-    <p:spTree>
-      <p:nvGrpSpPr>
-        <p:cNvPr id="1" name=""/>
-        <p:cNvGrpSpPr/>
-        <p:nvPr/>
-      </p:nvGrpSpPr>
-      <p:grpSpPr>
-        <a:xfrm>
-          <a:off x="0" y="0"/>
-          <a:ext cx="0" cy="0"/>
-          <a:chOff x="0" y="0"/>
-          <a:chExt cx="0" cy="0"/>
-        </a:xfrm>
-      </p:grpSpPr>
-      <p:sp>
-        <p:nvSpPr>
-          <p:cNvPr id="24" name="Rectangle 9">
-            <a:extLst>
-              <a:ext uri="{FF2B5EF4-FFF2-40B4-BE49-F238E27FC236}">
-                <a16:creationId xmlns:a16="http://schemas.microsoft.com/office/drawing/2014/main" id="{36E6FEC8-170C-492C-84E0-54394629D120}"/>
-              </a:ext>
-              <a:ext uri="{C183D7F6-B498-43B3-948B-1728B52AA6E4}">
-                <adec:decorative xmlns:adec="http://schemas.microsoft.com/office/drawing/2017/decorative" val="1"/>
-              </a:ext>
-            </a:extLst>
-          </p:cNvPr>
-          <p:cNvSpPr>
-            <a:spLocks noGrp="1" noRot="1" noChangeAspect="1" noMove="1" noResize="1" noEditPoints="1" noAdjustHandles="1" noChangeArrowheads="1" noChangeShapeType="1" noTextEdit="1"/>
-          </p:cNvSpPr>
-          <p:nvPr>
-            <p:extLst>
-              <p:ext uri="{386F3935-93C4-4BCD-93E2-E3B085C9AB24}">
-                <p16:designElem xmlns:p16="http://schemas.microsoft.com/office/powerpoint/2015/main" val="1"/>
-              </p:ext>
-            </p:extLst>
-          </p:nvPr>
-        </p:nvSpPr>
-        <p:spPr>
-          <a:xfrm>
-            <a:off x="3175" y="6400800"/>
-            <a:ext cx="12188825" cy="457200"/>
-          </a:xfrm>
-          <a:prstGeom prst="rect">
-            <a:avLst/>
-          </a:prstGeom>
-          <a:solidFill>
-            <a:schemeClr val="accent1">
-              <a:lumMod val="75000"/>
-            </a:schemeClr>
-          </a:solidFill>
-          <a:ln>
-            <a:noFill/>
-          </a:ln>
-        </p:spPr>
-        <p:style>
-          <a:lnRef idx="2">
-            <a:schemeClr val="accent1">
-              <a:shade val="50000"/>
-            </a:schemeClr>
-          </a:lnRef>
-          <a:fillRef idx="1">
-            <a:schemeClr val="accent1"/>
-          </a:fillRef>
-          <a:effectRef idx="0">
-            <a:schemeClr val="accent1"/>
-          </a:effectRef>
-          <a:fontRef idx="minor">
-            <a:schemeClr val="lt1"/>
-          </a:fontRef>
-        </p:style>
-      </p:sp>
-      <p:sp>
-        <p:nvSpPr>
-          <p:cNvPr id="25" name="Rectangle 11">
-            <a:extLst>
-              <a:ext uri="{FF2B5EF4-FFF2-40B4-BE49-F238E27FC236}">
-                <a16:creationId xmlns:a16="http://schemas.microsoft.com/office/drawing/2014/main" id="{DEE940A1-B9E0-4C5D-A55E-B19742379C83}"/>
-              </a:ext>
-              <a:ext uri="{C183D7F6-B498-43B3-948B-1728B52AA6E4}">
-                <adec:decorative xmlns:adec="http://schemas.microsoft.com/office/drawing/2017/decorative" val="1"/>
-              </a:ext>
-            </a:extLst>
-          </p:cNvPr>
-          <p:cNvSpPr>
-            <a:spLocks noGrp="1" noRot="1" noChangeAspect="1" noMove="1" noResize="1" noEditPoints="1" noAdjustHandles="1" noChangeArrowheads="1" noChangeShapeType="1" noTextEdit="1"/>
-          </p:cNvSpPr>
-          <p:nvPr>
-            <p:extLst>
-              <p:ext uri="{386F3935-93C4-4BCD-93E2-E3B085C9AB24}">
-                <p16:designElem xmlns:p16="http://schemas.microsoft.com/office/powerpoint/2015/main" val="1"/>
-              </p:ext>
-            </p:extLst>
-          </p:nvPr>
-        </p:nvSpPr>
-        <p:spPr>
-          <a:xfrm>
-            <a:off x="15" y="6334316"/>
-            <a:ext cx="12188825" cy="64008"/>
-          </a:xfrm>
-          <a:prstGeom prst="rect">
-            <a:avLst/>
-          </a:prstGeom>
-          <a:solidFill>
-            <a:schemeClr val="accent1"/>
-          </a:solidFill>
-          <a:ln>
-            <a:noFill/>
-          </a:ln>
-        </p:spPr>
-        <p:style>
-          <a:lnRef idx="2">
-            <a:schemeClr val="accent1">
-              <a:shade val="50000"/>
-            </a:schemeClr>
-          </a:lnRef>
-          <a:fillRef idx="1">
-            <a:schemeClr val="accent1"/>
-          </a:fillRef>
-          <a:effectRef idx="0">
-            <a:schemeClr val="accent1"/>
-          </a:effectRef>
-          <a:fontRef idx="minor">
-            <a:schemeClr val="lt1"/>
-          </a:fontRef>
-        </p:style>
-      </p:sp>
-      <p:cxnSp>
-        <p:nvCxnSpPr>
-          <p:cNvPr id="26" name="Straight Connector 13">
-            <a:extLst>
-              <a:ext uri="{FF2B5EF4-FFF2-40B4-BE49-F238E27FC236}">
-                <a16:creationId xmlns:a16="http://schemas.microsoft.com/office/drawing/2014/main" id="{81C8E47B-A563-4B44-A9B0-9316605C2E4E}"/>
-              </a:ext>
-              <a:ext uri="{C183D7F6-B498-43B3-948B-1728B52AA6E4}">
-                <adec:decorative xmlns:adec="http://schemas.microsoft.com/office/drawing/2017/decorative" val="1"/>
-              </a:ext>
-            </a:extLst>
-          </p:cNvPr>
-          <p:cNvCxnSpPr>
-            <a:cxnSpLocks noGrp="1" noRot="1" noChangeAspect="1" noMove="1" noResize="1" noEditPoints="1" noAdjustHandles="1" noChangeArrowheads="1" noChangeShapeType="1"/>
-          </p:cNvCxnSpPr>
-          <p:nvPr>
-            <p:extLst>
-              <p:ext uri="{386F3935-93C4-4BCD-93E2-E3B085C9AB24}">
-                <p16:designElem xmlns:p16="http://schemas.microsoft.com/office/powerpoint/2015/main" val="1"/>
-              </p:ext>
-            </p:extLst>
-          </p:nvPr>
-        </p:nvCxnSpPr>
-        <p:spPr>
-          <a:xfrm>
-            <a:off x="1207658" y="4343400"/>
-            <a:ext cx="9875520" cy="0"/>
-          </a:xfrm>
-          <a:prstGeom prst="line">
-            <a:avLst/>
-          </a:prstGeom>
-          <a:ln w="6350">
-            <a:solidFill>
-              <a:schemeClr val="tx1">
-                <a:lumMod val="50000"/>
-                <a:lumOff val="50000"/>
-              </a:schemeClr>
-            </a:solidFill>
-          </a:ln>
-        </p:spPr>
-        <p:style>
-          <a:lnRef idx="1">
-            <a:schemeClr val="accent1"/>
-          </a:lnRef>
-          <a:fillRef idx="0">
-            <a:schemeClr val="accent1"/>
-          </a:fillRef>
-          <a:effectRef idx="0">
-            <a:schemeClr val="accent1"/>
-          </a:effectRef>
-          <a:fontRef idx="minor">
-            <a:schemeClr val="tx1"/>
-          </a:fontRef>
-        </p:style>
-      </p:cxnSp>
-      <p:sp>
-        <p:nvSpPr>
-          <p:cNvPr id="27" name="Rectangle 15">
-            <a:extLst>
-              <a:ext uri="{FF2B5EF4-FFF2-40B4-BE49-F238E27FC236}">
-                <a16:creationId xmlns:a16="http://schemas.microsoft.com/office/drawing/2014/main" id="{89CEF278-62C5-49CA-8BD9-BCDBE9977FF3}"/>
-              </a:ext>
-              <a:ext uri="{C183D7F6-B498-43B3-948B-1728B52AA6E4}">
-                <adec:decorative xmlns:adec="http://schemas.microsoft.com/office/drawing/2017/decorative" val="1"/>
-              </a:ext>
-            </a:extLst>
-          </p:cNvPr>
-          <p:cNvSpPr>
-            <a:spLocks noGrp="1" noRot="1" noChangeAspect="1" noMove="1" noResize="1" noEditPoints="1" noAdjustHandles="1" noChangeArrowheads="1" noChangeShapeType="1" noTextEdit="1"/>
-          </p:cNvSpPr>
-          <p:nvPr>
-            <p:extLst>
-              <p:ext uri="{386F3935-93C4-4BCD-93E2-E3B085C9AB24}">
-                <p16:designElem xmlns:p16="http://schemas.microsoft.com/office/powerpoint/2015/main" val="1"/>
-              </p:ext>
-            </p:extLst>
-          </p:nvPr>
-        </p:nvSpPr>
-        <p:spPr bwMode="white">
-          <a:xfrm>
-            <a:off x="16" y="0"/>
-            <a:ext cx="4584734" cy="6858000"/>
-          </a:xfrm>
-          <a:prstGeom prst="rect">
-            <a:avLst/>
-          </a:prstGeom>
-          <a:solidFill>
-            <a:schemeClr val="accent1">
-              <a:lumMod val="75000"/>
-            </a:schemeClr>
-          </a:solidFill>
-          <a:ln>
-            <a:noFill/>
-          </a:ln>
-        </p:spPr>
-        <p:style>
-          <a:lnRef idx="2">
-            <a:schemeClr val="accent1">
-              <a:shade val="50000"/>
-            </a:schemeClr>
-          </a:lnRef>
-          <a:fillRef idx="1">
-            <a:schemeClr val="accent1"/>
-          </a:fillRef>
-          <a:effectRef idx="0">
-            <a:schemeClr val="accent1"/>
-          </a:effectRef>
-          <a:fontRef idx="minor">
-            <a:schemeClr val="lt1"/>
-          </a:fontRef>
-        </p:style>
-      </p:sp>
-      <p:sp>
-        <p:nvSpPr>
-          <p:cNvPr id="2" name="Title 1">
-            <a:extLst>
-              <a:ext uri="{FF2B5EF4-FFF2-40B4-BE49-F238E27FC236}">
-                <a16:creationId xmlns:a16="http://schemas.microsoft.com/office/drawing/2014/main" id="{63950B4F-5F45-4EFE-877F-E487E96E3B06}"/>
-              </a:ext>
-            </a:extLst>
-          </p:cNvPr>
-          <p:cNvSpPr>
-            <a:spLocks noGrp="1"/>
-          </p:cNvSpPr>
-          <p:nvPr>
-            <p:ph type="title"/>
-          </p:nvPr>
-        </p:nvSpPr>
-        <p:spPr>
-          <a:xfrm>
-            <a:off x="457200" y="640080"/>
-            <a:ext cx="3659246" cy="2926080"/>
-          </a:xfrm>
-        </p:spPr>
-        <p:txBody>
-          <a:bodyPr vert="horz" lIns="91440" tIns="45720" rIns="91440" bIns="45720" rtlCol="0" anchor="b">
-            <a:normAutofit/>
-          </a:bodyPr>
-          <a:lstStyle/>
-          <a:p>
-            <a:r>
-              <a:rPr lang="en-US" sz="4400">
-                <a:solidFill>
-                  <a:srgbClr val="FFFFFF"/>
-                </a:solidFill>
-              </a:rPr>
-              <a:t>Controllers and Actions : Routing</a:t>
-            </a:r>
-          </a:p>
-        </p:txBody>
-      </p:sp>
-      <p:pic>
-        <p:nvPicPr>
-          <p:cNvPr id="5" name="Picture 4">
-            <a:extLst>
-              <a:ext uri="{FF2B5EF4-FFF2-40B4-BE49-F238E27FC236}">
-                <a16:creationId xmlns:a16="http://schemas.microsoft.com/office/drawing/2014/main" id="{3D38F9C3-0F20-4E62-BA55-8340E68FE522}"/>
-              </a:ext>
-            </a:extLst>
-          </p:cNvPr>
-          <p:cNvPicPr>
-            <a:picLocks noChangeAspect="1"/>
-          </p:cNvPicPr>
-          <p:nvPr/>
-        </p:nvPicPr>
-        <p:blipFill rotWithShape="1">
-          <a:blip r:embed="rId2"/>
-          <a:srcRect r="40809" b="1"/>
-          <a:stretch/>
-        </p:blipFill>
-        <p:spPr>
-          <a:xfrm>
-            <a:off x="4639733" y="10"/>
-            <a:ext cx="7552266" cy="6857990"/>
-          </a:xfrm>
-          <a:prstGeom prst="rect">
-            <a:avLst/>
-          </a:prstGeom>
-        </p:spPr>
-      </p:pic>
-      <p:sp>
-        <p:nvSpPr>
-          <p:cNvPr id="28" name="Rectangle 17">
-            <a:extLst>
-              <a:ext uri="{FF2B5EF4-FFF2-40B4-BE49-F238E27FC236}">
-                <a16:creationId xmlns:a16="http://schemas.microsoft.com/office/drawing/2014/main" id="{02E2466B-276C-423A-9377-78508D6A0764}"/>
-              </a:ext>
-              <a:ext uri="{C183D7F6-B498-43B3-948B-1728B52AA6E4}">
-                <adec:decorative xmlns:adec="http://schemas.microsoft.com/office/drawing/2017/decorative" val="1"/>
-              </a:ext>
-            </a:extLst>
-          </p:cNvPr>
-          <p:cNvSpPr>
-            <a:spLocks noGrp="1" noRot="1" noChangeAspect="1" noMove="1" noResize="1" noEditPoints="1" noAdjustHandles="1" noChangeArrowheads="1" noChangeShapeType="1" noTextEdit="1"/>
-          </p:cNvSpPr>
-          <p:nvPr>
-            <p:extLst>
-              <p:ext uri="{386F3935-93C4-4BCD-93E2-E3B085C9AB24}">
-                <p16:designElem xmlns:p16="http://schemas.microsoft.com/office/powerpoint/2015/main" val="1"/>
-              </p:ext>
-            </p:extLst>
-          </p:nvPr>
-        </p:nvSpPr>
-        <p:spPr>
-          <a:xfrm>
-            <a:off x="4584751" y="0"/>
-            <a:ext cx="64008" cy="6858000"/>
-          </a:xfrm>
-          <a:prstGeom prst="rect">
-            <a:avLst/>
-          </a:prstGeom>
-          <a:solidFill>
-            <a:schemeClr val="accent1"/>
-          </a:solidFill>
-          <a:ln>
-            <a:noFill/>
-          </a:ln>
-        </p:spPr>
-        <p:style>
-          <a:lnRef idx="2">
-            <a:schemeClr val="accent1">
-              <a:shade val="50000"/>
-            </a:schemeClr>
-          </a:lnRef>
-          <a:fillRef idx="1">
-            <a:schemeClr val="accent1"/>
-          </a:fillRef>
-          <a:effectRef idx="0">
-            <a:schemeClr val="accent1"/>
-          </a:effectRef>
-          <a:fontRef idx="minor">
-            <a:schemeClr val="lt1"/>
-          </a:fontRef>
-        </p:style>
-      </p:sp>
-    </p:spTree>
-    <p:extLst>
-      <p:ext uri="{BB962C8B-B14F-4D97-AF65-F5344CB8AC3E}">
-        <p14:creationId xmlns:p14="http://schemas.microsoft.com/office/powerpoint/2010/main" val="2202522606"/>
-      </p:ext>
-    </p:extLst>
-  </p:cSld>
-  <p:clrMapOvr>
-    <a:masterClrMapping/>
-  </p:clrMapOvr>
-</p:sld>
-</file>
-
-<file path=ppt/slides/slide13.xml><?xml version="1.0" encoding="utf-8"?>
-<p:sld xmlns:a="http://schemas.openxmlformats.org/drawingml/2006/main" xmlns:r="http://schemas.openxmlformats.org/officeDocument/2006/relationships" xmlns:p="http://schemas.openxmlformats.org/presentationml/2006/main">
-  <p:cSld>
-    <p:bg>
-      <p:bgPr>
-        <a:solidFill>
-          <a:schemeClr val="bg1">
-            <a:lumMod val="75000"/>
-            <a:lumOff val="25000"/>
-          </a:schemeClr>
-        </a:solidFill>
-        <a:effectLst/>
-      </p:bgPr>
-    </p:bg>
-    <p:spTree>
-      <p:nvGrpSpPr>
-        <p:cNvPr id="1" name=""/>
-        <p:cNvGrpSpPr/>
-        <p:nvPr/>
-      </p:nvGrpSpPr>
-      <p:grpSpPr>
-        <a:xfrm>
-          <a:off x="0" y="0"/>
-          <a:ext cx="0" cy="0"/>
-          <a:chOff x="0" y="0"/>
-          <a:chExt cx="0" cy="0"/>
-        </a:xfrm>
-      </p:grpSpPr>
-      <p:sp>
-        <p:nvSpPr>
-          <p:cNvPr id="9" name="Rectangle 8">
-            <a:extLst>
-              <a:ext uri="{FF2B5EF4-FFF2-40B4-BE49-F238E27FC236}">
-                <a16:creationId xmlns:a16="http://schemas.microsoft.com/office/drawing/2014/main" id="{36E6FEC8-170C-492C-84E0-54394629D120}"/>
-              </a:ext>
-              <a:ext uri="{C183D7F6-B498-43B3-948B-1728B52AA6E4}">
-                <adec:decorative xmlns:adec="http://schemas.microsoft.com/office/drawing/2017/decorative" val="1"/>
-              </a:ext>
-            </a:extLst>
-          </p:cNvPr>
-          <p:cNvSpPr>
-            <a:spLocks noGrp="1" noRot="1" noChangeAspect="1" noMove="1" noResize="1" noEditPoints="1" noAdjustHandles="1" noChangeArrowheads="1" noChangeShapeType="1" noTextEdit="1"/>
-          </p:cNvSpPr>
-          <p:nvPr>
-            <p:extLst>
-              <p:ext uri="{386F3935-93C4-4BCD-93E2-E3B085C9AB24}">
-                <p16:designElem xmlns:p16="http://schemas.microsoft.com/office/powerpoint/2015/main" val="1"/>
-              </p:ext>
-            </p:extLst>
-          </p:nvPr>
-        </p:nvSpPr>
-        <p:spPr>
-          <a:xfrm>
-            <a:off x="3175" y="6400800"/>
-            <a:ext cx="12188825" cy="457200"/>
-          </a:xfrm>
-          <a:prstGeom prst="rect">
-            <a:avLst/>
-          </a:prstGeom>
-          <a:solidFill>
-            <a:schemeClr val="accent1">
-              <a:lumMod val="75000"/>
-            </a:schemeClr>
-          </a:solidFill>
-          <a:ln>
-            <a:noFill/>
-          </a:ln>
-        </p:spPr>
-        <p:style>
-          <a:lnRef idx="2">
-            <a:schemeClr val="accent1">
-              <a:shade val="50000"/>
-            </a:schemeClr>
-          </a:lnRef>
-          <a:fillRef idx="1">
-            <a:schemeClr val="accent1"/>
-          </a:fillRef>
-          <a:effectRef idx="0">
-            <a:schemeClr val="accent1"/>
-          </a:effectRef>
-          <a:fontRef idx="minor">
-            <a:schemeClr val="lt1"/>
-          </a:fontRef>
-        </p:style>
-      </p:sp>
-      <p:sp>
-        <p:nvSpPr>
-          <p:cNvPr id="11" name="Rectangle 10">
-            <a:extLst>
-              <a:ext uri="{FF2B5EF4-FFF2-40B4-BE49-F238E27FC236}">
-                <a16:creationId xmlns:a16="http://schemas.microsoft.com/office/drawing/2014/main" id="{DEE940A1-B9E0-4C5D-A55E-B19742379C83}"/>
-              </a:ext>
-              <a:ext uri="{C183D7F6-B498-43B3-948B-1728B52AA6E4}">
-                <adec:decorative xmlns:adec="http://schemas.microsoft.com/office/drawing/2017/decorative" val="1"/>
-              </a:ext>
-            </a:extLst>
-          </p:cNvPr>
-          <p:cNvSpPr>
-            <a:spLocks noGrp="1" noRot="1" noChangeAspect="1" noMove="1" noResize="1" noEditPoints="1" noAdjustHandles="1" noChangeArrowheads="1" noChangeShapeType="1" noTextEdit="1"/>
-          </p:cNvSpPr>
-          <p:nvPr>
-            <p:extLst>
-              <p:ext uri="{386F3935-93C4-4BCD-93E2-E3B085C9AB24}">
-                <p16:designElem xmlns:p16="http://schemas.microsoft.com/office/powerpoint/2015/main" val="1"/>
-              </p:ext>
-            </p:extLst>
-          </p:nvPr>
-        </p:nvSpPr>
-        <p:spPr>
-          <a:xfrm>
-            <a:off x="15" y="6334316"/>
-            <a:ext cx="12188825" cy="64008"/>
-          </a:xfrm>
-          <a:prstGeom prst="rect">
-            <a:avLst/>
-          </a:prstGeom>
-          <a:solidFill>
-            <a:schemeClr val="accent1"/>
-          </a:solidFill>
-          <a:ln>
-            <a:noFill/>
-          </a:ln>
-        </p:spPr>
-        <p:style>
-          <a:lnRef idx="2">
-            <a:schemeClr val="accent1">
-              <a:shade val="50000"/>
-            </a:schemeClr>
-          </a:lnRef>
-          <a:fillRef idx="1">
-            <a:schemeClr val="accent1"/>
-          </a:fillRef>
-          <a:effectRef idx="0">
-            <a:schemeClr val="accent1"/>
-          </a:effectRef>
-          <a:fontRef idx="minor">
-            <a:schemeClr val="lt1"/>
-          </a:fontRef>
-        </p:style>
-      </p:sp>
-      <p:cxnSp>
-        <p:nvCxnSpPr>
-          <p:cNvPr id="13" name="Straight Connector 12">
-            <a:extLst>
-              <a:ext uri="{FF2B5EF4-FFF2-40B4-BE49-F238E27FC236}">
-                <a16:creationId xmlns:a16="http://schemas.microsoft.com/office/drawing/2014/main" id="{81C8E47B-A563-4B44-A9B0-9316605C2E4E}"/>
-              </a:ext>
-              <a:ext uri="{C183D7F6-B498-43B3-948B-1728B52AA6E4}">
-                <adec:decorative xmlns:adec="http://schemas.microsoft.com/office/drawing/2017/decorative" val="1"/>
-              </a:ext>
-            </a:extLst>
-          </p:cNvPr>
-          <p:cNvCxnSpPr>
-            <a:cxnSpLocks noGrp="1" noRot="1" noChangeAspect="1" noMove="1" noResize="1" noEditPoints="1" noAdjustHandles="1" noChangeArrowheads="1" noChangeShapeType="1"/>
-          </p:cNvCxnSpPr>
-          <p:nvPr>
-            <p:extLst>
-              <p:ext uri="{386F3935-93C4-4BCD-93E2-E3B085C9AB24}">
-                <p16:designElem xmlns:p16="http://schemas.microsoft.com/office/powerpoint/2015/main" val="1"/>
-              </p:ext>
-            </p:extLst>
-          </p:nvPr>
-        </p:nvCxnSpPr>
-        <p:spPr>
-          <a:xfrm>
-            <a:off x="1207658" y="4343400"/>
-            <a:ext cx="9875520" cy="0"/>
-          </a:xfrm>
-          <a:prstGeom prst="line">
-            <a:avLst/>
-          </a:prstGeom>
-          <a:ln w="6350">
-            <a:solidFill>
-              <a:schemeClr val="tx1">
-                <a:lumMod val="50000"/>
-                <a:lumOff val="50000"/>
-              </a:schemeClr>
-            </a:solidFill>
-          </a:ln>
-        </p:spPr>
-        <p:style>
-          <a:lnRef idx="1">
-            <a:schemeClr val="accent1"/>
-          </a:lnRef>
-          <a:fillRef idx="0">
-            <a:schemeClr val="accent1"/>
-          </a:fillRef>
-          <a:effectRef idx="0">
-            <a:schemeClr val="accent1"/>
-          </a:effectRef>
-          <a:fontRef idx="minor">
-            <a:schemeClr val="tx1"/>
-          </a:fontRef>
-        </p:style>
-      </p:cxnSp>
-      <p:pic>
-        <p:nvPicPr>
-          <p:cNvPr id="4" name="Picture 3">
-            <a:extLst>
-              <a:ext uri="{FF2B5EF4-FFF2-40B4-BE49-F238E27FC236}">
-                <a16:creationId xmlns:a16="http://schemas.microsoft.com/office/drawing/2014/main" id="{1CCF55AA-2D19-4768-8CAF-EC2CF895994E}"/>
-              </a:ext>
-            </a:extLst>
-          </p:cNvPr>
-          <p:cNvPicPr>
-            <a:picLocks noChangeAspect="1"/>
-          </p:cNvPicPr>
-          <p:nvPr/>
-        </p:nvPicPr>
-        <p:blipFill rotWithShape="1">
-          <a:blip r:embed="rId2"/>
-          <a:srcRect t="1334" b="11028"/>
-          <a:stretch/>
-        </p:blipFill>
-        <p:spPr>
-          <a:xfrm>
-            <a:off x="-32" y="10"/>
-            <a:ext cx="12192031" cy="4915066"/>
-          </a:xfrm>
-          <a:prstGeom prst="rect">
-            <a:avLst/>
-          </a:prstGeom>
-        </p:spPr>
-      </p:pic>
-      <p:sp>
-        <p:nvSpPr>
-          <p:cNvPr id="15" name="Rectangle 14">
-            <a:extLst>
-              <a:ext uri="{FF2B5EF4-FFF2-40B4-BE49-F238E27FC236}">
-                <a16:creationId xmlns:a16="http://schemas.microsoft.com/office/drawing/2014/main" id="{54BFABF9-7D43-458F-B85F-04FF279ACB81}"/>
-              </a:ext>
-              <a:ext uri="{C183D7F6-B498-43B3-948B-1728B52AA6E4}">
-                <adec:decorative xmlns:adec="http://schemas.microsoft.com/office/drawing/2017/decorative" val="1"/>
-              </a:ext>
-            </a:extLst>
-          </p:cNvPr>
-          <p:cNvSpPr>
-            <a:spLocks noGrp="1" noRot="1" noChangeAspect="1" noMove="1" noResize="1" noEditPoints="1" noAdjustHandles="1" noChangeArrowheads="1" noChangeShapeType="1" noTextEdit="1"/>
-          </p:cNvSpPr>
-          <p:nvPr>
-            <p:extLst>
-              <p:ext uri="{386F3935-93C4-4BCD-93E2-E3B085C9AB24}">
-                <p16:designElem xmlns:p16="http://schemas.microsoft.com/office/powerpoint/2015/main" val="1"/>
-              </p:ext>
-            </p:extLst>
-          </p:nvPr>
-        </p:nvSpPr>
-        <p:spPr bwMode="white">
-          <a:xfrm>
-            <a:off x="1507" y="4953000"/>
-            <a:ext cx="12188952" cy="1905000"/>
-          </a:xfrm>
-          <a:prstGeom prst="rect">
-            <a:avLst/>
-          </a:prstGeom>
-          <a:solidFill>
-            <a:schemeClr val="accent1">
-              <a:lumMod val="75000"/>
-            </a:schemeClr>
-          </a:solidFill>
-          <a:ln>
-            <a:noFill/>
-          </a:ln>
-        </p:spPr>
-        <p:style>
-          <a:lnRef idx="2">
-            <a:schemeClr val="accent1">
-              <a:shade val="50000"/>
-            </a:schemeClr>
-          </a:lnRef>
-          <a:fillRef idx="1">
-            <a:schemeClr val="accent1"/>
-          </a:fillRef>
-          <a:effectRef idx="0">
-            <a:schemeClr val="accent1"/>
-          </a:effectRef>
-          <a:fontRef idx="minor">
-            <a:schemeClr val="lt1"/>
-          </a:fontRef>
-        </p:style>
-      </p:sp>
-      <p:sp>
-        <p:nvSpPr>
-          <p:cNvPr id="2" name="Title 1">
-            <a:extLst>
-              <a:ext uri="{FF2B5EF4-FFF2-40B4-BE49-F238E27FC236}">
-                <a16:creationId xmlns:a16="http://schemas.microsoft.com/office/drawing/2014/main" id="{63950B4F-5F45-4EFE-877F-E487E96E3B06}"/>
-              </a:ext>
-            </a:extLst>
-          </p:cNvPr>
-          <p:cNvSpPr>
-            <a:spLocks noGrp="1"/>
-          </p:cNvSpPr>
-          <p:nvPr>
-            <p:ph type="title"/>
-          </p:nvPr>
-        </p:nvSpPr>
-        <p:spPr>
-          <a:xfrm>
-            <a:off x="1065197" y="5120640"/>
-            <a:ext cx="10058400" cy="822960"/>
-          </a:xfrm>
-        </p:spPr>
-        <p:txBody>
-          <a:bodyPr vert="horz" lIns="91440" tIns="45720" rIns="91440" bIns="45720" rtlCol="0" anchor="b">
-            <a:normAutofit/>
-          </a:bodyPr>
-          <a:lstStyle/>
-          <a:p>
-            <a:r>
-              <a:rPr lang="en-US" sz="3600">
-                <a:solidFill>
-                  <a:srgbClr val="FFFFFF"/>
-                </a:solidFill>
-              </a:rPr>
-              <a:t>Controllers and Actions : Routing</a:t>
-            </a:r>
-          </a:p>
-        </p:txBody>
-      </p:sp>
-      <p:sp>
-        <p:nvSpPr>
-          <p:cNvPr id="17" name="Rectangle 16">
-            <a:extLst>
-              <a:ext uri="{FF2B5EF4-FFF2-40B4-BE49-F238E27FC236}">
-                <a16:creationId xmlns:a16="http://schemas.microsoft.com/office/drawing/2014/main" id="{72E64342-BCC2-4FB3-B9DC-14B19B5D7E2B}"/>
-              </a:ext>
-              <a:ext uri="{C183D7F6-B498-43B3-948B-1728B52AA6E4}">
-                <adec:decorative xmlns:adec="http://schemas.microsoft.com/office/drawing/2017/decorative" val="1"/>
-              </a:ext>
-            </a:extLst>
-          </p:cNvPr>
-          <p:cNvSpPr>
-            <a:spLocks noGrp="1" noRot="1" noChangeAspect="1" noMove="1" noResize="1" noEditPoints="1" noAdjustHandles="1" noChangeArrowheads="1" noChangeShapeType="1" noTextEdit="1"/>
-          </p:cNvSpPr>
-          <p:nvPr>
-            <p:extLst>
-              <p:ext uri="{386F3935-93C4-4BCD-93E2-E3B085C9AB24}">
-                <p16:designElem xmlns:p16="http://schemas.microsoft.com/office/powerpoint/2015/main" val="1"/>
-              </p:ext>
-            </p:extLst>
-          </p:nvPr>
-        </p:nvSpPr>
-        <p:spPr>
-          <a:xfrm>
-            <a:off x="1507" y="4906176"/>
-            <a:ext cx="12188952" cy="64008"/>
-          </a:xfrm>
-          <a:prstGeom prst="rect">
-            <a:avLst/>
-          </a:prstGeom>
-          <a:solidFill>
-            <a:schemeClr val="accent1"/>
-          </a:solidFill>
-          <a:ln>
-            <a:noFill/>
-          </a:ln>
-        </p:spPr>
-        <p:style>
-          <a:lnRef idx="2">
-            <a:schemeClr val="accent1">
-              <a:shade val="50000"/>
-            </a:schemeClr>
-          </a:lnRef>
-          <a:fillRef idx="1">
-            <a:schemeClr val="accent1"/>
-          </a:fillRef>
-          <a:effectRef idx="0">
-            <a:schemeClr val="accent1"/>
-          </a:effectRef>
-          <a:fontRef idx="minor">
-            <a:schemeClr val="lt1"/>
-          </a:fontRef>
-        </p:style>
-      </p:sp>
-    </p:spTree>
-    <p:extLst>
-      <p:ext uri="{BB962C8B-B14F-4D97-AF65-F5344CB8AC3E}">
-        <p14:creationId xmlns:p14="http://schemas.microsoft.com/office/powerpoint/2010/main" val="4024183203"/>
-      </p:ext>
-    </p:extLst>
-  </p:cSld>
-  <p:clrMapOvr>
-    <a:masterClrMapping/>
-  </p:clrMapOvr>
-</p:sld>
-</file>
-
-<file path=ppt/slides/slide14.xml><?xml version="1.0" encoding="utf-8"?>
-<p:sld xmlns:a="http://schemas.openxmlformats.org/drawingml/2006/main" xmlns:r="http://schemas.openxmlformats.org/officeDocument/2006/relationships" xmlns:p="http://schemas.openxmlformats.org/presentationml/2006/main">
-  <p:cSld>
-    <p:bg>
-      <p:bgPr>
-        <a:solidFill>
-          <a:schemeClr val="bg1">
-            <a:lumMod val="75000"/>
-            <a:lumOff val="25000"/>
-          </a:schemeClr>
-        </a:solidFill>
-        <a:effectLst/>
-      </p:bgPr>
-    </p:bg>
-    <p:spTree>
-      <p:nvGrpSpPr>
-        <p:cNvPr id="1" name=""/>
-        <p:cNvGrpSpPr/>
-        <p:nvPr/>
-      </p:nvGrpSpPr>
-      <p:grpSpPr>
-        <a:xfrm>
-          <a:off x="0" y="0"/>
-          <a:ext cx="0" cy="0"/>
-          <a:chOff x="0" y="0"/>
-          <a:chExt cx="0" cy="0"/>
-        </a:xfrm>
-      </p:grpSpPr>
-      <p:sp>
-        <p:nvSpPr>
-          <p:cNvPr id="10" name="Rectangle 9">
-            <a:extLst>
-              <a:ext uri="{FF2B5EF4-FFF2-40B4-BE49-F238E27FC236}">
-                <a16:creationId xmlns:a16="http://schemas.microsoft.com/office/drawing/2014/main" id="{36E6FEC8-170C-492C-84E0-54394629D120}"/>
-              </a:ext>
-              <a:ext uri="{C183D7F6-B498-43B3-948B-1728B52AA6E4}">
-                <adec:decorative xmlns:adec="http://schemas.microsoft.com/office/drawing/2017/decorative" val="1"/>
-              </a:ext>
-            </a:extLst>
-          </p:cNvPr>
-          <p:cNvSpPr>
-            <a:spLocks noGrp="1" noRot="1" noChangeAspect="1" noMove="1" noResize="1" noEditPoints="1" noAdjustHandles="1" noChangeArrowheads="1" noChangeShapeType="1" noTextEdit="1"/>
-          </p:cNvSpPr>
-          <p:nvPr>
-            <p:extLst>
-              <p:ext uri="{386F3935-93C4-4BCD-93E2-E3B085C9AB24}">
-                <p16:designElem xmlns:p16="http://schemas.microsoft.com/office/powerpoint/2015/main" val="1"/>
-              </p:ext>
-            </p:extLst>
-          </p:nvPr>
-        </p:nvSpPr>
-        <p:spPr>
-          <a:xfrm>
-            <a:off x="3175" y="6400800"/>
-            <a:ext cx="12188825" cy="457200"/>
-          </a:xfrm>
-          <a:prstGeom prst="rect">
-            <a:avLst/>
-          </a:prstGeom>
-          <a:solidFill>
-            <a:schemeClr val="accent1">
-              <a:lumMod val="75000"/>
-            </a:schemeClr>
-          </a:solidFill>
-          <a:ln>
-            <a:noFill/>
-          </a:ln>
-        </p:spPr>
-        <p:style>
-          <a:lnRef idx="2">
-            <a:schemeClr val="accent1">
-              <a:shade val="50000"/>
-            </a:schemeClr>
-          </a:lnRef>
-          <a:fillRef idx="1">
-            <a:schemeClr val="accent1"/>
-          </a:fillRef>
-          <a:effectRef idx="0">
-            <a:schemeClr val="accent1"/>
-          </a:effectRef>
-          <a:fontRef idx="minor">
-            <a:schemeClr val="lt1"/>
-          </a:fontRef>
-        </p:style>
-      </p:sp>
-      <p:sp>
-        <p:nvSpPr>
-          <p:cNvPr id="12" name="Rectangle 11">
-            <a:extLst>
-              <a:ext uri="{FF2B5EF4-FFF2-40B4-BE49-F238E27FC236}">
-                <a16:creationId xmlns:a16="http://schemas.microsoft.com/office/drawing/2014/main" id="{DEE940A1-B9E0-4C5D-A55E-B19742379C83}"/>
-              </a:ext>
-              <a:ext uri="{C183D7F6-B498-43B3-948B-1728B52AA6E4}">
-                <adec:decorative xmlns:adec="http://schemas.microsoft.com/office/drawing/2017/decorative" val="1"/>
-              </a:ext>
-            </a:extLst>
-          </p:cNvPr>
-          <p:cNvSpPr>
-            <a:spLocks noGrp="1" noRot="1" noChangeAspect="1" noMove="1" noResize="1" noEditPoints="1" noAdjustHandles="1" noChangeArrowheads="1" noChangeShapeType="1" noTextEdit="1"/>
-          </p:cNvSpPr>
-          <p:nvPr>
-            <p:extLst>
-              <p:ext uri="{386F3935-93C4-4BCD-93E2-E3B085C9AB24}">
-                <p16:designElem xmlns:p16="http://schemas.microsoft.com/office/powerpoint/2015/main" val="1"/>
-              </p:ext>
-            </p:extLst>
-          </p:nvPr>
-        </p:nvSpPr>
-        <p:spPr>
-          <a:xfrm>
-            <a:off x="15" y="6334316"/>
-            <a:ext cx="12188825" cy="64008"/>
-          </a:xfrm>
-          <a:prstGeom prst="rect">
-            <a:avLst/>
-          </a:prstGeom>
-          <a:solidFill>
-            <a:schemeClr val="accent1"/>
-          </a:solidFill>
-          <a:ln>
-            <a:noFill/>
-          </a:ln>
-        </p:spPr>
-        <p:style>
-          <a:lnRef idx="2">
-            <a:schemeClr val="accent1">
-              <a:shade val="50000"/>
-            </a:schemeClr>
-          </a:lnRef>
-          <a:fillRef idx="1">
-            <a:schemeClr val="accent1"/>
-          </a:fillRef>
-          <a:effectRef idx="0">
-            <a:schemeClr val="accent1"/>
-          </a:effectRef>
-          <a:fontRef idx="minor">
-            <a:schemeClr val="lt1"/>
-          </a:fontRef>
-        </p:style>
-      </p:sp>
-      <p:cxnSp>
-        <p:nvCxnSpPr>
-          <p:cNvPr id="14" name="Straight Connector 13">
-            <a:extLst>
-              <a:ext uri="{FF2B5EF4-FFF2-40B4-BE49-F238E27FC236}">
-                <a16:creationId xmlns:a16="http://schemas.microsoft.com/office/drawing/2014/main" id="{81C8E47B-A563-4B44-A9B0-9316605C2E4E}"/>
-              </a:ext>
-              <a:ext uri="{C183D7F6-B498-43B3-948B-1728B52AA6E4}">
-                <adec:decorative xmlns:adec="http://schemas.microsoft.com/office/drawing/2017/decorative" val="1"/>
-              </a:ext>
-            </a:extLst>
-          </p:cNvPr>
-          <p:cNvCxnSpPr>
-            <a:cxnSpLocks noGrp="1" noRot="1" noChangeAspect="1" noMove="1" noResize="1" noEditPoints="1" noAdjustHandles="1" noChangeArrowheads="1" noChangeShapeType="1"/>
-          </p:cNvCxnSpPr>
-          <p:nvPr>
-            <p:extLst>
-              <p:ext uri="{386F3935-93C4-4BCD-93E2-E3B085C9AB24}">
-                <p16:designElem xmlns:p16="http://schemas.microsoft.com/office/powerpoint/2015/main" val="1"/>
-              </p:ext>
-            </p:extLst>
-          </p:nvPr>
-        </p:nvCxnSpPr>
-        <p:spPr>
-          <a:xfrm>
-            <a:off x="1207658" y="4343400"/>
-            <a:ext cx="9875520" cy="0"/>
-          </a:xfrm>
-          <a:prstGeom prst="line">
-            <a:avLst/>
-          </a:prstGeom>
-          <a:ln w="6350">
-            <a:solidFill>
-              <a:schemeClr val="tx1">
-                <a:lumMod val="50000"/>
-                <a:lumOff val="50000"/>
-              </a:schemeClr>
-            </a:solidFill>
-          </a:ln>
-        </p:spPr>
-        <p:style>
-          <a:lnRef idx="1">
-            <a:schemeClr val="accent1"/>
-          </a:lnRef>
-          <a:fillRef idx="0">
-            <a:schemeClr val="accent1"/>
-          </a:fillRef>
-          <a:effectRef idx="0">
-            <a:schemeClr val="accent1"/>
-          </a:effectRef>
-          <a:fontRef idx="minor">
-            <a:schemeClr val="tx1"/>
-          </a:fontRef>
-        </p:style>
-      </p:cxnSp>
-      <p:sp>
-        <p:nvSpPr>
-          <p:cNvPr id="16" name="Rectangle 15">
-            <a:extLst>
-              <a:ext uri="{FF2B5EF4-FFF2-40B4-BE49-F238E27FC236}">
-                <a16:creationId xmlns:a16="http://schemas.microsoft.com/office/drawing/2014/main" id="{89CEF278-62C5-49CA-8BD9-BCDBE9977FF3}"/>
-              </a:ext>
-              <a:ext uri="{C183D7F6-B498-43B3-948B-1728B52AA6E4}">
-                <adec:decorative xmlns:adec="http://schemas.microsoft.com/office/drawing/2017/decorative" val="1"/>
-              </a:ext>
-            </a:extLst>
-          </p:cNvPr>
-          <p:cNvSpPr>
-            <a:spLocks noGrp="1" noRot="1" noChangeAspect="1" noMove="1" noResize="1" noEditPoints="1" noAdjustHandles="1" noChangeArrowheads="1" noChangeShapeType="1" noTextEdit="1"/>
-          </p:cNvSpPr>
-          <p:nvPr>
-            <p:extLst>
-              <p:ext uri="{386F3935-93C4-4BCD-93E2-E3B085C9AB24}">
-                <p16:designElem xmlns:p16="http://schemas.microsoft.com/office/powerpoint/2015/main" val="1"/>
-              </p:ext>
-            </p:extLst>
-          </p:nvPr>
-        </p:nvSpPr>
-        <p:spPr bwMode="white">
-          <a:xfrm>
-            <a:off x="16" y="0"/>
-            <a:ext cx="4584734" cy="6858000"/>
-          </a:xfrm>
-          <a:prstGeom prst="rect">
-            <a:avLst/>
-          </a:prstGeom>
-          <a:solidFill>
-            <a:schemeClr val="accent1">
-              <a:lumMod val="75000"/>
-            </a:schemeClr>
-          </a:solidFill>
-          <a:ln>
-            <a:noFill/>
-          </a:ln>
-        </p:spPr>
-        <p:style>
-          <a:lnRef idx="2">
-            <a:schemeClr val="accent1">
-              <a:shade val="50000"/>
-            </a:schemeClr>
-          </a:lnRef>
-          <a:fillRef idx="1">
-            <a:schemeClr val="accent1"/>
-          </a:fillRef>
-          <a:effectRef idx="0">
-            <a:schemeClr val="accent1"/>
-          </a:effectRef>
-          <a:fontRef idx="minor">
-            <a:schemeClr val="lt1"/>
-          </a:fontRef>
-        </p:style>
-      </p:sp>
-      <p:sp>
-        <p:nvSpPr>
-          <p:cNvPr id="2" name="Title 1">
-            <a:extLst>
-              <a:ext uri="{FF2B5EF4-FFF2-40B4-BE49-F238E27FC236}">
-                <a16:creationId xmlns:a16="http://schemas.microsoft.com/office/drawing/2014/main" id="{63950B4F-5F45-4EFE-877F-E487E96E3B06}"/>
-              </a:ext>
-            </a:extLst>
-          </p:cNvPr>
-          <p:cNvSpPr>
-            <a:spLocks noGrp="1"/>
-          </p:cNvSpPr>
-          <p:nvPr>
-            <p:ph type="title"/>
-          </p:nvPr>
-        </p:nvSpPr>
-        <p:spPr>
-          <a:xfrm>
-            <a:off x="457200" y="640080"/>
-            <a:ext cx="3659246" cy="2926080"/>
-          </a:xfrm>
-        </p:spPr>
-        <p:txBody>
-          <a:bodyPr vert="horz" lIns="91440" tIns="45720" rIns="91440" bIns="45720" rtlCol="0" anchor="b">
-            <a:normAutofit/>
-          </a:bodyPr>
-          <a:lstStyle/>
-          <a:p>
-            <a:r>
-              <a:rPr lang="en-US" sz="4400">
-                <a:solidFill>
-                  <a:srgbClr val="FFFFFF"/>
-                </a:solidFill>
-              </a:rPr>
-              <a:t>Controllers and Actions: HTTP Verbs</a:t>
-            </a:r>
-          </a:p>
-        </p:txBody>
-      </p:sp>
-      <p:pic>
-        <p:nvPicPr>
-          <p:cNvPr id="5" name="Picture 4">
-            <a:extLst>
-              <a:ext uri="{FF2B5EF4-FFF2-40B4-BE49-F238E27FC236}">
-                <a16:creationId xmlns:a16="http://schemas.microsoft.com/office/drawing/2014/main" id="{12E7A4C0-D4FF-473E-BD1A-2D16A2D1B7C0}"/>
-              </a:ext>
-            </a:extLst>
-          </p:cNvPr>
-          <p:cNvPicPr>
-            <a:picLocks noChangeAspect="1"/>
-          </p:cNvPicPr>
-          <p:nvPr/>
-        </p:nvPicPr>
-        <p:blipFill rotWithShape="1">
-          <a:blip r:embed="rId2"/>
-          <a:srcRect r="34202" b="2"/>
-          <a:stretch/>
-        </p:blipFill>
-        <p:spPr>
-          <a:xfrm>
-            <a:off x="4639733" y="10"/>
-            <a:ext cx="7552266" cy="6857990"/>
-          </a:xfrm>
-          <a:prstGeom prst="rect">
-            <a:avLst/>
-          </a:prstGeom>
-        </p:spPr>
-      </p:pic>
-      <p:sp>
-        <p:nvSpPr>
-          <p:cNvPr id="18" name="Rectangle 17">
-            <a:extLst>
-              <a:ext uri="{FF2B5EF4-FFF2-40B4-BE49-F238E27FC236}">
-                <a16:creationId xmlns:a16="http://schemas.microsoft.com/office/drawing/2014/main" id="{02E2466B-276C-423A-9377-78508D6A0764}"/>
-              </a:ext>
-              <a:ext uri="{C183D7F6-B498-43B3-948B-1728B52AA6E4}">
-                <adec:decorative xmlns:adec="http://schemas.microsoft.com/office/drawing/2017/decorative" val="1"/>
-              </a:ext>
-            </a:extLst>
-          </p:cNvPr>
-          <p:cNvSpPr>
-            <a:spLocks noGrp="1" noRot="1" noChangeAspect="1" noMove="1" noResize="1" noEditPoints="1" noAdjustHandles="1" noChangeArrowheads="1" noChangeShapeType="1" noTextEdit="1"/>
-          </p:cNvSpPr>
-          <p:nvPr>
-            <p:extLst>
-              <p:ext uri="{386F3935-93C4-4BCD-93E2-E3B085C9AB24}">
-                <p16:designElem xmlns:p16="http://schemas.microsoft.com/office/powerpoint/2015/main" val="1"/>
-              </p:ext>
-            </p:extLst>
-          </p:nvPr>
-        </p:nvSpPr>
-        <p:spPr>
-          <a:xfrm>
-            <a:off x="4584751" y="0"/>
-            <a:ext cx="64008" cy="6858000"/>
-          </a:xfrm>
-          <a:prstGeom prst="rect">
-            <a:avLst/>
-          </a:prstGeom>
-          <a:solidFill>
-            <a:schemeClr val="accent1"/>
-          </a:solidFill>
-          <a:ln>
-            <a:noFill/>
-          </a:ln>
-        </p:spPr>
-        <p:style>
-          <a:lnRef idx="2">
-            <a:schemeClr val="accent1">
-              <a:shade val="50000"/>
-            </a:schemeClr>
-          </a:lnRef>
-          <a:fillRef idx="1">
-            <a:schemeClr val="accent1"/>
-          </a:fillRef>
-          <a:effectRef idx="0">
-            <a:schemeClr val="accent1"/>
-          </a:effectRef>
-          <a:fontRef idx="minor">
-            <a:schemeClr val="lt1"/>
-          </a:fontRef>
-        </p:style>
-      </p:sp>
-    </p:spTree>
-    <p:extLst>
-      <p:ext uri="{BB962C8B-B14F-4D97-AF65-F5344CB8AC3E}">
-        <p14:creationId xmlns:p14="http://schemas.microsoft.com/office/powerpoint/2010/main" val="875478547"/>
-      </p:ext>
-    </p:extLst>
-  </p:cSld>
-  <p:clrMapOvr>
-    <a:masterClrMapping/>
-  </p:clrMapOvr>
-  <p:timing>
-    <p:tnLst>
-      <p:par>
-        <p:cTn id="1" dur="indefinite" restart="never" nodeType="tmRoot">
-          <p:childTnLst>
-            <p:seq concurrent="1" nextAc="seek">
-              <p:cTn id="2" dur="indefinite" nodeType="mainSeq">
-                <p:childTnLst>
-                  <p:par>
-                    <p:cTn id="3" fill="hold">
-                      <p:stCondLst>
-                        <p:cond delay="indefinite"/>
-                        <p:cond evt="onBegin" delay="0">
-                          <p:tn val="2"/>
-                        </p:cond>
-                      </p:stCondLst>
-                      <p:childTnLst>
-                        <p:par>
-                          <p:cTn id="4" fill="hold">
-                            <p:stCondLst>
-                              <p:cond delay="0"/>
-                            </p:stCondLst>
-                            <p:childTnLst>
-                              <p:par>
-                                <p:cTn id="5" presetID="10" presetClass="entr" presetSubtype="0" fill="hold" grpId="0" nodeType="withEffect">
-                                  <p:stCondLst>
-                                    <p:cond delay="1000"/>
-                                  </p:stCondLst>
-                                  <p:iterate type="lt">
-                                    <p:tmPct val="10000"/>
-                                  </p:iterate>
-                                  <p:childTnLst>
-                                    <p:set>
-                                      <p:cBhvr>
-                                        <p:cTn id="6" dur="1" fill="hold">
-                                          <p:stCondLst>
-                                            <p:cond delay="0"/>
-                                          </p:stCondLst>
-                                        </p:cTn>
-                                        <p:tgtEl>
-                                          <p:spTgt spid="2"/>
-                                        </p:tgtEl>
-                                        <p:attrNameLst>
-                                          <p:attrName>style.visibility</p:attrName>
-                                        </p:attrNameLst>
-                                      </p:cBhvr>
-                                      <p:to>
-                                        <p:strVal val="visible"/>
-                                      </p:to>
-                                    </p:set>
-                                    <p:animEffect transition="in" filter="fade">
-                                      <p:cBhvr>
-                                        <p:cTn id="7" dur="400"/>
-                                        <p:tgtEl>
-                                          <p:spTgt spid="2"/>
-                                        </p:tgtEl>
-                                      </p:cBhvr>
-                                    </p:animEffect>
-                                  </p:childTnLst>
-                                </p:cTn>
-                              </p:par>
-                            </p:childTnLst>
-                          </p:cTn>
-                        </p:par>
-                      </p:childTnLst>
-                    </p:cTn>
-                  </p:par>
-                </p:childTnLst>
-              </p:cTn>
-              <p:prevCondLst>
-                <p:cond evt="onPrev" delay="0">
-                  <p:tgtEl>
-                    <p:sldTgt/>
-                  </p:tgtEl>
-                </p:cond>
-              </p:prevCondLst>
-              <p:nextCondLst>
-                <p:cond evt="onNext" delay="0">
-                  <p:tgtEl>
-                    <p:sldTgt/>
-                  </p:tgtEl>
-                </p:cond>
-              </p:nextCondLst>
-            </p:seq>
-          </p:childTnLst>
-        </p:cTn>
-      </p:par>
-    </p:tnLst>
-    <p:bldLst>
-      <p:bldP spid="2" grpId="0"/>
-    </p:bldLst>
-  </p:timing>
-</p:sld>
-</file>
-
-<file path=ppt/slides/slide15.xml><?xml version="1.0" encoding="utf-8"?>
-<p:sld xmlns:a="http://schemas.openxmlformats.org/drawingml/2006/main" xmlns:r="http://schemas.openxmlformats.org/officeDocument/2006/relationships" xmlns:p="http://schemas.openxmlformats.org/presentationml/2006/main">
-  <p:cSld>
-    <p:bg>
-      <p:bgPr>
-        <a:solidFill>
-          <a:schemeClr val="bg1">
-            <a:lumMod val="75000"/>
-            <a:lumOff val="25000"/>
-          </a:schemeClr>
-        </a:solidFill>
-        <a:effectLst/>
-      </p:bgPr>
-    </p:bg>
-    <p:spTree>
-      <p:nvGrpSpPr>
-        <p:cNvPr id="1" name=""/>
-        <p:cNvGrpSpPr/>
-        <p:nvPr/>
-      </p:nvGrpSpPr>
-      <p:grpSpPr>
-        <a:xfrm>
-          <a:off x="0" y="0"/>
-          <a:ext cx="0" cy="0"/>
-          <a:chOff x="0" y="0"/>
-          <a:chExt cx="0" cy="0"/>
-        </a:xfrm>
-      </p:grpSpPr>
-      <p:sp>
-        <p:nvSpPr>
-          <p:cNvPr id="20" name="Rectangle 9">
-            <a:extLst>
-              <a:ext uri="{FF2B5EF4-FFF2-40B4-BE49-F238E27FC236}">
-                <a16:creationId xmlns:a16="http://schemas.microsoft.com/office/drawing/2014/main" id="{36E6FEC8-170C-492C-84E0-54394629D120}"/>
-              </a:ext>
-              <a:ext uri="{C183D7F6-B498-43B3-948B-1728B52AA6E4}">
-                <adec:decorative xmlns:adec="http://schemas.microsoft.com/office/drawing/2017/decorative" val="1"/>
-              </a:ext>
-            </a:extLst>
-          </p:cNvPr>
-          <p:cNvSpPr>
-            <a:spLocks noGrp="1" noRot="1" noChangeAspect="1" noMove="1" noResize="1" noEditPoints="1" noAdjustHandles="1" noChangeArrowheads="1" noChangeShapeType="1" noTextEdit="1"/>
-          </p:cNvSpPr>
-          <p:nvPr>
-            <p:extLst>
-              <p:ext uri="{386F3935-93C4-4BCD-93E2-E3B085C9AB24}">
-                <p16:designElem xmlns:p16="http://schemas.microsoft.com/office/powerpoint/2015/main" val="1"/>
-              </p:ext>
-            </p:extLst>
-          </p:nvPr>
-        </p:nvSpPr>
-        <p:spPr>
-          <a:xfrm>
-            <a:off x="3175" y="6400800"/>
-            <a:ext cx="12188825" cy="457200"/>
-          </a:xfrm>
-          <a:prstGeom prst="rect">
-            <a:avLst/>
-          </a:prstGeom>
-          <a:solidFill>
-            <a:schemeClr val="accent1">
-              <a:lumMod val="75000"/>
-            </a:schemeClr>
-          </a:solidFill>
-          <a:ln>
-            <a:noFill/>
-          </a:ln>
-        </p:spPr>
-        <p:style>
-          <a:lnRef idx="2">
-            <a:schemeClr val="accent1">
-              <a:shade val="50000"/>
-            </a:schemeClr>
-          </a:lnRef>
-          <a:fillRef idx="1">
-            <a:schemeClr val="accent1"/>
-          </a:fillRef>
-          <a:effectRef idx="0">
-            <a:schemeClr val="accent1"/>
-          </a:effectRef>
-          <a:fontRef idx="minor">
-            <a:schemeClr val="lt1"/>
-          </a:fontRef>
-        </p:style>
-      </p:sp>
-      <p:sp>
-        <p:nvSpPr>
-          <p:cNvPr id="21" name="Rectangle 11">
-            <a:extLst>
-              <a:ext uri="{FF2B5EF4-FFF2-40B4-BE49-F238E27FC236}">
-                <a16:creationId xmlns:a16="http://schemas.microsoft.com/office/drawing/2014/main" id="{DEE940A1-B9E0-4C5D-A55E-B19742379C83}"/>
-              </a:ext>
-              <a:ext uri="{C183D7F6-B498-43B3-948B-1728B52AA6E4}">
-                <adec:decorative xmlns:adec="http://schemas.microsoft.com/office/drawing/2017/decorative" val="1"/>
-              </a:ext>
-            </a:extLst>
-          </p:cNvPr>
-          <p:cNvSpPr>
-            <a:spLocks noGrp="1" noRot="1" noChangeAspect="1" noMove="1" noResize="1" noEditPoints="1" noAdjustHandles="1" noChangeArrowheads="1" noChangeShapeType="1" noTextEdit="1"/>
-          </p:cNvSpPr>
-          <p:nvPr>
-            <p:extLst>
-              <p:ext uri="{386F3935-93C4-4BCD-93E2-E3B085C9AB24}">
-                <p16:designElem xmlns:p16="http://schemas.microsoft.com/office/powerpoint/2015/main" val="1"/>
-              </p:ext>
-            </p:extLst>
-          </p:nvPr>
-        </p:nvSpPr>
-        <p:spPr>
-          <a:xfrm>
-            <a:off x="15" y="6334316"/>
-            <a:ext cx="12188825" cy="64008"/>
-          </a:xfrm>
-          <a:prstGeom prst="rect">
-            <a:avLst/>
-          </a:prstGeom>
-          <a:solidFill>
-            <a:schemeClr val="accent1"/>
-          </a:solidFill>
-          <a:ln>
-            <a:noFill/>
-          </a:ln>
-        </p:spPr>
-        <p:style>
-          <a:lnRef idx="2">
-            <a:schemeClr val="accent1">
-              <a:shade val="50000"/>
-            </a:schemeClr>
-          </a:lnRef>
-          <a:fillRef idx="1">
-            <a:schemeClr val="accent1"/>
-          </a:fillRef>
-          <a:effectRef idx="0">
-            <a:schemeClr val="accent1"/>
-          </a:effectRef>
-          <a:fontRef idx="minor">
-            <a:schemeClr val="lt1"/>
-          </a:fontRef>
-        </p:style>
-      </p:sp>
-      <p:cxnSp>
-        <p:nvCxnSpPr>
-          <p:cNvPr id="22" name="Straight Connector 13">
-            <a:extLst>
-              <a:ext uri="{FF2B5EF4-FFF2-40B4-BE49-F238E27FC236}">
-                <a16:creationId xmlns:a16="http://schemas.microsoft.com/office/drawing/2014/main" id="{81C8E47B-A563-4B44-A9B0-9316605C2E4E}"/>
-              </a:ext>
-              <a:ext uri="{C183D7F6-B498-43B3-948B-1728B52AA6E4}">
-                <adec:decorative xmlns:adec="http://schemas.microsoft.com/office/drawing/2017/decorative" val="1"/>
-              </a:ext>
-            </a:extLst>
-          </p:cNvPr>
-          <p:cNvCxnSpPr>
-            <a:cxnSpLocks noGrp="1" noRot="1" noChangeAspect="1" noMove="1" noResize="1" noEditPoints="1" noAdjustHandles="1" noChangeArrowheads="1" noChangeShapeType="1"/>
-          </p:cNvCxnSpPr>
-          <p:nvPr>
-            <p:extLst>
-              <p:ext uri="{386F3935-93C4-4BCD-93E2-E3B085C9AB24}">
-                <p16:designElem xmlns:p16="http://schemas.microsoft.com/office/powerpoint/2015/main" val="1"/>
-              </p:ext>
-            </p:extLst>
-          </p:nvPr>
-        </p:nvCxnSpPr>
-        <p:spPr>
-          <a:xfrm>
-            <a:off x="1207658" y="4343400"/>
-            <a:ext cx="9875520" cy="0"/>
-          </a:xfrm>
-          <a:prstGeom prst="line">
-            <a:avLst/>
-          </a:prstGeom>
-          <a:ln w="6350">
-            <a:solidFill>
-              <a:schemeClr val="tx1">
-                <a:lumMod val="50000"/>
-                <a:lumOff val="50000"/>
-              </a:schemeClr>
-            </a:solidFill>
-          </a:ln>
-        </p:spPr>
-        <p:style>
-          <a:lnRef idx="1">
-            <a:schemeClr val="accent1"/>
-          </a:lnRef>
-          <a:fillRef idx="0">
-            <a:schemeClr val="accent1"/>
-          </a:fillRef>
-          <a:effectRef idx="0">
-            <a:schemeClr val="accent1"/>
-          </a:effectRef>
-          <a:fontRef idx="minor">
-            <a:schemeClr val="tx1"/>
-          </a:fontRef>
-        </p:style>
-      </p:cxnSp>
-      <p:pic>
-        <p:nvPicPr>
-          <p:cNvPr id="5" name="Picture 4">
-            <a:extLst>
-              <a:ext uri="{FF2B5EF4-FFF2-40B4-BE49-F238E27FC236}">
-                <a16:creationId xmlns:a16="http://schemas.microsoft.com/office/drawing/2014/main" id="{9B532AAF-7E8D-4F3B-AA22-6BA9F2F71976}"/>
-              </a:ext>
-            </a:extLst>
-          </p:cNvPr>
-          <p:cNvPicPr>
-            <a:picLocks noChangeAspect="1"/>
-          </p:cNvPicPr>
-          <p:nvPr/>
-        </p:nvPicPr>
-        <p:blipFill rotWithShape="1">
-          <a:blip r:embed="rId2"/>
-          <a:srcRect t="32529"/>
-          <a:stretch/>
-        </p:blipFill>
-        <p:spPr>
-          <a:xfrm>
-            <a:off x="-32" y="10"/>
-            <a:ext cx="12192031" cy="4915066"/>
-          </a:xfrm>
-          <a:prstGeom prst="rect">
-            <a:avLst/>
-          </a:prstGeom>
-        </p:spPr>
-      </p:pic>
-      <p:sp>
-        <p:nvSpPr>
-          <p:cNvPr id="23" name="Rectangle 15">
-            <a:extLst>
-              <a:ext uri="{FF2B5EF4-FFF2-40B4-BE49-F238E27FC236}">
-                <a16:creationId xmlns:a16="http://schemas.microsoft.com/office/drawing/2014/main" id="{54BFABF9-7D43-458F-B85F-04FF279ACB81}"/>
-              </a:ext>
-              <a:ext uri="{C183D7F6-B498-43B3-948B-1728B52AA6E4}">
-                <adec:decorative xmlns:adec="http://schemas.microsoft.com/office/drawing/2017/decorative" val="1"/>
-              </a:ext>
-            </a:extLst>
-          </p:cNvPr>
-          <p:cNvSpPr>
-            <a:spLocks noGrp="1" noRot="1" noChangeAspect="1" noMove="1" noResize="1" noEditPoints="1" noAdjustHandles="1" noChangeArrowheads="1" noChangeShapeType="1" noTextEdit="1"/>
-          </p:cNvSpPr>
-          <p:nvPr>
-            <p:extLst>
-              <p:ext uri="{386F3935-93C4-4BCD-93E2-E3B085C9AB24}">
-                <p16:designElem xmlns:p16="http://schemas.microsoft.com/office/powerpoint/2015/main" val="1"/>
-              </p:ext>
-            </p:extLst>
-          </p:nvPr>
-        </p:nvSpPr>
-        <p:spPr bwMode="white">
-          <a:xfrm>
-            <a:off x="1507" y="4953000"/>
-            <a:ext cx="12188952" cy="1905000"/>
-          </a:xfrm>
-          <a:prstGeom prst="rect">
-            <a:avLst/>
-          </a:prstGeom>
-          <a:solidFill>
-            <a:schemeClr val="accent1">
-              <a:lumMod val="75000"/>
-            </a:schemeClr>
-          </a:solidFill>
-          <a:ln>
-            <a:noFill/>
-          </a:ln>
-        </p:spPr>
-        <p:style>
-          <a:lnRef idx="2">
-            <a:schemeClr val="accent1">
-              <a:shade val="50000"/>
-            </a:schemeClr>
-          </a:lnRef>
-          <a:fillRef idx="1">
-            <a:schemeClr val="accent1"/>
-          </a:fillRef>
-          <a:effectRef idx="0">
-            <a:schemeClr val="accent1"/>
-          </a:effectRef>
-          <a:fontRef idx="minor">
-            <a:schemeClr val="lt1"/>
-          </a:fontRef>
-        </p:style>
-      </p:sp>
-      <p:sp>
-        <p:nvSpPr>
-          <p:cNvPr id="2" name="Title 1">
-            <a:extLst>
-              <a:ext uri="{FF2B5EF4-FFF2-40B4-BE49-F238E27FC236}">
-                <a16:creationId xmlns:a16="http://schemas.microsoft.com/office/drawing/2014/main" id="{63950B4F-5F45-4EFE-877F-E487E96E3B06}"/>
-              </a:ext>
-            </a:extLst>
-          </p:cNvPr>
-          <p:cNvSpPr>
-            <a:spLocks noGrp="1"/>
-          </p:cNvSpPr>
-          <p:nvPr>
-            <p:ph type="title"/>
-          </p:nvPr>
-        </p:nvSpPr>
-        <p:spPr>
-          <a:xfrm>
-            <a:off x="1065197" y="5120640"/>
-            <a:ext cx="10058400" cy="822960"/>
-          </a:xfrm>
-        </p:spPr>
-        <p:txBody>
-          <a:bodyPr vert="horz" lIns="91440" tIns="45720" rIns="91440" bIns="45720" rtlCol="0" anchor="b">
-            <a:normAutofit/>
-          </a:bodyPr>
-          <a:lstStyle/>
-          <a:p>
-            <a:r>
-              <a:rPr lang="en-US" sz="3600">
-                <a:solidFill>
-                  <a:srgbClr val="FFFFFF"/>
-                </a:solidFill>
-              </a:rPr>
-              <a:t>Controllers and Actions: Producing and Consuming</a:t>
-            </a:r>
-          </a:p>
-        </p:txBody>
-      </p:sp>
-      <p:sp>
-        <p:nvSpPr>
-          <p:cNvPr id="24" name="Rectangle 17">
-            <a:extLst>
-              <a:ext uri="{FF2B5EF4-FFF2-40B4-BE49-F238E27FC236}">
-                <a16:creationId xmlns:a16="http://schemas.microsoft.com/office/drawing/2014/main" id="{72E64342-BCC2-4FB3-B9DC-14B19B5D7E2B}"/>
-              </a:ext>
-              <a:ext uri="{C183D7F6-B498-43B3-948B-1728B52AA6E4}">
-                <adec:decorative xmlns:adec="http://schemas.microsoft.com/office/drawing/2017/decorative" val="1"/>
-              </a:ext>
-            </a:extLst>
-          </p:cNvPr>
-          <p:cNvSpPr>
-            <a:spLocks noGrp="1" noRot="1" noChangeAspect="1" noMove="1" noResize="1" noEditPoints="1" noAdjustHandles="1" noChangeArrowheads="1" noChangeShapeType="1" noTextEdit="1"/>
-          </p:cNvSpPr>
-          <p:nvPr>
-            <p:extLst>
-              <p:ext uri="{386F3935-93C4-4BCD-93E2-E3B085C9AB24}">
-                <p16:designElem xmlns:p16="http://schemas.microsoft.com/office/powerpoint/2015/main" val="1"/>
-              </p:ext>
-            </p:extLst>
-          </p:nvPr>
-        </p:nvSpPr>
-        <p:spPr>
-          <a:xfrm>
-            <a:off x="1507" y="4906176"/>
-            <a:ext cx="12188952" cy="64008"/>
-          </a:xfrm>
-          <a:prstGeom prst="rect">
-            <a:avLst/>
-          </a:prstGeom>
-          <a:solidFill>
-            <a:schemeClr val="accent1"/>
-          </a:solidFill>
-          <a:ln>
-            <a:noFill/>
-          </a:ln>
-        </p:spPr>
-        <p:style>
-          <a:lnRef idx="2">
-            <a:schemeClr val="accent1">
-              <a:shade val="50000"/>
-            </a:schemeClr>
-          </a:lnRef>
-          <a:fillRef idx="1">
-            <a:schemeClr val="accent1"/>
-          </a:fillRef>
-          <a:effectRef idx="0">
-            <a:schemeClr val="accent1"/>
-          </a:effectRef>
-          <a:fontRef idx="minor">
-            <a:schemeClr val="lt1"/>
-          </a:fontRef>
-        </p:style>
-      </p:sp>
-    </p:spTree>
-    <p:extLst>
-      <p:ext uri="{BB962C8B-B14F-4D97-AF65-F5344CB8AC3E}">
-        <p14:creationId xmlns:p14="http://schemas.microsoft.com/office/powerpoint/2010/main" val="2402502586"/>
-      </p:ext>
-    </p:extLst>
-  </p:cSld>
-  <p:clrMapOvr>
-    <a:masterClrMapping/>
-  </p:clrMapOvr>
-  <p:timing>
-    <p:tnLst>
-      <p:par>
-        <p:cTn id="1" dur="indefinite" restart="never" nodeType="tmRoot">
-          <p:childTnLst>
-            <p:seq concurrent="1" nextAc="seek">
-              <p:cTn id="2" dur="indefinite" nodeType="mainSeq">
-                <p:childTnLst>
-                  <p:par>
-                    <p:cTn id="3" fill="hold">
-                      <p:stCondLst>
-                        <p:cond delay="indefinite"/>
-                        <p:cond evt="onBegin" delay="0">
-                          <p:tn val="2"/>
-                        </p:cond>
-                      </p:stCondLst>
-                      <p:childTnLst>
-                        <p:par>
-                          <p:cTn id="4" fill="hold">
-                            <p:stCondLst>
-                              <p:cond delay="0"/>
-                            </p:stCondLst>
-                            <p:childTnLst>
-                              <p:par>
-                                <p:cTn id="5" presetID="10" presetClass="entr" presetSubtype="0" fill="hold" grpId="0" nodeType="withEffect">
-                                  <p:stCondLst>
-                                    <p:cond delay="1000"/>
-                                  </p:stCondLst>
-                                  <p:iterate>
-                                    <p:tmPct val="10000"/>
-                                  </p:iterate>
-                                  <p:childTnLst>
-                                    <p:set>
-                                      <p:cBhvr>
-                                        <p:cTn id="6" dur="1" fill="hold">
-                                          <p:stCondLst>
-                                            <p:cond delay="0"/>
-                                          </p:stCondLst>
-                                        </p:cTn>
-                                        <p:tgtEl>
-                                          <p:spTgt spid="2"/>
-                                        </p:tgtEl>
-                                        <p:attrNameLst>
-                                          <p:attrName>style.visibility</p:attrName>
-                                        </p:attrNameLst>
-                                      </p:cBhvr>
-                                      <p:to>
-                                        <p:strVal val="visible"/>
-                                      </p:to>
-                                    </p:set>
-                                    <p:animEffect transition="in" filter="fade">
-                                      <p:cBhvr>
-                                        <p:cTn id="7" dur="700"/>
-                                        <p:tgtEl>
-                                          <p:spTgt spid="2"/>
-                                        </p:tgtEl>
-                                      </p:cBhvr>
-                                    </p:animEffect>
-                                  </p:childTnLst>
-                                </p:cTn>
-                              </p:par>
-                            </p:childTnLst>
-                          </p:cTn>
-                        </p:par>
-                      </p:childTnLst>
-                    </p:cTn>
-                  </p:par>
-                </p:childTnLst>
-              </p:cTn>
-              <p:prevCondLst>
-                <p:cond evt="onPrev" delay="0">
-                  <p:tgtEl>
-                    <p:sldTgt/>
-                  </p:tgtEl>
-                </p:cond>
-              </p:prevCondLst>
-              <p:nextCondLst>
-                <p:cond evt="onNext" delay="0">
-                  <p:tgtEl>
-                    <p:sldTgt/>
-                  </p:tgtEl>
-                </p:cond>
-              </p:nextCondLst>
-            </p:seq>
-          </p:childTnLst>
-        </p:cTn>
-      </p:par>
-    </p:tnLst>
-    <p:bldLst>
-      <p:bldP spid="2" grpId="0"/>
-    </p:bldLst>
-  </p:timing>
-</p:sld>
-</file>
-
 <file path=ppt/slides/slide2.xml><?xml version="1.0" encoding="utf-8"?>
 <p:sld xmlns:a="http://schemas.openxmlformats.org/drawingml/2006/main" xmlns:r="http://schemas.openxmlformats.org/officeDocument/2006/relationships" xmlns:p="http://schemas.openxmlformats.org/presentationml/2006/main">
   <p:cSld>
@@ -11005,6 +8626,17 @@
 <file path=ppt/slides/slide5.xml><?xml version="1.0" encoding="utf-8"?>
 <p:sld xmlns:a="http://schemas.openxmlformats.org/drawingml/2006/main" xmlns:r="http://schemas.openxmlformats.org/officeDocument/2006/relationships" xmlns:p="http://schemas.openxmlformats.org/presentationml/2006/main">
   <p:cSld>
+    <p:bg>
+      <p:bgPr>
+        <a:solidFill>
+          <a:schemeClr val="bg1">
+            <a:lumMod val="75000"/>
+            <a:lumOff val="25000"/>
+          </a:schemeClr>
+        </a:solidFill>
+        <a:effectLst/>
+      </p:bgPr>
+    </p:bg>
     <p:spTree>
       <p:nvGrpSpPr>
         <p:cNvPr id="1" name=""/>
@@ -11021,10 +8653,234 @@
       </p:grpSpPr>
       <p:sp>
         <p:nvSpPr>
+          <p:cNvPr id="24" name="Rectangle 9">
+            <a:extLst>
+              <a:ext uri="{FF2B5EF4-FFF2-40B4-BE49-F238E27FC236}">
+                <a16:creationId xmlns:a16="http://schemas.microsoft.com/office/drawing/2014/main" id="{36E6FEC8-170C-492C-84E0-54394629D120}"/>
+              </a:ext>
+              <a:ext uri="{C183D7F6-B498-43B3-948B-1728B52AA6E4}">
+                <adec:decorative xmlns:adec="http://schemas.microsoft.com/office/drawing/2017/decorative" val="1"/>
+              </a:ext>
+            </a:extLst>
+          </p:cNvPr>
+          <p:cNvSpPr>
+            <a:spLocks noGrp="1" noRot="1" noChangeAspect="1" noMove="1" noResize="1" noEditPoints="1" noAdjustHandles="1" noChangeArrowheads="1" noChangeShapeType="1" noTextEdit="1"/>
+          </p:cNvSpPr>
+          <p:nvPr>
+            <p:extLst>
+              <p:ext uri="{386F3935-93C4-4BCD-93E2-E3B085C9AB24}">
+                <p16:designElem xmlns:p16="http://schemas.microsoft.com/office/powerpoint/2015/main" val="1"/>
+              </p:ext>
+            </p:extLst>
+          </p:nvPr>
+        </p:nvSpPr>
+        <p:spPr>
+          <a:xfrm>
+            <a:off x="3175" y="6400800"/>
+            <a:ext cx="12188825" cy="457200"/>
+          </a:xfrm>
+          <a:prstGeom prst="rect">
+            <a:avLst/>
+          </a:prstGeom>
+          <a:solidFill>
+            <a:schemeClr val="accent1">
+              <a:lumMod val="75000"/>
+            </a:schemeClr>
+          </a:solidFill>
+          <a:ln>
+            <a:noFill/>
+          </a:ln>
+        </p:spPr>
+        <p:style>
+          <a:lnRef idx="2">
+            <a:schemeClr val="accent1">
+              <a:shade val="50000"/>
+            </a:schemeClr>
+          </a:lnRef>
+          <a:fillRef idx="1">
+            <a:schemeClr val="accent1"/>
+          </a:fillRef>
+          <a:effectRef idx="0">
+            <a:schemeClr val="accent1"/>
+          </a:effectRef>
+          <a:fontRef idx="minor">
+            <a:schemeClr val="lt1"/>
+          </a:fontRef>
+        </p:style>
+      </p:sp>
+      <p:sp>
+        <p:nvSpPr>
+          <p:cNvPr id="25" name="Rectangle 11">
+            <a:extLst>
+              <a:ext uri="{FF2B5EF4-FFF2-40B4-BE49-F238E27FC236}">
+                <a16:creationId xmlns:a16="http://schemas.microsoft.com/office/drawing/2014/main" id="{DEE940A1-B9E0-4C5D-A55E-B19742379C83}"/>
+              </a:ext>
+              <a:ext uri="{C183D7F6-B498-43B3-948B-1728B52AA6E4}">
+                <adec:decorative xmlns:adec="http://schemas.microsoft.com/office/drawing/2017/decorative" val="1"/>
+              </a:ext>
+            </a:extLst>
+          </p:cNvPr>
+          <p:cNvSpPr>
+            <a:spLocks noGrp="1" noRot="1" noChangeAspect="1" noMove="1" noResize="1" noEditPoints="1" noAdjustHandles="1" noChangeArrowheads="1" noChangeShapeType="1" noTextEdit="1"/>
+          </p:cNvSpPr>
+          <p:nvPr>
+            <p:extLst>
+              <p:ext uri="{386F3935-93C4-4BCD-93E2-E3B085C9AB24}">
+                <p16:designElem xmlns:p16="http://schemas.microsoft.com/office/powerpoint/2015/main" val="1"/>
+              </p:ext>
+            </p:extLst>
+          </p:nvPr>
+        </p:nvSpPr>
+        <p:spPr>
+          <a:xfrm>
+            <a:off x="15" y="6334316"/>
+            <a:ext cx="12188825" cy="64008"/>
+          </a:xfrm>
+          <a:prstGeom prst="rect">
+            <a:avLst/>
+          </a:prstGeom>
+          <a:solidFill>
+            <a:schemeClr val="accent1"/>
+          </a:solidFill>
+          <a:ln>
+            <a:noFill/>
+          </a:ln>
+        </p:spPr>
+        <p:style>
+          <a:lnRef idx="2">
+            <a:schemeClr val="accent1">
+              <a:shade val="50000"/>
+            </a:schemeClr>
+          </a:lnRef>
+          <a:fillRef idx="1">
+            <a:schemeClr val="accent1"/>
+          </a:fillRef>
+          <a:effectRef idx="0">
+            <a:schemeClr val="accent1"/>
+          </a:effectRef>
+          <a:fontRef idx="minor">
+            <a:schemeClr val="lt1"/>
+          </a:fontRef>
+        </p:style>
+      </p:sp>
+      <p:cxnSp>
+        <p:nvCxnSpPr>
+          <p:cNvPr id="26" name="Straight Connector 13">
+            <a:extLst>
+              <a:ext uri="{FF2B5EF4-FFF2-40B4-BE49-F238E27FC236}">
+                <a16:creationId xmlns:a16="http://schemas.microsoft.com/office/drawing/2014/main" id="{81C8E47B-A563-4B44-A9B0-9316605C2E4E}"/>
+              </a:ext>
+              <a:ext uri="{C183D7F6-B498-43B3-948B-1728B52AA6E4}">
+                <adec:decorative xmlns:adec="http://schemas.microsoft.com/office/drawing/2017/decorative" val="1"/>
+              </a:ext>
+            </a:extLst>
+          </p:cNvPr>
+          <p:cNvCxnSpPr>
+            <a:cxnSpLocks noGrp="1" noRot="1" noChangeAspect="1" noMove="1" noResize="1" noEditPoints="1" noAdjustHandles="1" noChangeArrowheads="1" noChangeShapeType="1"/>
+          </p:cNvCxnSpPr>
+          <p:nvPr>
+            <p:extLst>
+              <p:ext uri="{386F3935-93C4-4BCD-93E2-E3B085C9AB24}">
+                <p16:designElem xmlns:p16="http://schemas.microsoft.com/office/powerpoint/2015/main" val="1"/>
+              </p:ext>
+            </p:extLst>
+          </p:nvPr>
+        </p:nvCxnSpPr>
+        <p:spPr>
+          <a:xfrm>
+            <a:off x="1207658" y="4343400"/>
+            <a:ext cx="9875520" cy="0"/>
+          </a:xfrm>
+          <a:prstGeom prst="line">
+            <a:avLst/>
+          </a:prstGeom>
+          <a:ln w="6350">
+            <a:solidFill>
+              <a:schemeClr val="tx1">
+                <a:lumMod val="50000"/>
+                <a:lumOff val="50000"/>
+              </a:schemeClr>
+            </a:solidFill>
+          </a:ln>
+        </p:spPr>
+        <p:style>
+          <a:lnRef idx="1">
+            <a:schemeClr val="accent1"/>
+          </a:lnRef>
+          <a:fillRef idx="0">
+            <a:schemeClr val="accent1"/>
+          </a:fillRef>
+          <a:effectRef idx="0">
+            <a:schemeClr val="accent1"/>
+          </a:effectRef>
+          <a:fontRef idx="minor">
+            <a:schemeClr val="tx1"/>
+          </a:fontRef>
+        </p:style>
+      </p:cxnSp>
+      <p:sp>
+        <p:nvSpPr>
+          <p:cNvPr id="27" name="Rectangle 15">
+            <a:extLst>
+              <a:ext uri="{FF2B5EF4-FFF2-40B4-BE49-F238E27FC236}">
+                <a16:creationId xmlns:a16="http://schemas.microsoft.com/office/drawing/2014/main" id="{89CEF278-62C5-49CA-8BD9-BCDBE9977FF3}"/>
+              </a:ext>
+              <a:ext uri="{C183D7F6-B498-43B3-948B-1728B52AA6E4}">
+                <adec:decorative xmlns:adec="http://schemas.microsoft.com/office/drawing/2017/decorative" val="1"/>
+              </a:ext>
+            </a:extLst>
+          </p:cNvPr>
+          <p:cNvSpPr>
+            <a:spLocks noGrp="1" noRot="1" noChangeAspect="1" noMove="1" noResize="1" noEditPoints="1" noAdjustHandles="1" noChangeArrowheads="1" noChangeShapeType="1" noTextEdit="1"/>
+          </p:cNvSpPr>
+          <p:nvPr>
+            <p:extLst>
+              <p:ext uri="{386F3935-93C4-4BCD-93E2-E3B085C9AB24}">
+                <p16:designElem xmlns:p16="http://schemas.microsoft.com/office/powerpoint/2015/main" val="1"/>
+              </p:ext>
+            </p:extLst>
+          </p:nvPr>
+        </p:nvSpPr>
+        <p:spPr bwMode="white">
+          <a:xfrm>
+            <a:off x="16" y="0"/>
+            <a:ext cx="4584734" cy="6858000"/>
+          </a:xfrm>
+          <a:prstGeom prst="rect">
+            <a:avLst/>
+          </a:prstGeom>
+          <a:solidFill>
+            <a:schemeClr val="accent1">
+              <a:lumMod val="75000"/>
+            </a:schemeClr>
+          </a:solidFill>
+          <a:ln>
+            <a:noFill/>
+          </a:ln>
+        </p:spPr>
+        <p:style>
+          <a:lnRef idx="2">
+            <a:schemeClr val="accent1">
+              <a:shade val="50000"/>
+            </a:schemeClr>
+          </a:lnRef>
+          <a:fillRef idx="1">
+            <a:schemeClr val="accent1"/>
+          </a:fillRef>
+          <a:effectRef idx="0">
+            <a:schemeClr val="accent1"/>
+          </a:effectRef>
+          <a:fontRef idx="minor">
+            <a:schemeClr val="lt1"/>
+          </a:fontRef>
+        </p:style>
+      </p:sp>
+      <p:sp>
+        <p:nvSpPr>
           <p:cNvPr id="2" name="Title 1">
             <a:extLst>
               <a:ext uri="{FF2B5EF4-FFF2-40B4-BE49-F238E27FC236}">
-                <a16:creationId xmlns:a16="http://schemas.microsoft.com/office/drawing/2014/main" id="{82E09C43-93CD-427C-B5C4-BF1AF2BF73EC}"/>
+                <a16:creationId xmlns:a16="http://schemas.microsoft.com/office/drawing/2014/main" id="{63950B4F-5F45-4EFE-877F-E487E96E3B06}"/>
               </a:ext>
             </a:extLst>
           </p:cNvPr>
@@ -11035,78 +8891,117 @@
             <p:ph type="title"/>
           </p:nvPr>
         </p:nvSpPr>
-        <p:spPr/>
-        <p:txBody>
-          <a:bodyPr/>
+        <p:spPr>
+          <a:xfrm>
+            <a:off x="457200" y="640080"/>
+            <a:ext cx="3659246" cy="2926080"/>
+          </a:xfrm>
+        </p:spPr>
+        <p:txBody>
+          <a:bodyPr vert="horz" lIns="91440" tIns="45720" rIns="91440" bIns="45720" rtlCol="0" anchor="b">
+            <a:normAutofit/>
+          </a:bodyPr>
           <a:lstStyle/>
           <a:p>
             <a:r>
-              <a:rPr lang="en-US" dirty="0"/>
-              <a:t>CORS</a:t>
-            </a:r>
-          </a:p>
-        </p:txBody>
-      </p:sp>
-      <p:sp>
-        <p:nvSpPr>
-          <p:cNvPr id="3" name="Content Placeholder 2">
+              <a:rPr lang="en-US" sz="4400">
+                <a:solidFill>
+                  <a:srgbClr val="FFFFFF"/>
+                </a:solidFill>
+              </a:rPr>
+              <a:t>Controllers and Actions : Routing</a:t>
+            </a:r>
+          </a:p>
+        </p:txBody>
+      </p:sp>
+      <p:pic>
+        <p:nvPicPr>
+          <p:cNvPr id="5" name="Picture 4">
             <a:extLst>
               <a:ext uri="{FF2B5EF4-FFF2-40B4-BE49-F238E27FC236}">
-                <a16:creationId xmlns:a16="http://schemas.microsoft.com/office/drawing/2014/main" id="{39FE521D-A643-4829-AEAA-7F1F49E58D01}"/>
+                <a16:creationId xmlns:a16="http://schemas.microsoft.com/office/drawing/2014/main" id="{3D38F9C3-0F20-4E62-BA55-8340E68FE522}"/>
               </a:ext>
             </a:extLst>
           </p:cNvPr>
-          <p:cNvSpPr>
-            <a:spLocks noGrp="1"/>
-          </p:cNvSpPr>
-          <p:nvPr>
-            <p:ph idx="1"/>
-          </p:nvPr>
-        </p:nvSpPr>
-        <p:spPr/>
-        <p:txBody>
-          <a:bodyPr>
-            <a:normAutofit/>
-          </a:bodyPr>
-          <a:lstStyle/>
-          <a:p>
-            <a:r>
-              <a:rPr lang="en-US" sz="4400" dirty="0"/>
-              <a:t>2 Ways to set up CORS in your Web API</a:t>
-            </a:r>
-          </a:p>
-          <a:p>
-            <a:r>
-              <a:rPr lang="en-US" sz="4400" dirty="0">
-                <a:solidFill>
-                  <a:schemeClr val="accent5"/>
-                </a:solidFill>
-              </a:rPr>
-              <a:t>Annotations in your Controllers or Actions</a:t>
-            </a:r>
-          </a:p>
-          <a:p>
-            <a:r>
-              <a:rPr lang="en-US" sz="4400" dirty="0"/>
-              <a:t>or</a:t>
-            </a:r>
-          </a:p>
-          <a:p>
-            <a:r>
-              <a:rPr lang="en-US" sz="4400" dirty="0">
-                <a:solidFill>
-                  <a:schemeClr val="accent2"/>
-                </a:solidFill>
-              </a:rPr>
-              <a:t>Set up a Policy in Startup and assign in Configure().</a:t>
-            </a:r>
-          </a:p>
-        </p:txBody>
+          <p:cNvPicPr>
+            <a:picLocks noChangeAspect="1"/>
+          </p:cNvPicPr>
+          <p:nvPr/>
+        </p:nvPicPr>
+        <p:blipFill rotWithShape="1">
+          <a:blip r:embed="rId2"/>
+          <a:srcRect r="40809" b="1"/>
+          <a:stretch/>
+        </p:blipFill>
+        <p:spPr>
+          <a:xfrm>
+            <a:off x="4639733" y="10"/>
+            <a:ext cx="7552266" cy="6857990"/>
+          </a:xfrm>
+          <a:prstGeom prst="rect">
+            <a:avLst/>
+          </a:prstGeom>
+        </p:spPr>
+      </p:pic>
+      <p:sp>
+        <p:nvSpPr>
+          <p:cNvPr id="28" name="Rectangle 17">
+            <a:extLst>
+              <a:ext uri="{FF2B5EF4-FFF2-40B4-BE49-F238E27FC236}">
+                <a16:creationId xmlns:a16="http://schemas.microsoft.com/office/drawing/2014/main" id="{02E2466B-276C-423A-9377-78508D6A0764}"/>
+              </a:ext>
+              <a:ext uri="{C183D7F6-B498-43B3-948B-1728B52AA6E4}">
+                <adec:decorative xmlns:adec="http://schemas.microsoft.com/office/drawing/2017/decorative" val="1"/>
+              </a:ext>
+            </a:extLst>
+          </p:cNvPr>
+          <p:cNvSpPr>
+            <a:spLocks noGrp="1" noRot="1" noChangeAspect="1" noMove="1" noResize="1" noEditPoints="1" noAdjustHandles="1" noChangeArrowheads="1" noChangeShapeType="1" noTextEdit="1"/>
+          </p:cNvSpPr>
+          <p:nvPr>
+            <p:extLst>
+              <p:ext uri="{386F3935-93C4-4BCD-93E2-E3B085C9AB24}">
+                <p16:designElem xmlns:p16="http://schemas.microsoft.com/office/powerpoint/2015/main" val="1"/>
+              </p:ext>
+            </p:extLst>
+          </p:nvPr>
+        </p:nvSpPr>
+        <p:spPr>
+          <a:xfrm>
+            <a:off x="4584751" y="0"/>
+            <a:ext cx="64008" cy="6858000"/>
+          </a:xfrm>
+          <a:prstGeom prst="rect">
+            <a:avLst/>
+          </a:prstGeom>
+          <a:solidFill>
+            <a:schemeClr val="accent1"/>
+          </a:solidFill>
+          <a:ln>
+            <a:noFill/>
+          </a:ln>
+        </p:spPr>
+        <p:style>
+          <a:lnRef idx="2">
+            <a:schemeClr val="accent1">
+              <a:shade val="50000"/>
+            </a:schemeClr>
+          </a:lnRef>
+          <a:fillRef idx="1">
+            <a:schemeClr val="accent1"/>
+          </a:fillRef>
+          <a:effectRef idx="0">
+            <a:schemeClr val="accent1"/>
+          </a:effectRef>
+          <a:fontRef idx="minor">
+            <a:schemeClr val="lt1"/>
+          </a:fontRef>
+        </p:style>
       </p:sp>
     </p:spTree>
     <p:extLst>
       <p:ext uri="{BB962C8B-B14F-4D97-AF65-F5344CB8AC3E}">
-        <p14:creationId xmlns:p14="http://schemas.microsoft.com/office/powerpoint/2010/main" val="299903193"/>
+        <p14:creationId xmlns:p14="http://schemas.microsoft.com/office/powerpoint/2010/main" val="2202522606"/>
       </p:ext>
     </p:extLst>
   </p:cSld>
@@ -11119,6 +9014,17 @@
 <file path=ppt/slides/slide6.xml><?xml version="1.0" encoding="utf-8"?>
 <p:sld xmlns:a="http://schemas.openxmlformats.org/drawingml/2006/main" xmlns:r="http://schemas.openxmlformats.org/officeDocument/2006/relationships" xmlns:p="http://schemas.openxmlformats.org/presentationml/2006/main">
   <p:cSld>
+    <p:bg>
+      <p:bgPr>
+        <a:solidFill>
+          <a:schemeClr val="bg1">
+            <a:lumMod val="75000"/>
+            <a:lumOff val="25000"/>
+          </a:schemeClr>
+        </a:solidFill>
+        <a:effectLst/>
+      </p:bgPr>
+    </p:bg>
     <p:spTree>
       <p:nvGrpSpPr>
         <p:cNvPr id="1" name=""/>
@@ -11135,10 +9041,263 @@
       </p:grpSpPr>
       <p:sp>
         <p:nvSpPr>
+          <p:cNvPr id="9" name="Rectangle 8">
+            <a:extLst>
+              <a:ext uri="{FF2B5EF4-FFF2-40B4-BE49-F238E27FC236}">
+                <a16:creationId xmlns:a16="http://schemas.microsoft.com/office/drawing/2014/main" id="{36E6FEC8-170C-492C-84E0-54394629D120}"/>
+              </a:ext>
+              <a:ext uri="{C183D7F6-B498-43B3-948B-1728B52AA6E4}">
+                <adec:decorative xmlns:adec="http://schemas.microsoft.com/office/drawing/2017/decorative" val="1"/>
+              </a:ext>
+            </a:extLst>
+          </p:cNvPr>
+          <p:cNvSpPr>
+            <a:spLocks noGrp="1" noRot="1" noChangeAspect="1" noMove="1" noResize="1" noEditPoints="1" noAdjustHandles="1" noChangeArrowheads="1" noChangeShapeType="1" noTextEdit="1"/>
+          </p:cNvSpPr>
+          <p:nvPr>
+            <p:extLst>
+              <p:ext uri="{386F3935-93C4-4BCD-93E2-E3B085C9AB24}">
+                <p16:designElem xmlns:p16="http://schemas.microsoft.com/office/powerpoint/2015/main" val="1"/>
+              </p:ext>
+            </p:extLst>
+          </p:nvPr>
+        </p:nvSpPr>
+        <p:spPr>
+          <a:xfrm>
+            <a:off x="3175" y="6400800"/>
+            <a:ext cx="12188825" cy="457200"/>
+          </a:xfrm>
+          <a:prstGeom prst="rect">
+            <a:avLst/>
+          </a:prstGeom>
+          <a:solidFill>
+            <a:schemeClr val="accent1">
+              <a:lumMod val="75000"/>
+            </a:schemeClr>
+          </a:solidFill>
+          <a:ln>
+            <a:noFill/>
+          </a:ln>
+        </p:spPr>
+        <p:style>
+          <a:lnRef idx="2">
+            <a:schemeClr val="accent1">
+              <a:shade val="50000"/>
+            </a:schemeClr>
+          </a:lnRef>
+          <a:fillRef idx="1">
+            <a:schemeClr val="accent1"/>
+          </a:fillRef>
+          <a:effectRef idx="0">
+            <a:schemeClr val="accent1"/>
+          </a:effectRef>
+          <a:fontRef idx="minor">
+            <a:schemeClr val="lt1"/>
+          </a:fontRef>
+        </p:style>
+      </p:sp>
+      <p:sp>
+        <p:nvSpPr>
+          <p:cNvPr id="11" name="Rectangle 10">
+            <a:extLst>
+              <a:ext uri="{FF2B5EF4-FFF2-40B4-BE49-F238E27FC236}">
+                <a16:creationId xmlns:a16="http://schemas.microsoft.com/office/drawing/2014/main" id="{DEE940A1-B9E0-4C5D-A55E-B19742379C83}"/>
+              </a:ext>
+              <a:ext uri="{C183D7F6-B498-43B3-948B-1728B52AA6E4}">
+                <adec:decorative xmlns:adec="http://schemas.microsoft.com/office/drawing/2017/decorative" val="1"/>
+              </a:ext>
+            </a:extLst>
+          </p:cNvPr>
+          <p:cNvSpPr>
+            <a:spLocks noGrp="1" noRot="1" noChangeAspect="1" noMove="1" noResize="1" noEditPoints="1" noAdjustHandles="1" noChangeArrowheads="1" noChangeShapeType="1" noTextEdit="1"/>
+          </p:cNvSpPr>
+          <p:nvPr>
+            <p:extLst>
+              <p:ext uri="{386F3935-93C4-4BCD-93E2-E3B085C9AB24}">
+                <p16:designElem xmlns:p16="http://schemas.microsoft.com/office/powerpoint/2015/main" val="1"/>
+              </p:ext>
+            </p:extLst>
+          </p:nvPr>
+        </p:nvSpPr>
+        <p:spPr>
+          <a:xfrm>
+            <a:off x="15" y="6334316"/>
+            <a:ext cx="12188825" cy="64008"/>
+          </a:xfrm>
+          <a:prstGeom prst="rect">
+            <a:avLst/>
+          </a:prstGeom>
+          <a:solidFill>
+            <a:schemeClr val="accent1"/>
+          </a:solidFill>
+          <a:ln>
+            <a:noFill/>
+          </a:ln>
+        </p:spPr>
+        <p:style>
+          <a:lnRef idx="2">
+            <a:schemeClr val="accent1">
+              <a:shade val="50000"/>
+            </a:schemeClr>
+          </a:lnRef>
+          <a:fillRef idx="1">
+            <a:schemeClr val="accent1"/>
+          </a:fillRef>
+          <a:effectRef idx="0">
+            <a:schemeClr val="accent1"/>
+          </a:effectRef>
+          <a:fontRef idx="minor">
+            <a:schemeClr val="lt1"/>
+          </a:fontRef>
+        </p:style>
+      </p:sp>
+      <p:cxnSp>
+        <p:nvCxnSpPr>
+          <p:cNvPr id="13" name="Straight Connector 12">
+            <a:extLst>
+              <a:ext uri="{FF2B5EF4-FFF2-40B4-BE49-F238E27FC236}">
+                <a16:creationId xmlns:a16="http://schemas.microsoft.com/office/drawing/2014/main" id="{81C8E47B-A563-4B44-A9B0-9316605C2E4E}"/>
+              </a:ext>
+              <a:ext uri="{C183D7F6-B498-43B3-948B-1728B52AA6E4}">
+                <adec:decorative xmlns:adec="http://schemas.microsoft.com/office/drawing/2017/decorative" val="1"/>
+              </a:ext>
+            </a:extLst>
+          </p:cNvPr>
+          <p:cNvCxnSpPr>
+            <a:cxnSpLocks noGrp="1" noRot="1" noChangeAspect="1" noMove="1" noResize="1" noEditPoints="1" noAdjustHandles="1" noChangeArrowheads="1" noChangeShapeType="1"/>
+          </p:cNvCxnSpPr>
+          <p:nvPr>
+            <p:extLst>
+              <p:ext uri="{386F3935-93C4-4BCD-93E2-E3B085C9AB24}">
+                <p16:designElem xmlns:p16="http://schemas.microsoft.com/office/powerpoint/2015/main" val="1"/>
+              </p:ext>
+            </p:extLst>
+          </p:nvPr>
+        </p:nvCxnSpPr>
+        <p:spPr>
+          <a:xfrm>
+            <a:off x="1207658" y="4343400"/>
+            <a:ext cx="9875520" cy="0"/>
+          </a:xfrm>
+          <a:prstGeom prst="line">
+            <a:avLst/>
+          </a:prstGeom>
+          <a:ln w="6350">
+            <a:solidFill>
+              <a:schemeClr val="tx1">
+                <a:lumMod val="50000"/>
+                <a:lumOff val="50000"/>
+              </a:schemeClr>
+            </a:solidFill>
+          </a:ln>
+        </p:spPr>
+        <p:style>
+          <a:lnRef idx="1">
+            <a:schemeClr val="accent1"/>
+          </a:lnRef>
+          <a:fillRef idx="0">
+            <a:schemeClr val="accent1"/>
+          </a:fillRef>
+          <a:effectRef idx="0">
+            <a:schemeClr val="accent1"/>
+          </a:effectRef>
+          <a:fontRef idx="minor">
+            <a:schemeClr val="tx1"/>
+          </a:fontRef>
+        </p:style>
+      </p:cxnSp>
+      <p:pic>
+        <p:nvPicPr>
+          <p:cNvPr id="4" name="Picture 3">
+            <a:extLst>
+              <a:ext uri="{FF2B5EF4-FFF2-40B4-BE49-F238E27FC236}">
+                <a16:creationId xmlns:a16="http://schemas.microsoft.com/office/drawing/2014/main" id="{1CCF55AA-2D19-4768-8CAF-EC2CF895994E}"/>
+              </a:ext>
+            </a:extLst>
+          </p:cNvPr>
+          <p:cNvPicPr>
+            <a:picLocks noChangeAspect="1"/>
+          </p:cNvPicPr>
+          <p:nvPr/>
+        </p:nvPicPr>
+        <p:blipFill rotWithShape="1">
+          <a:blip r:embed="rId2"/>
+          <a:srcRect t="1334" b="11028"/>
+          <a:stretch/>
+        </p:blipFill>
+        <p:spPr>
+          <a:xfrm>
+            <a:off x="-32" y="10"/>
+            <a:ext cx="12192031" cy="4915066"/>
+          </a:xfrm>
+          <a:prstGeom prst="rect">
+            <a:avLst/>
+          </a:prstGeom>
+        </p:spPr>
+      </p:pic>
+      <p:sp>
+        <p:nvSpPr>
+          <p:cNvPr id="15" name="Rectangle 14">
+            <a:extLst>
+              <a:ext uri="{FF2B5EF4-FFF2-40B4-BE49-F238E27FC236}">
+                <a16:creationId xmlns:a16="http://schemas.microsoft.com/office/drawing/2014/main" id="{54BFABF9-7D43-458F-B85F-04FF279ACB81}"/>
+              </a:ext>
+              <a:ext uri="{C183D7F6-B498-43B3-948B-1728B52AA6E4}">
+                <adec:decorative xmlns:adec="http://schemas.microsoft.com/office/drawing/2017/decorative" val="1"/>
+              </a:ext>
+            </a:extLst>
+          </p:cNvPr>
+          <p:cNvSpPr>
+            <a:spLocks noGrp="1" noRot="1" noChangeAspect="1" noMove="1" noResize="1" noEditPoints="1" noAdjustHandles="1" noChangeArrowheads="1" noChangeShapeType="1" noTextEdit="1"/>
+          </p:cNvSpPr>
+          <p:nvPr>
+            <p:extLst>
+              <p:ext uri="{386F3935-93C4-4BCD-93E2-E3B085C9AB24}">
+                <p16:designElem xmlns:p16="http://schemas.microsoft.com/office/powerpoint/2015/main" val="1"/>
+              </p:ext>
+            </p:extLst>
+          </p:nvPr>
+        </p:nvSpPr>
+        <p:spPr bwMode="white">
+          <a:xfrm>
+            <a:off x="1507" y="4953000"/>
+            <a:ext cx="12188952" cy="1905000"/>
+          </a:xfrm>
+          <a:prstGeom prst="rect">
+            <a:avLst/>
+          </a:prstGeom>
+          <a:solidFill>
+            <a:schemeClr val="accent1">
+              <a:lumMod val="75000"/>
+            </a:schemeClr>
+          </a:solidFill>
+          <a:ln>
+            <a:noFill/>
+          </a:ln>
+        </p:spPr>
+        <p:style>
+          <a:lnRef idx="2">
+            <a:schemeClr val="accent1">
+              <a:shade val="50000"/>
+            </a:schemeClr>
+          </a:lnRef>
+          <a:fillRef idx="1">
+            <a:schemeClr val="accent1"/>
+          </a:fillRef>
+          <a:effectRef idx="0">
+            <a:schemeClr val="accent1"/>
+          </a:effectRef>
+          <a:fontRef idx="minor">
+            <a:schemeClr val="lt1"/>
+          </a:fontRef>
+        </p:style>
+      </p:sp>
+      <p:sp>
+        <p:nvSpPr>
           <p:cNvPr id="2" name="Title 1">
             <a:extLst>
               <a:ext uri="{FF2B5EF4-FFF2-40B4-BE49-F238E27FC236}">
-                <a16:creationId xmlns:a16="http://schemas.microsoft.com/office/drawing/2014/main" id="{57804EDB-317F-4E5F-B0DB-F136E4785397}"/>
+                <a16:creationId xmlns:a16="http://schemas.microsoft.com/office/drawing/2014/main" id="{63950B4F-5F45-4EFE-877F-E487E96E3B06}"/>
               </a:ext>
             </a:extLst>
           </p:cNvPr>
@@ -11149,201 +9308,88 @@
             <p:ph type="title"/>
           </p:nvPr>
         </p:nvSpPr>
-        <p:spPr/>
-        <p:txBody>
-          <a:bodyPr/>
+        <p:spPr>
+          <a:xfrm>
+            <a:off x="1065197" y="5120640"/>
+            <a:ext cx="10058400" cy="822960"/>
+          </a:xfrm>
+        </p:spPr>
+        <p:txBody>
+          <a:bodyPr vert="horz" lIns="91440" tIns="45720" rIns="91440" bIns="45720" rtlCol="0" anchor="b">
+            <a:normAutofit/>
+          </a:bodyPr>
           <a:lstStyle/>
           <a:p>
             <a:r>
-              <a:rPr lang="en-US" dirty="0"/>
-              <a:t>CORS</a:t>
-            </a:r>
-          </a:p>
-        </p:txBody>
-      </p:sp>
-      <p:sp>
-        <p:nvSpPr>
-          <p:cNvPr id="3" name="Content Placeholder 2">
+              <a:rPr lang="en-US" sz="3600">
+                <a:solidFill>
+                  <a:srgbClr val="FFFFFF"/>
+                </a:solidFill>
+              </a:rPr>
+              <a:t>Controllers and Actions : Routing</a:t>
+            </a:r>
+          </a:p>
+        </p:txBody>
+      </p:sp>
+      <p:sp>
+        <p:nvSpPr>
+          <p:cNvPr id="17" name="Rectangle 16">
             <a:extLst>
               <a:ext uri="{FF2B5EF4-FFF2-40B4-BE49-F238E27FC236}">
-                <a16:creationId xmlns:a16="http://schemas.microsoft.com/office/drawing/2014/main" id="{A3B6E6D2-92B5-4942-A509-D48D995ACAE3}"/>
+                <a16:creationId xmlns:a16="http://schemas.microsoft.com/office/drawing/2014/main" id="{72E64342-BCC2-4FB3-B9DC-14B19B5D7E2B}"/>
+              </a:ext>
+              <a:ext uri="{C183D7F6-B498-43B3-948B-1728B52AA6E4}">
+                <adec:decorative xmlns:adec="http://schemas.microsoft.com/office/drawing/2017/decorative" val="1"/>
               </a:ext>
             </a:extLst>
           </p:cNvPr>
           <p:cNvSpPr>
-            <a:spLocks noGrp="1"/>
-          </p:cNvSpPr>
-          <p:nvPr>
-            <p:ph idx="1"/>
-          </p:nvPr>
-        </p:nvSpPr>
-        <p:spPr/>
-        <p:txBody>
-          <a:bodyPr>
-            <a:normAutofit fontScale="85000" lnSpcReduction="20000"/>
-          </a:bodyPr>
-          <a:lstStyle/>
-          <a:p>
-            <a:r>
-              <a:rPr lang="en-US" dirty="0"/>
-              <a:t>[Route("api/[controller]")]</a:t>
-            </a:r>
-          </a:p>
-          <a:p>
-            <a:r>
-              <a:rPr lang="en-US" dirty="0"/>
-              <a:t>[</a:t>
-            </a:r>
-            <a:r>
-              <a:rPr lang="en-US" dirty="0" err="1"/>
-              <a:t>ApiController</a:t>
-            </a:r>
-            <a:r>
-              <a:rPr lang="en-US" dirty="0"/>
-              <a:t>]</a:t>
-            </a:r>
-          </a:p>
-          <a:p>
-            <a:r>
-              <a:rPr lang="en-US" dirty="0"/>
-              <a:t>public class </a:t>
-            </a:r>
-            <a:r>
-              <a:rPr lang="en-US" dirty="0" err="1"/>
-              <a:t>WidgetController</a:t>
-            </a:r>
-            <a:r>
-              <a:rPr lang="en-US" dirty="0"/>
-              <a:t> : </a:t>
-            </a:r>
-            <a:r>
-              <a:rPr lang="en-US" dirty="0" err="1"/>
-              <a:t>ControllerBase</a:t>
-            </a:r>
-            <a:endParaRPr lang="en-US" dirty="0"/>
-          </a:p>
-          <a:p>
-            <a:r>
-              <a:rPr lang="en-US" dirty="0"/>
-              <a:t>{</a:t>
-            </a:r>
-          </a:p>
-          <a:p>
-            <a:r>
-              <a:rPr lang="en-US" dirty="0"/>
-              <a:t>    // GET api/values</a:t>
-            </a:r>
-          </a:p>
-          <a:p>
-            <a:r>
-              <a:rPr lang="en-US" dirty="0">
-                <a:highlight>
-                  <a:srgbClr val="800000"/>
-                </a:highlight>
-              </a:rPr>
-              <a:t>    [</a:t>
-            </a:r>
-            <a:r>
-              <a:rPr lang="en-US" dirty="0" err="1">
-                <a:highlight>
-                  <a:srgbClr val="800000"/>
-                </a:highlight>
-              </a:rPr>
-              <a:t>EnableCors</a:t>
-            </a:r>
-            <a:r>
-              <a:rPr lang="en-US" dirty="0">
-                <a:highlight>
-                  <a:srgbClr val="800000"/>
-                </a:highlight>
-              </a:rPr>
-              <a:t>("</a:t>
-            </a:r>
-            <a:r>
-              <a:rPr lang="en-US" sz="2000" dirty="0">
-                <a:highlight>
-                  <a:srgbClr val="800000"/>
-                </a:highlight>
-              </a:rPr>
-              <a:t> </a:t>
-            </a:r>
-            <a:r>
-              <a:rPr lang="en-US" sz="2000" dirty="0" err="1">
-                <a:highlight>
-                  <a:srgbClr val="800000"/>
-                </a:highlight>
-              </a:rPr>
-              <a:t>CorsPolicy</a:t>
-            </a:r>
-            <a:r>
-              <a:rPr lang="en-US" sz="2000" dirty="0">
-                <a:highlight>
-                  <a:srgbClr val="800000"/>
-                </a:highlight>
-              </a:rPr>
-              <a:t> </a:t>
-            </a:r>
-            <a:r>
-              <a:rPr lang="en-US" dirty="0">
-                <a:highlight>
-                  <a:srgbClr val="800000"/>
-                </a:highlight>
-              </a:rPr>
-              <a:t>")]</a:t>
-            </a:r>
-          </a:p>
-          <a:p>
-            <a:r>
-              <a:rPr lang="en-US" dirty="0"/>
-              <a:t>    [</a:t>
-            </a:r>
-            <a:r>
-              <a:rPr lang="en-US" dirty="0" err="1"/>
-              <a:t>HttpGet</a:t>
-            </a:r>
-            <a:r>
-              <a:rPr lang="en-US" dirty="0"/>
-              <a:t>]</a:t>
-            </a:r>
-          </a:p>
-          <a:p>
-            <a:r>
-              <a:rPr lang="en-US" dirty="0"/>
-              <a:t>    public </a:t>
-            </a:r>
-            <a:r>
-              <a:rPr lang="en-US" dirty="0" err="1"/>
-              <a:t>ActionResult</a:t>
-            </a:r>
-            <a:r>
-              <a:rPr lang="en-US" dirty="0"/>
-              <a:t>&lt;IEnumerable&lt;string&gt;&gt; Get()</a:t>
-            </a:r>
-          </a:p>
-          <a:p>
-            <a:r>
-              <a:rPr lang="en-US" dirty="0"/>
-              <a:t>    {</a:t>
-            </a:r>
-          </a:p>
-          <a:p>
-            <a:r>
-              <a:rPr lang="en-US" dirty="0"/>
-              <a:t>        return new string[] { "green widget", "red widget" };</a:t>
-            </a:r>
-          </a:p>
-          <a:p>
-            <a:r>
-              <a:rPr lang="en-US" dirty="0"/>
-              <a:t>    }</a:t>
-            </a:r>
-          </a:p>
-        </p:txBody>
+            <a:spLocks noGrp="1" noRot="1" noChangeAspect="1" noMove="1" noResize="1" noEditPoints="1" noAdjustHandles="1" noChangeArrowheads="1" noChangeShapeType="1" noTextEdit="1"/>
+          </p:cNvSpPr>
+          <p:nvPr>
+            <p:extLst>
+              <p:ext uri="{386F3935-93C4-4BCD-93E2-E3B085C9AB24}">
+                <p16:designElem xmlns:p16="http://schemas.microsoft.com/office/powerpoint/2015/main" val="1"/>
+              </p:ext>
+            </p:extLst>
+          </p:nvPr>
+        </p:nvSpPr>
+        <p:spPr>
+          <a:xfrm>
+            <a:off x="1507" y="4906176"/>
+            <a:ext cx="12188952" cy="64008"/>
+          </a:xfrm>
+          <a:prstGeom prst="rect">
+            <a:avLst/>
+          </a:prstGeom>
+          <a:solidFill>
+            <a:schemeClr val="accent1"/>
+          </a:solidFill>
+          <a:ln>
+            <a:noFill/>
+          </a:ln>
+        </p:spPr>
+        <p:style>
+          <a:lnRef idx="2">
+            <a:schemeClr val="accent1">
+              <a:shade val="50000"/>
+            </a:schemeClr>
+          </a:lnRef>
+          <a:fillRef idx="1">
+            <a:schemeClr val="accent1"/>
+          </a:fillRef>
+          <a:effectRef idx="0">
+            <a:schemeClr val="accent1"/>
+          </a:effectRef>
+          <a:fontRef idx="minor">
+            <a:schemeClr val="lt1"/>
+          </a:fontRef>
+        </p:style>
       </p:sp>
     </p:spTree>
     <p:extLst>
       <p:ext uri="{BB962C8B-B14F-4D97-AF65-F5344CB8AC3E}">
-        <p14:creationId xmlns:p14="http://schemas.microsoft.com/office/powerpoint/2010/main" val="3621990842"/>
+        <p14:creationId xmlns:p14="http://schemas.microsoft.com/office/powerpoint/2010/main" val="4024183203"/>
       </p:ext>
     </p:extLst>
   </p:cSld>
@@ -11356,6 +9402,17 @@
 <file path=ppt/slides/slide7.xml><?xml version="1.0" encoding="utf-8"?>
 <p:sld xmlns:a="http://schemas.openxmlformats.org/drawingml/2006/main" xmlns:r="http://schemas.openxmlformats.org/officeDocument/2006/relationships" xmlns:p="http://schemas.openxmlformats.org/presentationml/2006/main">
   <p:cSld>
+    <p:bg>
+      <p:bgPr>
+        <a:solidFill>
+          <a:schemeClr val="bg1">
+            <a:lumMod val="75000"/>
+            <a:lumOff val="25000"/>
+          </a:schemeClr>
+        </a:solidFill>
+        <a:effectLst/>
+      </p:bgPr>
+    </p:bg>
     <p:spTree>
       <p:nvGrpSpPr>
         <p:cNvPr id="1" name=""/>
@@ -11372,10 +9429,234 @@
       </p:grpSpPr>
       <p:sp>
         <p:nvSpPr>
+          <p:cNvPr id="10" name="Rectangle 9">
+            <a:extLst>
+              <a:ext uri="{FF2B5EF4-FFF2-40B4-BE49-F238E27FC236}">
+                <a16:creationId xmlns:a16="http://schemas.microsoft.com/office/drawing/2014/main" id="{36E6FEC8-170C-492C-84E0-54394629D120}"/>
+              </a:ext>
+              <a:ext uri="{C183D7F6-B498-43B3-948B-1728B52AA6E4}">
+                <adec:decorative xmlns:adec="http://schemas.microsoft.com/office/drawing/2017/decorative" val="1"/>
+              </a:ext>
+            </a:extLst>
+          </p:cNvPr>
+          <p:cNvSpPr>
+            <a:spLocks noGrp="1" noRot="1" noChangeAspect="1" noMove="1" noResize="1" noEditPoints="1" noAdjustHandles="1" noChangeArrowheads="1" noChangeShapeType="1" noTextEdit="1"/>
+          </p:cNvSpPr>
+          <p:nvPr>
+            <p:extLst>
+              <p:ext uri="{386F3935-93C4-4BCD-93E2-E3B085C9AB24}">
+                <p16:designElem xmlns:p16="http://schemas.microsoft.com/office/powerpoint/2015/main" val="1"/>
+              </p:ext>
+            </p:extLst>
+          </p:nvPr>
+        </p:nvSpPr>
+        <p:spPr>
+          <a:xfrm>
+            <a:off x="3175" y="6400800"/>
+            <a:ext cx="12188825" cy="457200"/>
+          </a:xfrm>
+          <a:prstGeom prst="rect">
+            <a:avLst/>
+          </a:prstGeom>
+          <a:solidFill>
+            <a:schemeClr val="accent1">
+              <a:lumMod val="75000"/>
+            </a:schemeClr>
+          </a:solidFill>
+          <a:ln>
+            <a:noFill/>
+          </a:ln>
+        </p:spPr>
+        <p:style>
+          <a:lnRef idx="2">
+            <a:schemeClr val="accent1">
+              <a:shade val="50000"/>
+            </a:schemeClr>
+          </a:lnRef>
+          <a:fillRef idx="1">
+            <a:schemeClr val="accent1"/>
+          </a:fillRef>
+          <a:effectRef idx="0">
+            <a:schemeClr val="accent1"/>
+          </a:effectRef>
+          <a:fontRef idx="minor">
+            <a:schemeClr val="lt1"/>
+          </a:fontRef>
+        </p:style>
+      </p:sp>
+      <p:sp>
+        <p:nvSpPr>
+          <p:cNvPr id="12" name="Rectangle 11">
+            <a:extLst>
+              <a:ext uri="{FF2B5EF4-FFF2-40B4-BE49-F238E27FC236}">
+                <a16:creationId xmlns:a16="http://schemas.microsoft.com/office/drawing/2014/main" id="{DEE940A1-B9E0-4C5D-A55E-B19742379C83}"/>
+              </a:ext>
+              <a:ext uri="{C183D7F6-B498-43B3-948B-1728B52AA6E4}">
+                <adec:decorative xmlns:adec="http://schemas.microsoft.com/office/drawing/2017/decorative" val="1"/>
+              </a:ext>
+            </a:extLst>
+          </p:cNvPr>
+          <p:cNvSpPr>
+            <a:spLocks noGrp="1" noRot="1" noChangeAspect="1" noMove="1" noResize="1" noEditPoints="1" noAdjustHandles="1" noChangeArrowheads="1" noChangeShapeType="1" noTextEdit="1"/>
+          </p:cNvSpPr>
+          <p:nvPr>
+            <p:extLst>
+              <p:ext uri="{386F3935-93C4-4BCD-93E2-E3B085C9AB24}">
+                <p16:designElem xmlns:p16="http://schemas.microsoft.com/office/powerpoint/2015/main" val="1"/>
+              </p:ext>
+            </p:extLst>
+          </p:nvPr>
+        </p:nvSpPr>
+        <p:spPr>
+          <a:xfrm>
+            <a:off x="15" y="6334316"/>
+            <a:ext cx="12188825" cy="64008"/>
+          </a:xfrm>
+          <a:prstGeom prst="rect">
+            <a:avLst/>
+          </a:prstGeom>
+          <a:solidFill>
+            <a:schemeClr val="accent1"/>
+          </a:solidFill>
+          <a:ln>
+            <a:noFill/>
+          </a:ln>
+        </p:spPr>
+        <p:style>
+          <a:lnRef idx="2">
+            <a:schemeClr val="accent1">
+              <a:shade val="50000"/>
+            </a:schemeClr>
+          </a:lnRef>
+          <a:fillRef idx="1">
+            <a:schemeClr val="accent1"/>
+          </a:fillRef>
+          <a:effectRef idx="0">
+            <a:schemeClr val="accent1"/>
+          </a:effectRef>
+          <a:fontRef idx="minor">
+            <a:schemeClr val="lt1"/>
+          </a:fontRef>
+        </p:style>
+      </p:sp>
+      <p:cxnSp>
+        <p:nvCxnSpPr>
+          <p:cNvPr id="14" name="Straight Connector 13">
+            <a:extLst>
+              <a:ext uri="{FF2B5EF4-FFF2-40B4-BE49-F238E27FC236}">
+                <a16:creationId xmlns:a16="http://schemas.microsoft.com/office/drawing/2014/main" id="{81C8E47B-A563-4B44-A9B0-9316605C2E4E}"/>
+              </a:ext>
+              <a:ext uri="{C183D7F6-B498-43B3-948B-1728B52AA6E4}">
+                <adec:decorative xmlns:adec="http://schemas.microsoft.com/office/drawing/2017/decorative" val="1"/>
+              </a:ext>
+            </a:extLst>
+          </p:cNvPr>
+          <p:cNvCxnSpPr>
+            <a:cxnSpLocks noGrp="1" noRot="1" noChangeAspect="1" noMove="1" noResize="1" noEditPoints="1" noAdjustHandles="1" noChangeArrowheads="1" noChangeShapeType="1"/>
+          </p:cNvCxnSpPr>
+          <p:nvPr>
+            <p:extLst>
+              <p:ext uri="{386F3935-93C4-4BCD-93E2-E3B085C9AB24}">
+                <p16:designElem xmlns:p16="http://schemas.microsoft.com/office/powerpoint/2015/main" val="1"/>
+              </p:ext>
+            </p:extLst>
+          </p:nvPr>
+        </p:nvCxnSpPr>
+        <p:spPr>
+          <a:xfrm>
+            <a:off x="1207658" y="4343400"/>
+            <a:ext cx="9875520" cy="0"/>
+          </a:xfrm>
+          <a:prstGeom prst="line">
+            <a:avLst/>
+          </a:prstGeom>
+          <a:ln w="6350">
+            <a:solidFill>
+              <a:schemeClr val="tx1">
+                <a:lumMod val="50000"/>
+                <a:lumOff val="50000"/>
+              </a:schemeClr>
+            </a:solidFill>
+          </a:ln>
+        </p:spPr>
+        <p:style>
+          <a:lnRef idx="1">
+            <a:schemeClr val="accent1"/>
+          </a:lnRef>
+          <a:fillRef idx="0">
+            <a:schemeClr val="accent1"/>
+          </a:fillRef>
+          <a:effectRef idx="0">
+            <a:schemeClr val="accent1"/>
+          </a:effectRef>
+          <a:fontRef idx="minor">
+            <a:schemeClr val="tx1"/>
+          </a:fontRef>
+        </p:style>
+      </p:cxnSp>
+      <p:sp>
+        <p:nvSpPr>
+          <p:cNvPr id="16" name="Rectangle 15">
+            <a:extLst>
+              <a:ext uri="{FF2B5EF4-FFF2-40B4-BE49-F238E27FC236}">
+                <a16:creationId xmlns:a16="http://schemas.microsoft.com/office/drawing/2014/main" id="{89CEF278-62C5-49CA-8BD9-BCDBE9977FF3}"/>
+              </a:ext>
+              <a:ext uri="{C183D7F6-B498-43B3-948B-1728B52AA6E4}">
+                <adec:decorative xmlns:adec="http://schemas.microsoft.com/office/drawing/2017/decorative" val="1"/>
+              </a:ext>
+            </a:extLst>
+          </p:cNvPr>
+          <p:cNvSpPr>
+            <a:spLocks noGrp="1" noRot="1" noChangeAspect="1" noMove="1" noResize="1" noEditPoints="1" noAdjustHandles="1" noChangeArrowheads="1" noChangeShapeType="1" noTextEdit="1"/>
+          </p:cNvSpPr>
+          <p:nvPr>
+            <p:extLst>
+              <p:ext uri="{386F3935-93C4-4BCD-93E2-E3B085C9AB24}">
+                <p16:designElem xmlns:p16="http://schemas.microsoft.com/office/powerpoint/2015/main" val="1"/>
+              </p:ext>
+            </p:extLst>
+          </p:nvPr>
+        </p:nvSpPr>
+        <p:spPr bwMode="white">
+          <a:xfrm>
+            <a:off x="16" y="0"/>
+            <a:ext cx="4584734" cy="6858000"/>
+          </a:xfrm>
+          <a:prstGeom prst="rect">
+            <a:avLst/>
+          </a:prstGeom>
+          <a:solidFill>
+            <a:schemeClr val="accent1">
+              <a:lumMod val="75000"/>
+            </a:schemeClr>
+          </a:solidFill>
+          <a:ln>
+            <a:noFill/>
+          </a:ln>
+        </p:spPr>
+        <p:style>
+          <a:lnRef idx="2">
+            <a:schemeClr val="accent1">
+              <a:shade val="50000"/>
+            </a:schemeClr>
+          </a:lnRef>
+          <a:fillRef idx="1">
+            <a:schemeClr val="accent1"/>
+          </a:fillRef>
+          <a:effectRef idx="0">
+            <a:schemeClr val="accent1"/>
+          </a:effectRef>
+          <a:fontRef idx="minor">
+            <a:schemeClr val="lt1"/>
+          </a:fontRef>
+        </p:style>
+      </p:sp>
+      <p:sp>
+        <p:nvSpPr>
           <p:cNvPr id="2" name="Title 1">
             <a:extLst>
               <a:ext uri="{FF2B5EF4-FFF2-40B4-BE49-F238E27FC236}">
-                <a16:creationId xmlns:a16="http://schemas.microsoft.com/office/drawing/2014/main" id="{B44793D8-FD6E-4A8C-8536-3B28DADC7AEF}"/>
+                <a16:creationId xmlns:a16="http://schemas.microsoft.com/office/drawing/2014/main" id="{63950B4F-5F45-4EFE-877F-E487E96E3B06}"/>
               </a:ext>
             </a:extLst>
           </p:cNvPr>
@@ -11386,148 +9667,232 @@
             <p:ph type="title"/>
           </p:nvPr>
         </p:nvSpPr>
-        <p:spPr/>
-        <p:txBody>
-          <a:bodyPr/>
+        <p:spPr>
+          <a:xfrm>
+            <a:off x="457200" y="640080"/>
+            <a:ext cx="3659246" cy="2926080"/>
+          </a:xfrm>
+        </p:spPr>
+        <p:txBody>
+          <a:bodyPr vert="horz" lIns="91440" tIns="45720" rIns="91440" bIns="45720" rtlCol="0" anchor="b">
+            <a:normAutofit/>
+          </a:bodyPr>
           <a:lstStyle/>
           <a:p>
             <a:r>
-              <a:rPr lang="en-US" dirty="0"/>
-              <a:t>CORS</a:t>
-            </a:r>
-          </a:p>
-        </p:txBody>
-      </p:sp>
-      <p:sp>
-        <p:nvSpPr>
-          <p:cNvPr id="3" name="Content Placeholder 2">
+              <a:rPr lang="en-US" sz="4400">
+                <a:solidFill>
+                  <a:srgbClr val="FFFFFF"/>
+                </a:solidFill>
+              </a:rPr>
+              <a:t>Controllers and Actions: HTTP Verbs</a:t>
+            </a:r>
+          </a:p>
+        </p:txBody>
+      </p:sp>
+      <p:pic>
+        <p:nvPicPr>
+          <p:cNvPr id="5" name="Picture 4">
             <a:extLst>
               <a:ext uri="{FF2B5EF4-FFF2-40B4-BE49-F238E27FC236}">
-                <a16:creationId xmlns:a16="http://schemas.microsoft.com/office/drawing/2014/main" id="{BBFFBDED-74CC-42AF-857B-A1ABEBDC2D7B}"/>
+                <a16:creationId xmlns:a16="http://schemas.microsoft.com/office/drawing/2014/main" id="{12E7A4C0-D4FF-473E-BD1A-2D16A2D1B7C0}"/>
               </a:ext>
             </a:extLst>
           </p:cNvPr>
-          <p:cNvSpPr>
-            <a:spLocks noGrp="1"/>
-          </p:cNvSpPr>
-          <p:nvPr>
-            <p:ph idx="1"/>
-          </p:nvPr>
-        </p:nvSpPr>
-        <p:spPr/>
-        <p:txBody>
-          <a:bodyPr>
-            <a:normAutofit/>
-          </a:bodyPr>
-          <a:lstStyle/>
-          <a:p>
-            <a:r>
-              <a:rPr lang="en-US" sz="2400" dirty="0"/>
-              <a:t> </a:t>
-            </a:r>
-            <a:r>
-              <a:rPr lang="en-US" sz="2400" dirty="0" err="1"/>
-              <a:t>services.AddCors</a:t>
-            </a:r>
-            <a:r>
-              <a:rPr lang="en-US" sz="2400" dirty="0"/>
-              <a:t>(options =&gt;</a:t>
-            </a:r>
-          </a:p>
-          <a:p>
-            <a:r>
-              <a:rPr lang="en-US" sz="2400" dirty="0"/>
-              <a:t>            {</a:t>
-            </a:r>
-          </a:p>
-          <a:p>
-            <a:r>
-              <a:rPr lang="en-US" sz="2400" dirty="0"/>
-              <a:t>                </a:t>
-            </a:r>
-            <a:r>
-              <a:rPr lang="en-US" sz="2400" dirty="0" err="1"/>
-              <a:t>options.AddPolicy</a:t>
-            </a:r>
-            <a:r>
-              <a:rPr lang="en-US" sz="2400" dirty="0"/>
-              <a:t>("</a:t>
-            </a:r>
-            <a:r>
-              <a:rPr lang="en-US" sz="2400" dirty="0" err="1"/>
-              <a:t>CorsPolicy</a:t>
-            </a:r>
-            <a:r>
-              <a:rPr lang="en-US" sz="2400" dirty="0"/>
-              <a:t>",</a:t>
-            </a:r>
-          </a:p>
-          <a:p>
-            <a:r>
-              <a:rPr lang="en-US" sz="2400" dirty="0"/>
-              <a:t>                    builder =&gt; </a:t>
-            </a:r>
-            <a:r>
-              <a:rPr lang="en-US" sz="2400" dirty="0" err="1"/>
-              <a:t>builder.AllowAnyOrigin</a:t>
-            </a:r>
-            <a:r>
-              <a:rPr lang="en-US" sz="2400" dirty="0"/>
-              <a:t>()</a:t>
-            </a:r>
-          </a:p>
-          <a:p>
-            <a:r>
-              <a:rPr lang="en-US" sz="2400" dirty="0"/>
-              <a:t>                        .</a:t>
-            </a:r>
-            <a:r>
-              <a:rPr lang="en-US" sz="2400" dirty="0" err="1"/>
-              <a:t>AllowAnyMethod</a:t>
-            </a:r>
-            <a:r>
-              <a:rPr lang="en-US" sz="2400" dirty="0"/>
-              <a:t>()</a:t>
-            </a:r>
-          </a:p>
-          <a:p>
-            <a:r>
-              <a:rPr lang="en-US" sz="2400" dirty="0"/>
-              <a:t>                        .</a:t>
-            </a:r>
-            <a:r>
-              <a:rPr lang="en-US" sz="2400" dirty="0" err="1"/>
-              <a:t>AllowAnyHeader</a:t>
-            </a:r>
-            <a:r>
-              <a:rPr lang="en-US" sz="2400" dirty="0"/>
-              <a:t>());</a:t>
-            </a:r>
-          </a:p>
-          <a:p>
-            <a:r>
-              <a:rPr lang="en-US" sz="2400" dirty="0"/>
-              <a:t>            });</a:t>
-            </a:r>
-          </a:p>
-        </p:txBody>
+          <p:cNvPicPr>
+            <a:picLocks noChangeAspect="1"/>
+          </p:cNvPicPr>
+          <p:nvPr/>
+        </p:nvPicPr>
+        <p:blipFill rotWithShape="1">
+          <a:blip r:embed="rId2"/>
+          <a:srcRect r="34202" b="2"/>
+          <a:stretch/>
+        </p:blipFill>
+        <p:spPr>
+          <a:xfrm>
+            <a:off x="4639733" y="10"/>
+            <a:ext cx="7552266" cy="6857990"/>
+          </a:xfrm>
+          <a:prstGeom prst="rect">
+            <a:avLst/>
+          </a:prstGeom>
+        </p:spPr>
+      </p:pic>
+      <p:sp>
+        <p:nvSpPr>
+          <p:cNvPr id="18" name="Rectangle 17">
+            <a:extLst>
+              <a:ext uri="{FF2B5EF4-FFF2-40B4-BE49-F238E27FC236}">
+                <a16:creationId xmlns:a16="http://schemas.microsoft.com/office/drawing/2014/main" id="{02E2466B-276C-423A-9377-78508D6A0764}"/>
+              </a:ext>
+              <a:ext uri="{C183D7F6-B498-43B3-948B-1728B52AA6E4}">
+                <adec:decorative xmlns:adec="http://schemas.microsoft.com/office/drawing/2017/decorative" val="1"/>
+              </a:ext>
+            </a:extLst>
+          </p:cNvPr>
+          <p:cNvSpPr>
+            <a:spLocks noGrp="1" noRot="1" noChangeAspect="1" noMove="1" noResize="1" noEditPoints="1" noAdjustHandles="1" noChangeArrowheads="1" noChangeShapeType="1" noTextEdit="1"/>
+          </p:cNvSpPr>
+          <p:nvPr>
+            <p:extLst>
+              <p:ext uri="{386F3935-93C4-4BCD-93E2-E3B085C9AB24}">
+                <p16:designElem xmlns:p16="http://schemas.microsoft.com/office/powerpoint/2015/main" val="1"/>
+              </p:ext>
+            </p:extLst>
+          </p:nvPr>
+        </p:nvSpPr>
+        <p:spPr>
+          <a:xfrm>
+            <a:off x="4584751" y="0"/>
+            <a:ext cx="64008" cy="6858000"/>
+          </a:xfrm>
+          <a:prstGeom prst="rect">
+            <a:avLst/>
+          </a:prstGeom>
+          <a:solidFill>
+            <a:schemeClr val="accent1"/>
+          </a:solidFill>
+          <a:ln>
+            <a:noFill/>
+          </a:ln>
+        </p:spPr>
+        <p:style>
+          <a:lnRef idx="2">
+            <a:schemeClr val="accent1">
+              <a:shade val="50000"/>
+            </a:schemeClr>
+          </a:lnRef>
+          <a:fillRef idx="1">
+            <a:schemeClr val="accent1"/>
+          </a:fillRef>
+          <a:effectRef idx="0">
+            <a:schemeClr val="accent1"/>
+          </a:effectRef>
+          <a:fontRef idx="minor">
+            <a:schemeClr val="lt1"/>
+          </a:fontRef>
+        </p:style>
       </p:sp>
     </p:spTree>
     <p:extLst>
       <p:ext uri="{BB962C8B-B14F-4D97-AF65-F5344CB8AC3E}">
-        <p14:creationId xmlns:p14="http://schemas.microsoft.com/office/powerpoint/2010/main" val="2277267245"/>
+        <p14:creationId xmlns:p14="http://schemas.microsoft.com/office/powerpoint/2010/main" val="875478547"/>
       </p:ext>
     </p:extLst>
   </p:cSld>
   <p:clrMapOvr>
     <a:masterClrMapping/>
   </p:clrMapOvr>
+  <p:timing>
+    <p:tnLst>
+      <p:par>
+        <p:cTn id="1" dur="indefinite" restart="never" nodeType="tmRoot">
+          <p:childTnLst>
+            <p:seq concurrent="1" nextAc="seek">
+              <p:cTn id="2" dur="indefinite" nodeType="mainSeq">
+                <p:childTnLst>
+                  <p:par>
+                    <p:cTn id="3" fill="hold">
+                      <p:stCondLst>
+                        <p:cond delay="indefinite"/>
+                        <p:cond evt="onBegin" delay="0">
+                          <p:tn val="2"/>
+                        </p:cond>
+                      </p:stCondLst>
+                      <p:childTnLst>
+                        <p:par>
+                          <p:cTn id="4" fill="hold">
+                            <p:stCondLst>
+                              <p:cond delay="0"/>
+                            </p:stCondLst>
+                            <p:childTnLst>
+                              <p:par>
+                                <p:cTn id="5" presetID="10" presetClass="entr" presetSubtype="0" fill="hold" grpId="0" nodeType="withEffect">
+                                  <p:stCondLst>
+                                    <p:cond delay="1000"/>
+                                  </p:stCondLst>
+                                  <p:iterate type="lt">
+                                    <p:tmPct val="10000"/>
+                                  </p:iterate>
+                                  <p:childTnLst>
+                                    <p:set>
+                                      <p:cBhvr>
+                                        <p:cTn id="6" dur="1" fill="hold">
+                                          <p:stCondLst>
+                                            <p:cond delay="0"/>
+                                          </p:stCondLst>
+                                        </p:cTn>
+                                        <p:tgtEl>
+                                          <p:spTgt spid="2"/>
+                                        </p:tgtEl>
+                                        <p:attrNameLst>
+                                          <p:attrName>style.visibility</p:attrName>
+                                        </p:attrNameLst>
+                                      </p:cBhvr>
+                                      <p:to>
+                                        <p:strVal val="visible"/>
+                                      </p:to>
+                                    </p:set>
+                                    <p:animEffect transition="in" filter="fade">
+                                      <p:cBhvr>
+                                        <p:cTn id="7" dur="400"/>
+                                        <p:tgtEl>
+                                          <p:spTgt spid="2"/>
+                                        </p:tgtEl>
+                                      </p:cBhvr>
+                                    </p:animEffect>
+                                  </p:childTnLst>
+                                </p:cTn>
+                              </p:par>
+                            </p:childTnLst>
+                          </p:cTn>
+                        </p:par>
+                      </p:childTnLst>
+                    </p:cTn>
+                  </p:par>
+                </p:childTnLst>
+              </p:cTn>
+              <p:prevCondLst>
+                <p:cond evt="onPrev" delay="0">
+                  <p:tgtEl>
+                    <p:sldTgt/>
+                  </p:tgtEl>
+                </p:cond>
+              </p:prevCondLst>
+              <p:nextCondLst>
+                <p:cond evt="onNext" delay="0">
+                  <p:tgtEl>
+                    <p:sldTgt/>
+                  </p:tgtEl>
+                </p:cond>
+              </p:nextCondLst>
+            </p:seq>
+          </p:childTnLst>
+        </p:cTn>
+      </p:par>
+    </p:tnLst>
+    <p:bldLst>
+      <p:bldP spid="2" grpId="0"/>
+    </p:bldLst>
+  </p:timing>
 </p:sld>
 </file>
 
 <file path=ppt/slides/slide8.xml><?xml version="1.0" encoding="utf-8"?>
 <p:sld xmlns:a="http://schemas.openxmlformats.org/drawingml/2006/main" xmlns:r="http://schemas.openxmlformats.org/officeDocument/2006/relationships" xmlns:p="http://schemas.openxmlformats.org/presentationml/2006/main">
   <p:cSld>
+    <p:bg>
+      <p:bgPr>
+        <a:solidFill>
+          <a:schemeClr val="bg1">
+            <a:lumMod val="75000"/>
+            <a:lumOff val="25000"/>
+          </a:schemeClr>
+        </a:solidFill>
+        <a:effectLst/>
+      </p:bgPr>
+    </p:bg>
     <p:spTree>
       <p:nvGrpSpPr>
         <p:cNvPr id="1" name=""/>
@@ -11544,10 +9909,263 @@
       </p:grpSpPr>
       <p:sp>
         <p:nvSpPr>
+          <p:cNvPr id="20" name="Rectangle 9">
+            <a:extLst>
+              <a:ext uri="{FF2B5EF4-FFF2-40B4-BE49-F238E27FC236}">
+                <a16:creationId xmlns:a16="http://schemas.microsoft.com/office/drawing/2014/main" id="{36E6FEC8-170C-492C-84E0-54394629D120}"/>
+              </a:ext>
+              <a:ext uri="{C183D7F6-B498-43B3-948B-1728B52AA6E4}">
+                <adec:decorative xmlns:adec="http://schemas.microsoft.com/office/drawing/2017/decorative" val="1"/>
+              </a:ext>
+            </a:extLst>
+          </p:cNvPr>
+          <p:cNvSpPr>
+            <a:spLocks noGrp="1" noRot="1" noChangeAspect="1" noMove="1" noResize="1" noEditPoints="1" noAdjustHandles="1" noChangeArrowheads="1" noChangeShapeType="1" noTextEdit="1"/>
+          </p:cNvSpPr>
+          <p:nvPr>
+            <p:extLst>
+              <p:ext uri="{386F3935-93C4-4BCD-93E2-E3B085C9AB24}">
+                <p16:designElem xmlns:p16="http://schemas.microsoft.com/office/powerpoint/2015/main" val="1"/>
+              </p:ext>
+            </p:extLst>
+          </p:nvPr>
+        </p:nvSpPr>
+        <p:spPr>
+          <a:xfrm>
+            <a:off x="3175" y="6400800"/>
+            <a:ext cx="12188825" cy="457200"/>
+          </a:xfrm>
+          <a:prstGeom prst="rect">
+            <a:avLst/>
+          </a:prstGeom>
+          <a:solidFill>
+            <a:schemeClr val="accent1">
+              <a:lumMod val="75000"/>
+            </a:schemeClr>
+          </a:solidFill>
+          <a:ln>
+            <a:noFill/>
+          </a:ln>
+        </p:spPr>
+        <p:style>
+          <a:lnRef idx="2">
+            <a:schemeClr val="accent1">
+              <a:shade val="50000"/>
+            </a:schemeClr>
+          </a:lnRef>
+          <a:fillRef idx="1">
+            <a:schemeClr val="accent1"/>
+          </a:fillRef>
+          <a:effectRef idx="0">
+            <a:schemeClr val="accent1"/>
+          </a:effectRef>
+          <a:fontRef idx="minor">
+            <a:schemeClr val="lt1"/>
+          </a:fontRef>
+        </p:style>
+      </p:sp>
+      <p:sp>
+        <p:nvSpPr>
+          <p:cNvPr id="21" name="Rectangle 11">
+            <a:extLst>
+              <a:ext uri="{FF2B5EF4-FFF2-40B4-BE49-F238E27FC236}">
+                <a16:creationId xmlns:a16="http://schemas.microsoft.com/office/drawing/2014/main" id="{DEE940A1-B9E0-4C5D-A55E-B19742379C83}"/>
+              </a:ext>
+              <a:ext uri="{C183D7F6-B498-43B3-948B-1728B52AA6E4}">
+                <adec:decorative xmlns:adec="http://schemas.microsoft.com/office/drawing/2017/decorative" val="1"/>
+              </a:ext>
+            </a:extLst>
+          </p:cNvPr>
+          <p:cNvSpPr>
+            <a:spLocks noGrp="1" noRot="1" noChangeAspect="1" noMove="1" noResize="1" noEditPoints="1" noAdjustHandles="1" noChangeArrowheads="1" noChangeShapeType="1" noTextEdit="1"/>
+          </p:cNvSpPr>
+          <p:nvPr>
+            <p:extLst>
+              <p:ext uri="{386F3935-93C4-4BCD-93E2-E3B085C9AB24}">
+                <p16:designElem xmlns:p16="http://schemas.microsoft.com/office/powerpoint/2015/main" val="1"/>
+              </p:ext>
+            </p:extLst>
+          </p:nvPr>
+        </p:nvSpPr>
+        <p:spPr>
+          <a:xfrm>
+            <a:off x="15" y="6334316"/>
+            <a:ext cx="12188825" cy="64008"/>
+          </a:xfrm>
+          <a:prstGeom prst="rect">
+            <a:avLst/>
+          </a:prstGeom>
+          <a:solidFill>
+            <a:schemeClr val="accent1"/>
+          </a:solidFill>
+          <a:ln>
+            <a:noFill/>
+          </a:ln>
+        </p:spPr>
+        <p:style>
+          <a:lnRef idx="2">
+            <a:schemeClr val="accent1">
+              <a:shade val="50000"/>
+            </a:schemeClr>
+          </a:lnRef>
+          <a:fillRef idx="1">
+            <a:schemeClr val="accent1"/>
+          </a:fillRef>
+          <a:effectRef idx="0">
+            <a:schemeClr val="accent1"/>
+          </a:effectRef>
+          <a:fontRef idx="minor">
+            <a:schemeClr val="lt1"/>
+          </a:fontRef>
+        </p:style>
+      </p:sp>
+      <p:cxnSp>
+        <p:nvCxnSpPr>
+          <p:cNvPr id="22" name="Straight Connector 13">
+            <a:extLst>
+              <a:ext uri="{FF2B5EF4-FFF2-40B4-BE49-F238E27FC236}">
+                <a16:creationId xmlns:a16="http://schemas.microsoft.com/office/drawing/2014/main" id="{81C8E47B-A563-4B44-A9B0-9316605C2E4E}"/>
+              </a:ext>
+              <a:ext uri="{C183D7F6-B498-43B3-948B-1728B52AA6E4}">
+                <adec:decorative xmlns:adec="http://schemas.microsoft.com/office/drawing/2017/decorative" val="1"/>
+              </a:ext>
+            </a:extLst>
+          </p:cNvPr>
+          <p:cNvCxnSpPr>
+            <a:cxnSpLocks noGrp="1" noRot="1" noChangeAspect="1" noMove="1" noResize="1" noEditPoints="1" noAdjustHandles="1" noChangeArrowheads="1" noChangeShapeType="1"/>
+          </p:cNvCxnSpPr>
+          <p:nvPr>
+            <p:extLst>
+              <p:ext uri="{386F3935-93C4-4BCD-93E2-E3B085C9AB24}">
+                <p16:designElem xmlns:p16="http://schemas.microsoft.com/office/powerpoint/2015/main" val="1"/>
+              </p:ext>
+            </p:extLst>
+          </p:nvPr>
+        </p:nvCxnSpPr>
+        <p:spPr>
+          <a:xfrm>
+            <a:off x="1207658" y="4343400"/>
+            <a:ext cx="9875520" cy="0"/>
+          </a:xfrm>
+          <a:prstGeom prst="line">
+            <a:avLst/>
+          </a:prstGeom>
+          <a:ln w="6350">
+            <a:solidFill>
+              <a:schemeClr val="tx1">
+                <a:lumMod val="50000"/>
+                <a:lumOff val="50000"/>
+              </a:schemeClr>
+            </a:solidFill>
+          </a:ln>
+        </p:spPr>
+        <p:style>
+          <a:lnRef idx="1">
+            <a:schemeClr val="accent1"/>
+          </a:lnRef>
+          <a:fillRef idx="0">
+            <a:schemeClr val="accent1"/>
+          </a:fillRef>
+          <a:effectRef idx="0">
+            <a:schemeClr val="accent1"/>
+          </a:effectRef>
+          <a:fontRef idx="minor">
+            <a:schemeClr val="tx1"/>
+          </a:fontRef>
+        </p:style>
+      </p:cxnSp>
+      <p:pic>
+        <p:nvPicPr>
+          <p:cNvPr id="5" name="Picture 4">
+            <a:extLst>
+              <a:ext uri="{FF2B5EF4-FFF2-40B4-BE49-F238E27FC236}">
+                <a16:creationId xmlns:a16="http://schemas.microsoft.com/office/drawing/2014/main" id="{9B532AAF-7E8D-4F3B-AA22-6BA9F2F71976}"/>
+              </a:ext>
+            </a:extLst>
+          </p:cNvPr>
+          <p:cNvPicPr>
+            <a:picLocks noChangeAspect="1"/>
+          </p:cNvPicPr>
+          <p:nvPr/>
+        </p:nvPicPr>
+        <p:blipFill rotWithShape="1">
+          <a:blip r:embed="rId2"/>
+          <a:srcRect t="32529"/>
+          <a:stretch/>
+        </p:blipFill>
+        <p:spPr>
+          <a:xfrm>
+            <a:off x="-32" y="10"/>
+            <a:ext cx="12192031" cy="4915066"/>
+          </a:xfrm>
+          <a:prstGeom prst="rect">
+            <a:avLst/>
+          </a:prstGeom>
+        </p:spPr>
+      </p:pic>
+      <p:sp>
+        <p:nvSpPr>
+          <p:cNvPr id="23" name="Rectangle 15">
+            <a:extLst>
+              <a:ext uri="{FF2B5EF4-FFF2-40B4-BE49-F238E27FC236}">
+                <a16:creationId xmlns:a16="http://schemas.microsoft.com/office/drawing/2014/main" id="{54BFABF9-7D43-458F-B85F-04FF279ACB81}"/>
+              </a:ext>
+              <a:ext uri="{C183D7F6-B498-43B3-948B-1728B52AA6E4}">
+                <adec:decorative xmlns:adec="http://schemas.microsoft.com/office/drawing/2017/decorative" val="1"/>
+              </a:ext>
+            </a:extLst>
+          </p:cNvPr>
+          <p:cNvSpPr>
+            <a:spLocks noGrp="1" noRot="1" noChangeAspect="1" noMove="1" noResize="1" noEditPoints="1" noAdjustHandles="1" noChangeArrowheads="1" noChangeShapeType="1" noTextEdit="1"/>
+          </p:cNvSpPr>
+          <p:nvPr>
+            <p:extLst>
+              <p:ext uri="{386F3935-93C4-4BCD-93E2-E3B085C9AB24}">
+                <p16:designElem xmlns:p16="http://schemas.microsoft.com/office/powerpoint/2015/main" val="1"/>
+              </p:ext>
+            </p:extLst>
+          </p:nvPr>
+        </p:nvSpPr>
+        <p:spPr bwMode="white">
+          <a:xfrm>
+            <a:off x="1507" y="4953000"/>
+            <a:ext cx="12188952" cy="1905000"/>
+          </a:xfrm>
+          <a:prstGeom prst="rect">
+            <a:avLst/>
+          </a:prstGeom>
+          <a:solidFill>
+            <a:schemeClr val="accent1">
+              <a:lumMod val="75000"/>
+            </a:schemeClr>
+          </a:solidFill>
+          <a:ln>
+            <a:noFill/>
+          </a:ln>
+        </p:spPr>
+        <p:style>
+          <a:lnRef idx="2">
+            <a:schemeClr val="accent1">
+              <a:shade val="50000"/>
+            </a:schemeClr>
+          </a:lnRef>
+          <a:fillRef idx="1">
+            <a:schemeClr val="accent1"/>
+          </a:fillRef>
+          <a:effectRef idx="0">
+            <a:schemeClr val="accent1"/>
+          </a:effectRef>
+          <a:fontRef idx="minor">
+            <a:schemeClr val="lt1"/>
+          </a:fontRef>
+        </p:style>
+      </p:sp>
+      <p:sp>
+        <p:nvSpPr>
           <p:cNvPr id="2" name="Title 1">
             <a:extLst>
               <a:ext uri="{FF2B5EF4-FFF2-40B4-BE49-F238E27FC236}">
-                <a16:creationId xmlns:a16="http://schemas.microsoft.com/office/drawing/2014/main" id="{A20AC04D-A984-4F23-B555-92E74792A726}"/>
+                <a16:creationId xmlns:a16="http://schemas.microsoft.com/office/drawing/2014/main" id="{63950B4F-5F45-4EFE-877F-E487E96E3B06}"/>
               </a:ext>
             </a:extLst>
           </p:cNvPr>
@@ -11558,256 +10176,186 @@
             <p:ph type="title"/>
           </p:nvPr>
         </p:nvSpPr>
-        <p:spPr/>
-        <p:txBody>
-          <a:bodyPr/>
+        <p:spPr>
+          <a:xfrm>
+            <a:off x="1065197" y="5120640"/>
+            <a:ext cx="10058400" cy="822960"/>
+          </a:xfrm>
+        </p:spPr>
+        <p:txBody>
+          <a:bodyPr vert="horz" lIns="91440" tIns="45720" rIns="91440" bIns="45720" rtlCol="0" anchor="b">
+            <a:normAutofit/>
+          </a:bodyPr>
           <a:lstStyle/>
           <a:p>
             <a:r>
-              <a:rPr lang="en-US" dirty="0"/>
-              <a:t>CORS</a:t>
-            </a:r>
-          </a:p>
-        </p:txBody>
-      </p:sp>
-      <p:sp>
-        <p:nvSpPr>
-          <p:cNvPr id="3" name="Content Placeholder 2">
+              <a:rPr lang="en-US" sz="3600">
+                <a:solidFill>
+                  <a:srgbClr val="FFFFFF"/>
+                </a:solidFill>
+              </a:rPr>
+              <a:t>Controllers and Actions: Producing and Consuming</a:t>
+            </a:r>
+          </a:p>
+        </p:txBody>
+      </p:sp>
+      <p:sp>
+        <p:nvSpPr>
+          <p:cNvPr id="24" name="Rectangle 17">
             <a:extLst>
               <a:ext uri="{FF2B5EF4-FFF2-40B4-BE49-F238E27FC236}">
-                <a16:creationId xmlns:a16="http://schemas.microsoft.com/office/drawing/2014/main" id="{70C9133A-28BF-4F05-8B71-F5AF24A86A1B}"/>
+                <a16:creationId xmlns:a16="http://schemas.microsoft.com/office/drawing/2014/main" id="{72E64342-BCC2-4FB3-B9DC-14B19B5D7E2B}"/>
+              </a:ext>
+              <a:ext uri="{C183D7F6-B498-43B3-948B-1728B52AA6E4}">
+                <adec:decorative xmlns:adec="http://schemas.microsoft.com/office/drawing/2017/decorative" val="1"/>
               </a:ext>
             </a:extLst>
           </p:cNvPr>
           <p:cNvSpPr>
-            <a:spLocks noGrp="1"/>
-          </p:cNvSpPr>
-          <p:nvPr>
-            <p:ph idx="1"/>
-          </p:nvPr>
-        </p:nvSpPr>
-        <p:spPr/>
-        <p:txBody>
-          <a:bodyPr/>
-          <a:lstStyle/>
-          <a:p>
-            <a:r>
-              <a:rPr lang="en-US" dirty="0"/>
-              <a:t>GET http://myserver.chinookmusicstore.net/api/test HTTP/1.1</a:t>
-            </a:r>
-          </a:p>
-          <a:p>
-            <a:r>
-              <a:rPr lang="en-US" dirty="0" err="1"/>
-              <a:t>Referer</a:t>
-            </a:r>
-            <a:r>
-              <a:rPr lang="en-US" dirty="0"/>
-              <a:t>: http://myclient. chinookmusicstore.net/</a:t>
-            </a:r>
-          </a:p>
-          <a:p>
-            <a:r>
-              <a:rPr lang="en-US" dirty="0"/>
-              <a:t>Accept: */*</a:t>
-            </a:r>
-          </a:p>
-          <a:p>
-            <a:r>
-              <a:rPr lang="en-US" dirty="0"/>
-              <a:t>Accept-Language: </a:t>
-            </a:r>
-            <a:r>
-              <a:rPr lang="en-US" dirty="0" err="1"/>
-              <a:t>en</a:t>
-            </a:r>
-            <a:r>
-              <a:rPr lang="en-US" dirty="0"/>
-              <a:t>-US</a:t>
-            </a:r>
-          </a:p>
-          <a:p>
-            <a:r>
-              <a:rPr lang="en-US" dirty="0">
-                <a:highlight>
-                  <a:srgbClr val="800000"/>
-                </a:highlight>
-              </a:rPr>
-              <a:t>Origin: http://myclient. chinookmusicstore.net</a:t>
-            </a:r>
-          </a:p>
-          <a:p>
-            <a:r>
-              <a:rPr lang="en-US" dirty="0"/>
-              <a:t>Accept-Encoding: </a:t>
-            </a:r>
-            <a:r>
-              <a:rPr lang="en-US" dirty="0" err="1"/>
-              <a:t>gzip</a:t>
-            </a:r>
-            <a:r>
-              <a:rPr lang="en-US" dirty="0"/>
-              <a:t>, deflate</a:t>
-            </a:r>
-          </a:p>
-          <a:p>
-            <a:r>
-              <a:rPr lang="en-US" dirty="0"/>
-              <a:t>User-Agent: Mozilla/5.0 (compatible; MSIE 10.0; Windows NT 6.2; WOW64; Trident/6.0)</a:t>
-            </a:r>
-          </a:p>
-          <a:p>
-            <a:r>
-              <a:rPr lang="en-US" dirty="0"/>
-              <a:t>Host: </a:t>
-            </a:r>
-            <a:r>
-              <a:rPr lang="en-US" dirty="0" err="1"/>
-              <a:t>myservice</a:t>
-            </a:r>
-            <a:r>
-              <a:rPr lang="en-US" dirty="0"/>
-              <a:t>. chinookmusicstore.net</a:t>
-            </a:r>
-          </a:p>
-        </p:txBody>
+            <a:spLocks noGrp="1" noRot="1" noChangeAspect="1" noMove="1" noResize="1" noEditPoints="1" noAdjustHandles="1" noChangeArrowheads="1" noChangeShapeType="1" noTextEdit="1"/>
+          </p:cNvSpPr>
+          <p:nvPr>
+            <p:extLst>
+              <p:ext uri="{386F3935-93C4-4BCD-93E2-E3B085C9AB24}">
+                <p16:designElem xmlns:p16="http://schemas.microsoft.com/office/powerpoint/2015/main" val="1"/>
+              </p:ext>
+            </p:extLst>
+          </p:nvPr>
+        </p:nvSpPr>
+        <p:spPr>
+          <a:xfrm>
+            <a:off x="1507" y="4906176"/>
+            <a:ext cx="12188952" cy="64008"/>
+          </a:xfrm>
+          <a:prstGeom prst="rect">
+            <a:avLst/>
+          </a:prstGeom>
+          <a:solidFill>
+            <a:schemeClr val="accent1"/>
+          </a:solidFill>
+          <a:ln>
+            <a:noFill/>
+          </a:ln>
+        </p:spPr>
+        <p:style>
+          <a:lnRef idx="2">
+            <a:schemeClr val="accent1">
+              <a:shade val="50000"/>
+            </a:schemeClr>
+          </a:lnRef>
+          <a:fillRef idx="1">
+            <a:schemeClr val="accent1"/>
+          </a:fillRef>
+          <a:effectRef idx="0">
+            <a:schemeClr val="accent1"/>
+          </a:effectRef>
+          <a:fontRef idx="minor">
+            <a:schemeClr val="lt1"/>
+          </a:fontRef>
+        </p:style>
       </p:sp>
     </p:spTree>
     <p:extLst>
       <p:ext uri="{BB962C8B-B14F-4D97-AF65-F5344CB8AC3E}">
-        <p14:creationId xmlns:p14="http://schemas.microsoft.com/office/powerpoint/2010/main" val="3983395679"/>
+        <p14:creationId xmlns:p14="http://schemas.microsoft.com/office/powerpoint/2010/main" val="2402502586"/>
       </p:ext>
     </p:extLst>
   </p:cSld>
   <p:clrMapOvr>
     <a:masterClrMapping/>
   </p:clrMapOvr>
-</p:sld>
-</file>
-
-<file path=ppt/slides/slide9.xml><?xml version="1.0" encoding="utf-8"?>
-<p:sld xmlns:a="http://schemas.openxmlformats.org/drawingml/2006/main" xmlns:r="http://schemas.openxmlformats.org/officeDocument/2006/relationships" xmlns:p="http://schemas.openxmlformats.org/presentationml/2006/main">
-  <p:cSld>
-    <p:spTree>
-      <p:nvGrpSpPr>
-        <p:cNvPr id="1" name=""/>
-        <p:cNvGrpSpPr/>
-        <p:nvPr/>
-      </p:nvGrpSpPr>
-      <p:grpSpPr>
-        <a:xfrm>
-          <a:off x="0" y="0"/>
-          <a:ext cx="0" cy="0"/>
-          <a:chOff x="0" y="0"/>
-          <a:chExt cx="0" cy="0"/>
-        </a:xfrm>
-      </p:grpSpPr>
-      <p:sp>
-        <p:nvSpPr>
-          <p:cNvPr id="2" name="Title 1">
-            <a:extLst>
-              <a:ext uri="{FF2B5EF4-FFF2-40B4-BE49-F238E27FC236}">
-                <a16:creationId xmlns:a16="http://schemas.microsoft.com/office/drawing/2014/main" id="{246FF8A7-F88B-4741-8309-0685A260EECE}"/>
-              </a:ext>
-            </a:extLst>
-          </p:cNvPr>
-          <p:cNvSpPr>
-            <a:spLocks noGrp="1"/>
-          </p:cNvSpPr>
-          <p:nvPr>
-            <p:ph type="title"/>
-          </p:nvPr>
-        </p:nvSpPr>
-        <p:spPr/>
-        <p:txBody>
-          <a:bodyPr/>
-          <a:lstStyle/>
-          <a:p>
-            <a:r>
-              <a:rPr lang="en-US" dirty="0"/>
-              <a:t>CORS</a:t>
-            </a:r>
-          </a:p>
-        </p:txBody>
-      </p:sp>
-      <p:sp>
-        <p:nvSpPr>
-          <p:cNvPr id="3" name="Content Placeholder 2">
-            <a:extLst>
-              <a:ext uri="{FF2B5EF4-FFF2-40B4-BE49-F238E27FC236}">
-                <a16:creationId xmlns:a16="http://schemas.microsoft.com/office/drawing/2014/main" id="{0A7A7162-44F8-4A70-8176-8DC015BDCCD8}"/>
-              </a:ext>
-            </a:extLst>
-          </p:cNvPr>
-          <p:cNvSpPr>
-            <a:spLocks noGrp="1"/>
-          </p:cNvSpPr>
-          <p:nvPr>
-            <p:ph idx="1"/>
-          </p:nvPr>
-        </p:nvSpPr>
-        <p:spPr/>
-        <p:txBody>
-          <a:bodyPr/>
-          <a:lstStyle/>
-          <a:p>
-            <a:r>
-              <a:rPr lang="en-US" dirty="0"/>
-              <a:t>HTTP/1.1 200 OK</a:t>
-            </a:r>
-          </a:p>
-          <a:p>
-            <a:r>
-              <a:rPr lang="en-US" dirty="0"/>
-              <a:t>Cache-Control: no-cache</a:t>
-            </a:r>
-          </a:p>
-          <a:p>
-            <a:r>
-              <a:rPr lang="en-US" dirty="0"/>
-              <a:t>Pragma: no-cache</a:t>
-            </a:r>
-          </a:p>
-          <a:p>
-            <a:r>
-              <a:rPr lang="en-US" dirty="0"/>
-              <a:t>Content-Type: text/plain; charset=utf-8</a:t>
-            </a:r>
-          </a:p>
-          <a:p>
-            <a:r>
-              <a:rPr lang="en-US" dirty="0">
-                <a:highlight>
-                  <a:srgbClr val="800000"/>
-                </a:highlight>
-              </a:rPr>
-              <a:t>Access-Control-Allow-Origin: http://myclient. chinookmusicstore.net</a:t>
-            </a:r>
-          </a:p>
-          <a:p>
-            <a:r>
-              <a:rPr lang="en-US" dirty="0"/>
-              <a:t>Date: Wed, 05 Jun 2013 06:27:30 GMT</a:t>
-            </a:r>
-          </a:p>
-          <a:p>
-            <a:r>
-              <a:rPr lang="en-US" dirty="0"/>
-              <a:t>Content-Length: 17</a:t>
-            </a:r>
-          </a:p>
-        </p:txBody>
-      </p:sp>
-    </p:spTree>
-    <p:extLst>
-      <p:ext uri="{BB962C8B-B14F-4D97-AF65-F5344CB8AC3E}">
-        <p14:creationId xmlns:p14="http://schemas.microsoft.com/office/powerpoint/2010/main" val="1956764379"/>
-      </p:ext>
-    </p:extLst>
-  </p:cSld>
-  <p:clrMapOvr>
-    <a:masterClrMapping/>
-  </p:clrMapOvr>
+  <p:timing>
+    <p:tnLst>
+      <p:par>
+        <p:cTn id="1" dur="indefinite" restart="never" nodeType="tmRoot">
+          <p:childTnLst>
+            <p:seq concurrent="1" nextAc="seek">
+              <p:cTn id="2" dur="indefinite" nodeType="mainSeq">
+                <p:childTnLst>
+                  <p:par>
+                    <p:cTn id="3" fill="hold">
+                      <p:stCondLst>
+                        <p:cond delay="indefinite"/>
+                        <p:cond evt="onBegin" delay="0">
+                          <p:tn val="2"/>
+                        </p:cond>
+                      </p:stCondLst>
+                      <p:childTnLst>
+                        <p:par>
+                          <p:cTn id="4" fill="hold">
+                            <p:stCondLst>
+                              <p:cond delay="0"/>
+                            </p:stCondLst>
+                            <p:childTnLst>
+                              <p:par>
+                                <p:cTn id="5" presetID="10" presetClass="entr" presetSubtype="0" fill="hold" grpId="0" nodeType="withEffect">
+                                  <p:stCondLst>
+                                    <p:cond delay="1000"/>
+                                  </p:stCondLst>
+                                  <p:iterate>
+                                    <p:tmPct val="10000"/>
+                                  </p:iterate>
+                                  <p:childTnLst>
+                                    <p:set>
+                                      <p:cBhvr>
+                                        <p:cTn id="6" dur="1" fill="hold">
+                                          <p:stCondLst>
+                                            <p:cond delay="0"/>
+                                          </p:stCondLst>
+                                        </p:cTn>
+                                        <p:tgtEl>
+                                          <p:spTgt spid="2"/>
+                                        </p:tgtEl>
+                                        <p:attrNameLst>
+                                          <p:attrName>style.visibility</p:attrName>
+                                        </p:attrNameLst>
+                                      </p:cBhvr>
+                                      <p:to>
+                                        <p:strVal val="visible"/>
+                                      </p:to>
+                                    </p:set>
+                                    <p:animEffect transition="in" filter="fade">
+                                      <p:cBhvr>
+                                        <p:cTn id="7" dur="700"/>
+                                        <p:tgtEl>
+                                          <p:spTgt spid="2"/>
+                                        </p:tgtEl>
+                                      </p:cBhvr>
+                                    </p:animEffect>
+                                  </p:childTnLst>
+                                </p:cTn>
+                              </p:par>
+                            </p:childTnLst>
+                          </p:cTn>
+                        </p:par>
+                      </p:childTnLst>
+                    </p:cTn>
+                  </p:par>
+                </p:childTnLst>
+              </p:cTn>
+              <p:prevCondLst>
+                <p:cond evt="onPrev" delay="0">
+                  <p:tgtEl>
+                    <p:sldTgt/>
+                  </p:tgtEl>
+                </p:cond>
+              </p:prevCondLst>
+              <p:nextCondLst>
+                <p:cond evt="onNext" delay="0">
+                  <p:tgtEl>
+                    <p:sldTgt/>
+                  </p:tgtEl>
+                </p:cond>
+              </p:nextCondLst>
+            </p:seq>
+          </p:childTnLst>
+        </p:cTn>
+      </p:par>
+    </p:tnLst>
+    <p:bldLst>
+      <p:bldP spid="2" grpId="0"/>
+    </p:bldLst>
+  </p:timing>
 </p:sld>
 </file>
 

</xml_diff>